<commit_message>
Uploading Updated Presentation and Documented Notebooks
</commit_message>
<xml_diff>
--- a/HoustonCity.pptx
+++ b/HoustonCity.pptx
@@ -6,11 +6,15 @@
   </p:sldMasterIdLst>
   <p:sldIdLst>
     <p:sldId id="256" r:id="rId2"/>
-    <p:sldId id="264" r:id="rId3"/>
-    <p:sldId id="267" r:id="rId4"/>
-    <p:sldId id="268" r:id="rId5"/>
-    <p:sldId id="271" r:id="rId6"/>
-    <p:sldId id="272" r:id="rId7"/>
+    <p:sldId id="275" r:id="rId3"/>
+    <p:sldId id="276" r:id="rId4"/>
+    <p:sldId id="274" r:id="rId5"/>
+    <p:sldId id="273" r:id="rId6"/>
+    <p:sldId id="267" r:id="rId7"/>
+    <p:sldId id="268" r:id="rId8"/>
+    <p:sldId id="277" r:id="rId9"/>
+    <p:sldId id="271" r:id="rId10"/>
+    <p:sldId id="272" r:id="rId11"/>
   </p:sldIdLst>
   <p:sldSz cx="12192000" cy="6858000"/>
   <p:notesSz cx="6858000" cy="9144000"/>
@@ -609,7 +613,7 @@
           </a:lstStyle>
           <a:p>
             <a:r>
-              <a:rPr lang="en-US" smtClean="0"/>
+              <a:rPr lang="en-US"/>
               <a:t>Click to edit Master title style</a:t>
             </a:r>
             <a:endParaRPr lang="en-US" dirty="0"/>
@@ -726,7 +730,7 @@
           </a:lstStyle>
           <a:p>
             <a:r>
-              <a:rPr lang="en-US" smtClean="0"/>
+              <a:rPr lang="en-US"/>
               <a:t>Click to edit Master subtitle style</a:t>
             </a:r>
             <a:endParaRPr lang="en-US" dirty="0"/>
@@ -764,7 +768,7 @@
             <a:fld id="{1E700B27-DE4C-4B9E-BB11-B9027034A00F}" type="datetimeFigureOut">
               <a:rPr lang="en-US" dirty="0"/>
               <a:pPr/>
-              <a:t>3/28/2020</a:t>
+              <a:t>4/1/2020</a:t>
             </a:fld>
             <a:endParaRPr lang="en-US" dirty="0"/>
           </a:p>
@@ -1710,7 +1714,7 @@
           </a:lstStyle>
           <a:p>
             <a:r>
-              <a:rPr lang="en-US" smtClean="0"/>
+              <a:rPr lang="en-US"/>
               <a:t>Click to edit Master title style</a:t>
             </a:r>
             <a:endParaRPr lang="en-US" dirty="0"/>
@@ -1789,7 +1793,7 @@
           </a:lstStyle>
           <a:p>
             <a:r>
-              <a:rPr lang="en-US" smtClean="0"/>
+              <a:rPr lang="en-US"/>
               <a:t>Click icon to add picture</a:t>
             </a:r>
             <a:endParaRPr lang="en-US" dirty="0"/>
@@ -1861,7 +1865,7 @@
           <a:p>
             <a:pPr lvl="0"/>
             <a:r>
-              <a:rPr lang="en-US" smtClean="0"/>
+              <a:rPr lang="en-US"/>
               <a:t>Click to edit Master text styles</a:t>
             </a:r>
           </a:p>
@@ -1884,7 +1888,7 @@
           <a:p>
             <a:fld id="{C40F4739-9812-4A9F-890D-2AD6BA5F6EE8}" type="datetimeFigureOut">
               <a:rPr lang="en-US" dirty="0"/>
-              <a:t>3/28/2020</a:t>
+              <a:t>4/1/2020</a:t>
             </a:fld>
             <a:endParaRPr lang="en-US" dirty="0"/>
           </a:p>
@@ -2804,7 +2808,7 @@
           </a:lstStyle>
           <a:p>
             <a:r>
-              <a:rPr lang="en-US" smtClean="0"/>
+              <a:rPr lang="en-US"/>
               <a:t>Click to edit Master title style</a:t>
             </a:r>
             <a:endParaRPr lang="en-US" dirty="0"/>
@@ -2872,7 +2876,7 @@
           <a:p>
             <a:pPr lvl="0"/>
             <a:r>
-              <a:rPr lang="en-US" smtClean="0"/>
+              <a:rPr lang="en-US"/>
               <a:t>Click to edit Master text styles</a:t>
             </a:r>
           </a:p>
@@ -2895,7 +2899,7 @@
           <a:p>
             <a:fld id="{18845AC5-A3F8-44AA-BA8F-596CDCC976D3}" type="datetimeFigureOut">
               <a:rPr lang="en-US" dirty="0"/>
-              <a:t>3/28/2020</a:t>
+              <a:t>4/1/2020</a:t>
             </a:fld>
             <a:endParaRPr lang="en-US" dirty="0"/>
           </a:p>
@@ -3901,7 +3905,7 @@
           </a:lstStyle>
           <a:p>
             <a:r>
-              <a:rPr lang="en-US" smtClean="0"/>
+              <a:rPr lang="en-US"/>
               <a:t>Click to edit Master title style</a:t>
             </a:r>
             <a:endParaRPr lang="en-US" dirty="0"/>
@@ -3975,7 +3979,7 @@
           <a:p>
             <a:pPr lvl="0"/>
             <a:r>
-              <a:rPr lang="en-US" smtClean="0"/>
+              <a:rPr lang="en-US"/>
               <a:t>Click to edit Master text styles</a:t>
             </a:r>
           </a:p>
@@ -4042,7 +4046,7 @@
           <a:p>
             <a:pPr lvl="0"/>
             <a:r>
-              <a:rPr lang="en-US" smtClean="0"/>
+              <a:rPr lang="en-US"/>
               <a:t>Click to edit Master text styles</a:t>
             </a:r>
           </a:p>
@@ -4065,7 +4069,7 @@
           <a:p>
             <a:fld id="{C873B183-A821-4095-A363-9EC968635539}" type="datetimeFigureOut">
               <a:rPr lang="en-US" dirty="0"/>
-              <a:t>3/28/2020</a:t>
+              <a:t>4/1/2020</a:t>
             </a:fld>
             <a:endParaRPr lang="en-US" dirty="0"/>
           </a:p>
@@ -4985,7 +4989,7 @@
           </a:lstStyle>
           <a:p>
             <a:r>
-              <a:rPr lang="en-US" smtClean="0"/>
+              <a:rPr lang="en-US"/>
               <a:t>Click to edit Master title style</a:t>
             </a:r>
             <a:endParaRPr lang="en-US" dirty="0"/>
@@ -5103,7 +5107,7 @@
           <a:p>
             <a:pPr lvl="0"/>
             <a:r>
-              <a:rPr lang="en-US" smtClean="0"/>
+              <a:rPr lang="en-US"/>
               <a:t>Click to edit Master text styles</a:t>
             </a:r>
           </a:p>
@@ -5126,7 +5130,7 @@
           <a:p>
             <a:fld id="{174D01B4-0AA5-45E6-B2E6-5FA4078AEBCF}" type="datetimeFigureOut">
               <a:rPr lang="en-US" dirty="0"/>
-              <a:t>3/28/2020</a:t>
+              <a:t>4/1/2020</a:t>
             </a:fld>
             <a:endParaRPr lang="en-US" dirty="0"/>
           </a:p>
@@ -5260,7 +5264,7 @@
           </a:lstStyle>
           <a:p>
             <a:r>
-              <a:rPr lang="en-US" smtClean="0"/>
+              <a:rPr lang="en-US"/>
               <a:t>Click to edit Master title style</a:t>
             </a:r>
             <a:endParaRPr lang="en-US" dirty="0"/>
@@ -5332,7 +5336,7 @@
           <a:p>
             <a:pPr lvl="0"/>
             <a:r>
-              <a:rPr lang="en-US" smtClean="0"/>
+              <a:rPr lang="en-US"/>
               <a:t>Click to edit Master text styles</a:t>
             </a:r>
           </a:p>
@@ -5399,7 +5403,7 @@
           <a:p>
             <a:pPr lvl="0"/>
             <a:r>
-              <a:rPr lang="en-US" smtClean="0"/>
+              <a:rPr lang="en-US"/>
               <a:t>Click to edit Master text styles</a:t>
             </a:r>
           </a:p>
@@ -5470,7 +5474,7 @@
           <a:p>
             <a:pPr lvl="0"/>
             <a:r>
-              <a:rPr lang="en-US" smtClean="0"/>
+              <a:rPr lang="en-US"/>
               <a:t>Click to edit Master text styles</a:t>
             </a:r>
           </a:p>
@@ -5537,7 +5541,7 @@
           <a:p>
             <a:pPr lvl="0"/>
             <a:r>
-              <a:rPr lang="en-US" smtClean="0"/>
+              <a:rPr lang="en-US"/>
               <a:t>Click to edit Master text styles</a:t>
             </a:r>
           </a:p>
@@ -5608,7 +5612,7 @@
           <a:p>
             <a:pPr lvl="0"/>
             <a:r>
-              <a:rPr lang="en-US" smtClean="0"/>
+              <a:rPr lang="en-US"/>
               <a:t>Click to edit Master text styles</a:t>
             </a:r>
           </a:p>
@@ -5675,7 +5679,7 @@
           <a:p>
             <a:pPr lvl="0"/>
             <a:r>
-              <a:rPr lang="en-US" smtClean="0"/>
+              <a:rPr lang="en-US"/>
               <a:t>Click to edit Master text styles</a:t>
             </a:r>
           </a:p>
@@ -5772,7 +5776,7 @@
           <a:p>
             <a:fld id="{4147335C-0450-40D7-8612-B3203BED4F28}" type="datetimeFigureOut">
               <a:rPr lang="en-US" dirty="0"/>
-              <a:t>3/28/2020</a:t>
+              <a:t>4/1/2020</a:t>
             </a:fld>
             <a:endParaRPr lang="en-US" dirty="0"/>
           </a:p>
@@ -5870,7 +5874,7 @@
           </a:lstStyle>
           <a:p>
             <a:r>
-              <a:rPr lang="en-US" smtClean="0"/>
+              <a:rPr lang="en-US"/>
               <a:t>Click to edit Master title style</a:t>
             </a:r>
             <a:endParaRPr lang="en-US" dirty="0"/>
@@ -5942,7 +5946,7 @@
           <a:p>
             <a:pPr lvl="0"/>
             <a:r>
-              <a:rPr lang="en-US" smtClean="0"/>
+              <a:rPr lang="en-US"/>
               <a:t>Click to edit Master text styles</a:t>
             </a:r>
           </a:p>
@@ -6020,7 +6024,7 @@
           </a:lstStyle>
           <a:p>
             <a:r>
-              <a:rPr lang="en-US" smtClean="0"/>
+              <a:rPr lang="en-US"/>
               <a:t>Click icon to add picture</a:t>
             </a:r>
             <a:endParaRPr lang="en-US" dirty="0"/>
@@ -6088,7 +6092,7 @@
           <a:p>
             <a:pPr lvl="0"/>
             <a:r>
-              <a:rPr lang="en-US" smtClean="0"/>
+              <a:rPr lang="en-US"/>
               <a:t>Click to edit Master text styles</a:t>
             </a:r>
           </a:p>
@@ -6159,7 +6163,7 @@
           <a:p>
             <a:pPr lvl="0"/>
             <a:r>
-              <a:rPr lang="en-US" smtClean="0"/>
+              <a:rPr lang="en-US"/>
               <a:t>Click to edit Master text styles</a:t>
             </a:r>
           </a:p>
@@ -6237,7 +6241,7 @@
           </a:lstStyle>
           <a:p>
             <a:r>
-              <a:rPr lang="en-US" smtClean="0"/>
+              <a:rPr lang="en-US"/>
               <a:t>Click icon to add picture</a:t>
             </a:r>
             <a:endParaRPr lang="en-US" dirty="0"/>
@@ -6305,7 +6309,7 @@
           <a:p>
             <a:pPr lvl="0"/>
             <a:r>
-              <a:rPr lang="en-US" smtClean="0"/>
+              <a:rPr lang="en-US"/>
               <a:t>Click to edit Master text styles</a:t>
             </a:r>
           </a:p>
@@ -6376,7 +6380,7 @@
           <a:p>
             <a:pPr lvl="0"/>
             <a:r>
-              <a:rPr lang="en-US" smtClean="0"/>
+              <a:rPr lang="en-US"/>
               <a:t>Click to edit Master text styles</a:t>
             </a:r>
           </a:p>
@@ -6454,7 +6458,7 @@
           </a:lstStyle>
           <a:p>
             <a:r>
-              <a:rPr lang="en-US" smtClean="0"/>
+              <a:rPr lang="en-US"/>
               <a:t>Click icon to add picture</a:t>
             </a:r>
             <a:endParaRPr lang="en-US" dirty="0"/>
@@ -6522,7 +6526,7 @@
           <a:p>
             <a:pPr lvl="0"/>
             <a:r>
-              <a:rPr lang="en-US" smtClean="0"/>
+              <a:rPr lang="en-US"/>
               <a:t>Click to edit Master text styles</a:t>
             </a:r>
           </a:p>
@@ -6619,7 +6623,7 @@
           <a:p>
             <a:fld id="{D246A105-2A1C-4284-B4EA-07CF89B1A393}" type="datetimeFigureOut">
               <a:rPr lang="en-US" dirty="0"/>
-              <a:t>3/28/2020</a:t>
+              <a:t>4/1/2020</a:t>
             </a:fld>
             <a:endParaRPr lang="en-US" dirty="0"/>
           </a:p>
@@ -6718,7 +6722,7 @@
           <a:lstStyle/>
           <a:p>
             <a:r>
-              <a:rPr lang="en-US" smtClean="0"/>
+              <a:rPr lang="en-US"/>
               <a:t>Click to edit Master title style</a:t>
             </a:r>
             <a:endParaRPr lang="en-US" dirty="0"/>
@@ -6742,35 +6746,35 @@
           <a:p>
             <a:pPr lvl="0"/>
             <a:r>
-              <a:rPr lang="en-US" smtClean="0"/>
+              <a:rPr lang="en-US"/>
               <a:t>Click to edit Master text styles</a:t>
             </a:r>
           </a:p>
           <a:p>
             <a:pPr lvl="1"/>
             <a:r>
-              <a:rPr lang="en-US" smtClean="0"/>
+              <a:rPr lang="en-US"/>
               <a:t>Second level</a:t>
             </a:r>
           </a:p>
           <a:p>
             <a:pPr lvl="2"/>
             <a:r>
-              <a:rPr lang="en-US" smtClean="0"/>
+              <a:rPr lang="en-US"/>
               <a:t>Third level</a:t>
             </a:r>
           </a:p>
           <a:p>
             <a:pPr lvl="3"/>
             <a:r>
-              <a:rPr lang="en-US" smtClean="0"/>
+              <a:rPr lang="en-US"/>
               <a:t>Fourth level</a:t>
             </a:r>
           </a:p>
           <a:p>
             <a:pPr lvl="4"/>
             <a:r>
-              <a:rPr lang="en-US" smtClean="0"/>
+              <a:rPr lang="en-US"/>
               <a:t>Fifth level</a:t>
             </a:r>
             <a:endParaRPr lang="en-US" dirty="0"/>
@@ -6794,7 +6798,7 @@
           <a:p>
             <a:fld id="{80DBE609-F3F2-45E6-BD6A-E03A8C86C1AE}" type="datetimeFigureOut">
               <a:rPr lang="en-US" dirty="0"/>
-              <a:t>3/28/2020</a:t>
+              <a:t>4/1/2020</a:t>
             </a:fld>
             <a:endParaRPr lang="en-US" dirty="0"/>
           </a:p>
@@ -7711,7 +7715,7 @@
           <a:lstStyle/>
           <a:p>
             <a:r>
-              <a:rPr lang="en-US" smtClean="0"/>
+              <a:rPr lang="en-US"/>
               <a:t>Click to edit Master title style</a:t>
             </a:r>
             <a:endParaRPr lang="en-US" dirty="0"/>
@@ -7740,35 +7744,35 @@
           <a:p>
             <a:pPr lvl="0"/>
             <a:r>
-              <a:rPr lang="en-US" smtClean="0"/>
+              <a:rPr lang="en-US"/>
               <a:t>Click to edit Master text styles</a:t>
             </a:r>
           </a:p>
           <a:p>
             <a:pPr lvl="1"/>
             <a:r>
-              <a:rPr lang="en-US" smtClean="0"/>
+              <a:rPr lang="en-US"/>
               <a:t>Second level</a:t>
             </a:r>
           </a:p>
           <a:p>
             <a:pPr lvl="2"/>
             <a:r>
-              <a:rPr lang="en-US" smtClean="0"/>
+              <a:rPr lang="en-US"/>
               <a:t>Third level</a:t>
             </a:r>
           </a:p>
           <a:p>
             <a:pPr lvl="3"/>
             <a:r>
-              <a:rPr lang="en-US" smtClean="0"/>
+              <a:rPr lang="en-US"/>
               <a:t>Fourth level</a:t>
             </a:r>
           </a:p>
           <a:p>
             <a:pPr lvl="4"/>
             <a:r>
-              <a:rPr lang="en-US" smtClean="0"/>
+              <a:rPr lang="en-US"/>
               <a:t>Fifth level</a:t>
             </a:r>
             <a:endParaRPr lang="en-US" dirty="0"/>
@@ -7792,7 +7796,7 @@
           <a:p>
             <a:fld id="{7A24AD68-089C-4467-A8F3-EA2BBCA6B44E}" type="datetimeFigureOut">
               <a:rPr lang="en-US" dirty="0"/>
-              <a:t>3/28/2020</a:t>
+              <a:t>4/1/2020</a:t>
             </a:fld>
             <a:endParaRPr lang="en-US" dirty="0"/>
           </a:p>
@@ -7922,7 +7926,7 @@
           <a:lstStyle/>
           <a:p>
             <a:r>
-              <a:rPr lang="en-US" smtClean="0"/>
+              <a:rPr lang="en-US"/>
               <a:t>Click to edit Master title style</a:t>
             </a:r>
             <a:endParaRPr lang="en-US" dirty="0"/>
@@ -7946,35 +7950,35 @@
           <a:p>
             <a:pPr lvl="0"/>
             <a:r>
-              <a:rPr lang="en-US" smtClean="0"/>
+              <a:rPr lang="en-US"/>
               <a:t>Click to edit Master text styles</a:t>
             </a:r>
           </a:p>
           <a:p>
             <a:pPr lvl="1"/>
             <a:r>
-              <a:rPr lang="en-US" smtClean="0"/>
+              <a:rPr lang="en-US"/>
               <a:t>Second level</a:t>
             </a:r>
           </a:p>
           <a:p>
             <a:pPr lvl="2"/>
             <a:r>
-              <a:rPr lang="en-US" smtClean="0"/>
+              <a:rPr lang="en-US"/>
               <a:t>Third level</a:t>
             </a:r>
           </a:p>
           <a:p>
             <a:pPr lvl="3"/>
             <a:r>
-              <a:rPr lang="en-US" smtClean="0"/>
+              <a:rPr lang="en-US"/>
               <a:t>Fourth level</a:t>
             </a:r>
           </a:p>
           <a:p>
             <a:pPr lvl="4"/>
             <a:r>
-              <a:rPr lang="en-US" smtClean="0"/>
+              <a:rPr lang="en-US"/>
               <a:t>Fifth level</a:t>
             </a:r>
             <a:endParaRPr lang="en-US" dirty="0"/>
@@ -7998,7 +8002,7 @@
           <a:p>
             <a:fld id="{75C51FCE-E4BB-4680-8E50-3C0E348D2609}" type="datetimeFigureOut">
               <a:rPr lang="en-US" dirty="0"/>
-              <a:t>3/28/2020</a:t>
+              <a:t>4/1/2020</a:t>
             </a:fld>
             <a:endParaRPr lang="en-US" dirty="0"/>
           </a:p>
@@ -8919,7 +8923,7 @@
           </a:lstStyle>
           <a:p>
             <a:r>
-              <a:rPr lang="en-US" smtClean="0"/>
+              <a:rPr lang="en-US"/>
               <a:t>Click to edit Master title style</a:t>
             </a:r>
             <a:endParaRPr lang="en-US" dirty="0"/>
@@ -9037,7 +9041,7 @@
           <a:p>
             <a:pPr lvl="0"/>
             <a:r>
-              <a:rPr lang="en-US" smtClean="0"/>
+              <a:rPr lang="en-US"/>
               <a:t>Click to edit Master text styles</a:t>
             </a:r>
           </a:p>
@@ -9060,7 +9064,7 @@
           <a:p>
             <a:fld id="{8AAA073D-A903-47F8-8D16-77642FB0DF1F}" type="datetimeFigureOut">
               <a:rPr lang="en-US" dirty="0"/>
-              <a:t>3/28/2020</a:t>
+              <a:t>4/1/2020</a:t>
             </a:fld>
             <a:endParaRPr lang="en-US" dirty="0"/>
           </a:p>
@@ -9190,7 +9194,7 @@
           <a:lstStyle/>
           <a:p>
             <a:r>
-              <a:rPr lang="en-US" smtClean="0"/>
+              <a:rPr lang="en-US"/>
               <a:t>Click to edit Master title style</a:t>
             </a:r>
             <a:endParaRPr lang="en-US" dirty="0"/>
@@ -9221,35 +9225,35 @@
           <a:p>
             <a:pPr lvl="0"/>
             <a:r>
-              <a:rPr lang="en-US" smtClean="0"/>
+              <a:rPr lang="en-US"/>
               <a:t>Click to edit Master text styles</a:t>
             </a:r>
           </a:p>
           <a:p>
             <a:pPr lvl="1"/>
             <a:r>
-              <a:rPr lang="en-US" smtClean="0"/>
+              <a:rPr lang="en-US"/>
               <a:t>Second level</a:t>
             </a:r>
           </a:p>
           <a:p>
             <a:pPr lvl="2"/>
             <a:r>
-              <a:rPr lang="en-US" smtClean="0"/>
+              <a:rPr lang="en-US"/>
               <a:t>Third level</a:t>
             </a:r>
           </a:p>
           <a:p>
             <a:pPr lvl="3"/>
             <a:r>
-              <a:rPr lang="en-US" smtClean="0"/>
+              <a:rPr lang="en-US"/>
               <a:t>Fourth level</a:t>
             </a:r>
           </a:p>
           <a:p>
             <a:pPr lvl="4"/>
             <a:r>
-              <a:rPr lang="en-US" smtClean="0"/>
+              <a:rPr lang="en-US"/>
               <a:t>Fifth level</a:t>
             </a:r>
             <a:endParaRPr lang="en-US" dirty="0"/>
@@ -9280,35 +9284,35 @@
           <a:p>
             <a:pPr lvl="0"/>
             <a:r>
-              <a:rPr lang="en-US" smtClean="0"/>
+              <a:rPr lang="en-US"/>
               <a:t>Click to edit Master text styles</a:t>
             </a:r>
           </a:p>
           <a:p>
             <a:pPr lvl="1"/>
             <a:r>
-              <a:rPr lang="en-US" smtClean="0"/>
+              <a:rPr lang="en-US"/>
               <a:t>Second level</a:t>
             </a:r>
           </a:p>
           <a:p>
             <a:pPr lvl="2"/>
             <a:r>
-              <a:rPr lang="en-US" smtClean="0"/>
+              <a:rPr lang="en-US"/>
               <a:t>Third level</a:t>
             </a:r>
           </a:p>
           <a:p>
             <a:pPr lvl="3"/>
             <a:r>
-              <a:rPr lang="en-US" smtClean="0"/>
+              <a:rPr lang="en-US"/>
               <a:t>Fourth level</a:t>
             </a:r>
           </a:p>
           <a:p>
             <a:pPr lvl="4"/>
             <a:r>
-              <a:rPr lang="en-US" smtClean="0"/>
+              <a:rPr lang="en-US"/>
               <a:t>Fifth level</a:t>
             </a:r>
             <a:endParaRPr lang="en-US" dirty="0"/>
@@ -9332,7 +9336,7 @@
           <a:p>
             <a:fld id="{AB91FA40-626B-4CA1-85D0-7A9016E395BA}" type="datetimeFigureOut">
               <a:rPr lang="en-US" dirty="0"/>
-              <a:t>3/28/2020</a:t>
+              <a:t>4/1/2020</a:t>
             </a:fld>
             <a:endParaRPr lang="en-US" dirty="0"/>
           </a:p>
@@ -9430,7 +9434,7 @@
           </a:lstStyle>
           <a:p>
             <a:r>
-              <a:rPr lang="en-US" smtClean="0"/>
+              <a:rPr lang="en-US"/>
               <a:t>Click to edit Master title style</a:t>
             </a:r>
             <a:endParaRPr lang="en-US" dirty="0"/>
@@ -9502,7 +9506,7 @@
           <a:p>
             <a:pPr lvl="0"/>
             <a:r>
-              <a:rPr lang="en-US" smtClean="0"/>
+              <a:rPr lang="en-US"/>
               <a:t>Click to edit Master text styles</a:t>
             </a:r>
           </a:p>
@@ -9532,35 +9536,35 @@
           <a:p>
             <a:pPr lvl="0"/>
             <a:r>
-              <a:rPr lang="en-US" smtClean="0"/>
+              <a:rPr lang="en-US"/>
               <a:t>Click to edit Master text styles</a:t>
             </a:r>
           </a:p>
           <a:p>
             <a:pPr lvl="1"/>
             <a:r>
-              <a:rPr lang="en-US" smtClean="0"/>
+              <a:rPr lang="en-US"/>
               <a:t>Second level</a:t>
             </a:r>
           </a:p>
           <a:p>
             <a:pPr lvl="2"/>
             <a:r>
-              <a:rPr lang="en-US" smtClean="0"/>
+              <a:rPr lang="en-US"/>
               <a:t>Third level</a:t>
             </a:r>
           </a:p>
           <a:p>
             <a:pPr lvl="3"/>
             <a:r>
-              <a:rPr lang="en-US" smtClean="0"/>
+              <a:rPr lang="en-US"/>
               <a:t>Fourth level</a:t>
             </a:r>
           </a:p>
           <a:p>
             <a:pPr lvl="4"/>
             <a:r>
-              <a:rPr lang="en-US" smtClean="0"/>
+              <a:rPr lang="en-US"/>
               <a:t>Fifth level</a:t>
             </a:r>
             <a:endParaRPr lang="en-US" dirty="0"/>
@@ -9632,7 +9636,7 @@
           <a:p>
             <a:pPr lvl="0"/>
             <a:r>
-              <a:rPr lang="en-US" smtClean="0"/>
+              <a:rPr lang="en-US"/>
               <a:t>Click to edit Master text styles</a:t>
             </a:r>
           </a:p>
@@ -9662,35 +9666,35 @@
           <a:p>
             <a:pPr lvl="0"/>
             <a:r>
-              <a:rPr lang="en-US" smtClean="0"/>
+              <a:rPr lang="en-US"/>
               <a:t>Click to edit Master text styles</a:t>
             </a:r>
           </a:p>
           <a:p>
             <a:pPr lvl="1"/>
             <a:r>
-              <a:rPr lang="en-US" smtClean="0"/>
+              <a:rPr lang="en-US"/>
               <a:t>Second level</a:t>
             </a:r>
           </a:p>
           <a:p>
             <a:pPr lvl="2"/>
             <a:r>
-              <a:rPr lang="en-US" smtClean="0"/>
+              <a:rPr lang="en-US"/>
               <a:t>Third level</a:t>
             </a:r>
           </a:p>
           <a:p>
             <a:pPr lvl="3"/>
             <a:r>
-              <a:rPr lang="en-US" smtClean="0"/>
+              <a:rPr lang="en-US"/>
               <a:t>Fourth level</a:t>
             </a:r>
           </a:p>
           <a:p>
             <a:pPr lvl="4"/>
             <a:r>
-              <a:rPr lang="en-US" smtClean="0"/>
+              <a:rPr lang="en-US"/>
               <a:t>Fifth level</a:t>
             </a:r>
             <a:endParaRPr lang="en-US" dirty="0"/>
@@ -9714,7 +9718,7 @@
           <a:p>
             <a:fld id="{C3F425EA-B9DC-48A7-991E-9A82573B1B21}" type="datetimeFigureOut">
               <a:rPr lang="en-US" dirty="0"/>
-              <a:t>3/28/2020</a:t>
+              <a:t>4/1/2020</a:t>
             </a:fld>
             <a:endParaRPr lang="en-US" dirty="0"/>
           </a:p>
@@ -9808,7 +9812,7 @@
           <a:lstStyle/>
           <a:p>
             <a:r>
-              <a:rPr lang="en-US" smtClean="0"/>
+              <a:rPr lang="en-US"/>
               <a:t>Click to edit Master title style</a:t>
             </a:r>
             <a:endParaRPr lang="en-US" dirty="0"/>
@@ -9832,7 +9836,7 @@
           <a:p>
             <a:fld id="{66CB97F8-6CEB-469B-AFCC-889F2A2B1D5A}" type="datetimeFigureOut">
               <a:rPr lang="en-US" dirty="0"/>
-              <a:t>3/28/2020</a:t>
+              <a:t>4/1/2020</a:t>
             </a:fld>
             <a:endParaRPr lang="en-US" dirty="0"/>
           </a:p>
@@ -9927,7 +9931,7 @@
           <a:p>
             <a:fld id="{8FA9179F-009E-4FA5-B091-7EBB82A185BD}" type="datetimeFigureOut">
               <a:rPr lang="en-US" dirty="0"/>
-              <a:t>3/28/2020</a:t>
+              <a:t>4/1/2020</a:t>
             </a:fld>
             <a:endParaRPr lang="en-US" dirty="0"/>
           </a:p>
@@ -10884,7 +10888,7 @@
           </a:lstStyle>
           <a:p>
             <a:r>
-              <a:rPr lang="en-US" smtClean="0"/>
+              <a:rPr lang="en-US"/>
               <a:t>Click to edit Master title style</a:t>
             </a:r>
             <a:endParaRPr lang="en-US" dirty="0"/>
@@ -10915,35 +10919,35 @@
           <a:p>
             <a:pPr lvl="0"/>
             <a:r>
-              <a:rPr lang="en-US" smtClean="0"/>
+              <a:rPr lang="en-US"/>
               <a:t>Click to edit Master text styles</a:t>
             </a:r>
           </a:p>
           <a:p>
             <a:pPr lvl="1"/>
             <a:r>
-              <a:rPr lang="en-US" smtClean="0"/>
+              <a:rPr lang="en-US"/>
               <a:t>Second level</a:t>
             </a:r>
           </a:p>
           <a:p>
             <a:pPr lvl="2"/>
             <a:r>
-              <a:rPr lang="en-US" smtClean="0"/>
+              <a:rPr lang="en-US"/>
               <a:t>Third level</a:t>
             </a:r>
           </a:p>
           <a:p>
             <a:pPr lvl="3"/>
             <a:r>
-              <a:rPr lang="en-US" smtClean="0"/>
+              <a:rPr lang="en-US"/>
               <a:t>Fourth level</a:t>
             </a:r>
           </a:p>
           <a:p>
             <a:pPr lvl="4"/>
             <a:r>
-              <a:rPr lang="en-US" smtClean="0"/>
+              <a:rPr lang="en-US"/>
               <a:t>Fifth level</a:t>
             </a:r>
             <a:endParaRPr lang="en-US" dirty="0"/>
@@ -11013,7 +11017,7 @@
           <a:p>
             <a:pPr lvl="0"/>
             <a:r>
-              <a:rPr lang="en-US" smtClean="0"/>
+              <a:rPr lang="en-US"/>
               <a:t>Click to edit Master text styles</a:t>
             </a:r>
           </a:p>
@@ -11036,7 +11040,7 @@
           <a:p>
             <a:fld id="{8E665CEB-0076-4E37-B880-BCEA9784DE0A}" type="datetimeFigureOut">
               <a:rPr lang="en-US" dirty="0"/>
-              <a:t>3/28/2020</a:t>
+              <a:t>4/1/2020</a:t>
             </a:fld>
             <a:endParaRPr lang="en-US" dirty="0"/>
           </a:p>
@@ -11995,7 +11999,7 @@
           </a:lstStyle>
           <a:p>
             <a:r>
-              <a:rPr lang="en-US" smtClean="0"/>
+              <a:rPr lang="en-US"/>
               <a:t>Click to edit Master title style</a:t>
             </a:r>
             <a:endParaRPr lang="en-US" dirty="0"/>
@@ -12074,7 +12078,7 @@
           </a:lstStyle>
           <a:p>
             <a:r>
-              <a:rPr lang="en-US" smtClean="0"/>
+              <a:rPr lang="en-US"/>
               <a:t>Click icon to add picture</a:t>
             </a:r>
             <a:endParaRPr lang="en-US" dirty="0"/>
@@ -12146,7 +12150,7 @@
           <a:p>
             <a:pPr lvl="0"/>
             <a:r>
-              <a:rPr lang="en-US" smtClean="0"/>
+              <a:rPr lang="en-US"/>
               <a:t>Click to edit Master text styles</a:t>
             </a:r>
           </a:p>
@@ -12169,7 +12173,7 @@
           <a:p>
             <a:fld id="{A6149E5E-3896-4118-99A7-7B85668F1C5E}" type="datetimeFigureOut">
               <a:rPr lang="en-US" dirty="0"/>
-              <a:t>3/28/2020</a:t>
+              <a:t>4/1/2020</a:t>
             </a:fld>
             <a:endParaRPr lang="en-US" dirty="0"/>
           </a:p>
@@ -13095,7 +13099,7 @@
           <a:lstStyle/>
           <a:p>
             <a:r>
-              <a:rPr lang="en-US" smtClean="0"/>
+              <a:rPr lang="en-US"/>
               <a:t>Click to edit Master title style</a:t>
             </a:r>
             <a:endParaRPr lang="en-US" dirty="0"/>
@@ -13129,35 +13133,35 @@
           <a:p>
             <a:pPr lvl="0"/>
             <a:r>
-              <a:rPr lang="en-US" smtClean="0"/>
+              <a:rPr lang="en-US"/>
               <a:t>Click to edit Master text styles</a:t>
             </a:r>
           </a:p>
           <a:p>
             <a:pPr lvl="1"/>
             <a:r>
-              <a:rPr lang="en-US" smtClean="0"/>
+              <a:rPr lang="en-US"/>
               <a:t>Second level</a:t>
             </a:r>
           </a:p>
           <a:p>
             <a:pPr lvl="2"/>
             <a:r>
-              <a:rPr lang="en-US" smtClean="0"/>
+              <a:rPr lang="en-US"/>
               <a:t>Third level</a:t>
             </a:r>
           </a:p>
           <a:p>
             <a:pPr lvl="3"/>
             <a:r>
-              <a:rPr lang="en-US" smtClean="0"/>
+              <a:rPr lang="en-US"/>
               <a:t>Fourth level</a:t>
             </a:r>
           </a:p>
           <a:p>
             <a:pPr lvl="4"/>
             <a:r>
-              <a:rPr lang="en-US" smtClean="0"/>
+              <a:rPr lang="en-US"/>
               <a:t>Fifth level</a:t>
             </a:r>
             <a:endParaRPr lang="en-US" dirty="0"/>
@@ -13197,7 +13201,7 @@
           <a:p>
             <a:fld id="{7E0D914D-B099-4142-A885-11F276715148}" type="datetimeFigureOut">
               <a:rPr lang="en-US" dirty="0"/>
-              <a:t>3/28/2020</a:t>
+              <a:t>4/1/2020</a:t>
             </a:fld>
             <a:endParaRPr lang="en-US" dirty="0"/>
           </a:p>
@@ -13822,21 +13826,21 @@
               <a:buChar char="•"/>
             </a:pPr>
             <a:r>
-              <a:rPr lang="en-US" sz="3200" b="1" dirty="0" smtClean="0">
+              <a:rPr lang="en-US" sz="3200" b="1" dirty="0">
                 <a:latin typeface="Times New Roman" panose="02020603050405020304" pitchFamily="18" charset="0"/>
                 <a:cs typeface="Times New Roman" panose="02020603050405020304" pitchFamily="18" charset="0"/>
               </a:rPr>
               <a:t>Jeff </a:t>
             </a:r>
             <a:r>
-              <a:rPr lang="en-US" sz="3200" b="1" dirty="0" err="1" smtClean="0">
+              <a:rPr lang="en-US" sz="3200" b="1" dirty="0" err="1">
                 <a:latin typeface="Times New Roman" panose="02020603050405020304" pitchFamily="18" charset="0"/>
                 <a:cs typeface="Times New Roman" panose="02020603050405020304" pitchFamily="18" charset="0"/>
               </a:rPr>
               <a:t>Eickholt</a:t>
             </a:r>
             <a:r>
-              <a:rPr lang="en-US" sz="3200" b="1" dirty="0" smtClean="0">
+              <a:rPr lang="en-US" sz="3200" b="1" dirty="0">
                 <a:latin typeface="Times New Roman" panose="02020603050405020304" pitchFamily="18" charset="0"/>
                 <a:cs typeface="Times New Roman" panose="02020603050405020304" pitchFamily="18" charset="0"/>
               </a:rPr>
@@ -13849,16 +13853,12 @@
               <a:buChar char="•"/>
             </a:pPr>
             <a:r>
-              <a:rPr lang="en-US" sz="3200" b="1" dirty="0" smtClean="0">
+              <a:rPr lang="en-US" sz="3200" b="1" dirty="0">
                 <a:latin typeface="Times New Roman" panose="02020603050405020304" pitchFamily="18" charset="0"/>
                 <a:cs typeface="Times New Roman" panose="02020603050405020304" pitchFamily="18" charset="0"/>
               </a:rPr>
               <a:t>Philip Wirth</a:t>
             </a:r>
-            <a:endParaRPr lang="en-US" sz="3200" b="1" dirty="0" smtClean="0">
-              <a:latin typeface="Times New Roman" panose="02020603050405020304" pitchFamily="18" charset="0"/>
-              <a:cs typeface="Times New Roman" panose="02020603050405020304" pitchFamily="18" charset="0"/>
-            </a:endParaRPr>
           </a:p>
           <a:p>
             <a:pPr marL="4114800" lvl="8" indent="-457200" algn="r">
@@ -13866,16 +13866,12 @@
               <a:buChar char="•"/>
             </a:pPr>
             <a:r>
-              <a:rPr lang="en-US" sz="3200" b="1" dirty="0" smtClean="0">
+              <a:rPr lang="en-US" sz="3200" b="1" dirty="0">
                 <a:latin typeface="Times New Roman" panose="02020603050405020304" pitchFamily="18" charset="0"/>
                 <a:cs typeface="Times New Roman" panose="02020603050405020304" pitchFamily="18" charset="0"/>
               </a:rPr>
               <a:t>Ruby Mittal</a:t>
             </a:r>
-            <a:endParaRPr lang="en-US" sz="3200" b="1" dirty="0">
-              <a:latin typeface="Times New Roman" panose="02020603050405020304" pitchFamily="18" charset="0"/>
-              <a:cs typeface="Times New Roman" panose="02020603050405020304" pitchFamily="18" charset="0"/>
-            </a:endParaRPr>
           </a:p>
         </p:txBody>
       </p:sp>
@@ -13922,7 +13918,7 @@
 </p:sld>
 </file>
 
-<file path=ppt/slides/slide2.xml><?xml version="1.0" encoding="utf-8"?>
+<file path=ppt/slides/slide10.xml><?xml version="1.0" encoding="utf-8"?>
 <p:sld xmlns:a="http://schemas.openxmlformats.org/drawingml/2006/main" xmlns:r="http://schemas.openxmlformats.org/officeDocument/2006/relationships" xmlns:p="http://schemas.openxmlformats.org/presentationml/2006/main">
   <p:cSld>
     <p:spTree>
@@ -13951,8 +13947,8 @@
         </p:nvSpPr>
         <p:spPr>
           <a:xfrm>
-            <a:off x="965478" y="2434442"/>
-            <a:ext cx="9478072" cy="3598223"/>
+            <a:off x="965477" y="2565070"/>
+            <a:ext cx="9478072" cy="3099460"/>
           </a:xfrm>
         </p:spPr>
         <p:txBody>
@@ -13968,75 +13964,34 @@
               </a:spcAft>
             </a:pPr>
             <a:r>
-              <a:rPr lang="en-US" sz="2400" dirty="0" smtClean="0">
+              <a:rPr lang="en-US" sz="4000" dirty="0">
                 <a:latin typeface="Times New Roman" panose="02020603050405020304" pitchFamily="18" charset="0"/>
                 <a:ea typeface="Calibri" panose="020F0502020204030204" pitchFamily="34" charset="0"/>
                 <a:cs typeface="Times New Roman" panose="02020603050405020304" pitchFamily="18" charset="0"/>
               </a:rPr>
-              <a:t>The </a:t>
+              <a:t>Thank you</a:t>
             </a:r>
-            <a:r>
-              <a:rPr lang="en-US" sz="2400" dirty="0">
+            <a:br>
+              <a:rPr lang="en-US" sz="4000" dirty="0">
                 <a:latin typeface="Times New Roman" panose="02020603050405020304" pitchFamily="18" charset="0"/>
                 <a:ea typeface="Calibri" panose="020F0502020204030204" pitchFamily="34" charset="0"/>
                 <a:cs typeface="Times New Roman" panose="02020603050405020304" pitchFamily="18" charset="0"/>
               </a:rPr>
-              <a:t>311 Houston Help and </a:t>
-            </a:r>
-            <a:r>
-              <a:rPr lang="en-US" sz="2400" dirty="0" smtClean="0">
-                <a:latin typeface="Times New Roman" panose="02020603050405020304" pitchFamily="18" charset="0"/>
-                <a:ea typeface="Calibri" panose="020F0502020204030204" pitchFamily="34" charset="0"/>
-                <a:cs typeface="Times New Roman" panose="02020603050405020304" pitchFamily="18" charset="0"/>
-              </a:rPr>
-              <a:t>Information </a:t>
-            </a:r>
-            <a:r>
-              <a:rPr lang="en-US" sz="2400" dirty="0">
-                <a:latin typeface="Times New Roman" panose="02020603050405020304" pitchFamily="18" charset="0"/>
-                <a:ea typeface="Calibri" panose="020F0502020204030204" pitchFamily="34" charset="0"/>
-                <a:cs typeface="Times New Roman" panose="02020603050405020304" pitchFamily="18" charset="0"/>
-              </a:rPr>
-              <a:t>Helpline puts City government at your fingertips </a:t>
-            </a:r>
-            <a:r>
-              <a:rPr lang="en-US" sz="2400" dirty="0" smtClean="0">
-                <a:latin typeface="Times New Roman" panose="02020603050405020304" pitchFamily="18" charset="0"/>
-                <a:ea typeface="Calibri" panose="020F0502020204030204" pitchFamily="34" charset="0"/>
-                <a:cs typeface="Times New Roman" panose="02020603050405020304" pitchFamily="18" charset="0"/>
-              </a:rPr>
-              <a:t> and </a:t>
-            </a:r>
-            <a:r>
-              <a:rPr lang="en-US" sz="2400" dirty="0">
-                <a:latin typeface="Times New Roman" panose="02020603050405020304" pitchFamily="18" charset="0"/>
-                <a:ea typeface="Calibri" panose="020F0502020204030204" pitchFamily="34" charset="0"/>
-                <a:cs typeface="Times New Roman" panose="02020603050405020304" pitchFamily="18" charset="0"/>
-              </a:rPr>
-              <a:t>you get answers, find the right person, or have your City service problem solved</a:t>
-            </a:r>
-            <a:r>
-              <a:rPr lang="en-US" sz="2400" dirty="0" smtClean="0">
-                <a:latin typeface="Times New Roman" panose="02020603050405020304" pitchFamily="18" charset="0"/>
-                <a:ea typeface="Calibri" panose="020F0502020204030204" pitchFamily="34" charset="0"/>
-                <a:cs typeface="Times New Roman" panose="02020603050405020304" pitchFamily="18" charset="0"/>
-              </a:rPr>
-              <a:t>.</a:t>
-            </a:r>
+            </a:br>
             <a:br>
-              <a:rPr lang="en-US" sz="2400" dirty="0" smtClean="0">
+              <a:rPr lang="en-US" sz="4000" dirty="0">
                 <a:latin typeface="Times New Roman" panose="02020603050405020304" pitchFamily="18" charset="0"/>
                 <a:ea typeface="Calibri" panose="020F0502020204030204" pitchFamily="34" charset="0"/>
                 <a:cs typeface="Times New Roman" panose="02020603050405020304" pitchFamily="18" charset="0"/>
               </a:rPr>
             </a:br>
             <a:r>
-              <a:rPr lang="en-US" sz="2400" dirty="0">
+              <a:rPr lang="en-US" sz="4000" dirty="0">
                 <a:latin typeface="Times New Roman" panose="02020603050405020304" pitchFamily="18" charset="0"/>
                 <a:ea typeface="Calibri" panose="020F0502020204030204" pitchFamily="34" charset="0"/>
                 <a:cs typeface="Times New Roman" panose="02020603050405020304" pitchFamily="18" charset="0"/>
               </a:rPr>
-              <a:t/>
+              <a:t>Any Questions ??</a:t>
             </a:r>
             <a:br>
               <a:rPr lang="en-US" sz="2400" dirty="0">
@@ -14045,54 +14000,8 @@
                 <a:cs typeface="Times New Roman" panose="02020603050405020304" pitchFamily="18" charset="0"/>
               </a:rPr>
             </a:br>
-            <a:r>
-              <a:rPr lang="en-US" sz="2400" dirty="0" smtClean="0">
-                <a:latin typeface="Times New Roman" panose="02020603050405020304" pitchFamily="18" charset="0"/>
-                <a:ea typeface="Calibri" panose="020F0502020204030204" pitchFamily="34" charset="0"/>
-                <a:cs typeface="Times New Roman" panose="02020603050405020304" pitchFamily="18" charset="0"/>
-              </a:rPr>
-              <a:t>*</a:t>
-            </a:r>
             <a:br>
-              <a:rPr lang="en-US" sz="2400" dirty="0" smtClean="0">
-                <a:latin typeface="Times New Roman" panose="02020603050405020304" pitchFamily="18" charset="0"/>
-                <a:ea typeface="Calibri" panose="020F0502020204030204" pitchFamily="34" charset="0"/>
-                <a:cs typeface="Times New Roman" panose="02020603050405020304" pitchFamily="18" charset="0"/>
-              </a:rPr>
-            </a:br>
-            <a:r>
-              <a:rPr lang="en-US" sz="2400" dirty="0" smtClean="0">
-                <a:latin typeface="Times New Roman" panose="02020603050405020304" pitchFamily="18" charset="0"/>
-                <a:ea typeface="Calibri" panose="020F0502020204030204" pitchFamily="34" charset="0"/>
-                <a:cs typeface="Times New Roman" panose="02020603050405020304" pitchFamily="18" charset="0"/>
-              </a:rPr>
-              <a:t>*</a:t>
-            </a:r>
-            <a:br>
-              <a:rPr lang="en-US" sz="2400" dirty="0" smtClean="0">
-                <a:latin typeface="Times New Roman" panose="02020603050405020304" pitchFamily="18" charset="0"/>
-                <a:ea typeface="Calibri" panose="020F0502020204030204" pitchFamily="34" charset="0"/>
-                <a:cs typeface="Times New Roman" panose="02020603050405020304" pitchFamily="18" charset="0"/>
-              </a:rPr>
-            </a:br>
-            <a:r>
-              <a:rPr lang="en-US" sz="2400" dirty="0" smtClean="0">
-                <a:latin typeface="Times New Roman" panose="02020603050405020304" pitchFamily="18" charset="0"/>
-                <a:ea typeface="Calibri" panose="020F0502020204030204" pitchFamily="34" charset="0"/>
-                <a:cs typeface="Times New Roman" panose="02020603050405020304" pitchFamily="18" charset="0"/>
-              </a:rPr>
-              <a:t>*</a:t>
-            </a:r>
-            <a:r>
-              <a:rPr lang="en-US" sz="2400" dirty="0" smtClean="0">
-                <a:latin typeface="Calibri" panose="020F0502020204030204" pitchFamily="34" charset="0"/>
-                <a:ea typeface="Calibri" panose="020F0502020204030204" pitchFamily="34" charset="0"/>
-                <a:cs typeface="Times New Roman" panose="02020603050405020304" pitchFamily="18" charset="0"/>
-              </a:rPr>
-              <a:t/>
-            </a:r>
-            <a:br>
-              <a:rPr lang="en-US" sz="2400" dirty="0" smtClean="0">
+              <a:rPr lang="en-US" sz="2400" dirty="0">
                 <a:latin typeface="Calibri" panose="020F0502020204030204" pitchFamily="34" charset="0"/>
                 <a:ea typeface="Calibri" panose="020F0502020204030204" pitchFamily="34" charset="0"/>
                 <a:cs typeface="Times New Roman" panose="02020603050405020304" pitchFamily="18" charset="0"/>
@@ -14139,7 +14048,7 @@
     </p:spTree>
     <p:extLst>
       <p:ext uri="{BB962C8B-B14F-4D97-AF65-F5344CB8AC3E}">
-        <p14:creationId xmlns:p14="http://schemas.microsoft.com/office/powerpoint/2010/main" val="1714448365"/>
+        <p14:creationId xmlns:p14="http://schemas.microsoft.com/office/powerpoint/2010/main" val="1343135250"/>
       </p:ext>
     </p:extLst>
   </p:cSld>
@@ -14149,7 +14058,7 @@
 </p:sld>
 </file>
 
-<file path=ppt/slides/slide3.xml><?xml version="1.0" encoding="utf-8"?>
+<file path=ppt/slides/slide2.xml><?xml version="1.0" encoding="utf-8"?>
 <p:sld xmlns:a="http://schemas.openxmlformats.org/drawingml/2006/main" xmlns:r="http://schemas.openxmlformats.org/officeDocument/2006/relationships" xmlns:p="http://schemas.openxmlformats.org/presentationml/2006/main">
   <p:cSld>
     <p:spTree>
@@ -14166,133 +14075,6 @@
           <a:chExt cx="0" cy="0"/>
         </a:xfrm>
       </p:grpSpPr>
-      <p:sp>
-        <p:nvSpPr>
-          <p:cNvPr id="2" name="Title 1"/>
-          <p:cNvSpPr>
-            <a:spLocks noGrp="1"/>
-          </p:cNvSpPr>
-          <p:nvPr>
-            <p:ph type="ctrTitle"/>
-          </p:nvPr>
-        </p:nvSpPr>
-        <p:spPr>
-          <a:xfrm>
-            <a:off x="965477" y="2712532"/>
-            <a:ext cx="9478072" cy="2838203"/>
-          </a:xfrm>
-        </p:spPr>
-        <p:txBody>
-          <a:bodyPr/>
-          <a:lstStyle/>
-          <a:p>
-            <a:pPr>
-              <a:lnSpc>
-                <a:spcPct val="107000"/>
-              </a:lnSpc>
-              <a:spcAft>
-                <a:spcPts val="800"/>
-              </a:spcAft>
-            </a:pPr>
-            <a:r>
-              <a:rPr lang="en-US" sz="4000" dirty="0" smtClean="0">
-                <a:latin typeface="Times New Roman" panose="02020603050405020304" pitchFamily="18" charset="0"/>
-                <a:ea typeface="Calibri" panose="020F0502020204030204" pitchFamily="34" charset="0"/>
-                <a:cs typeface="Times New Roman" panose="02020603050405020304" pitchFamily="18" charset="0"/>
-              </a:rPr>
-              <a:t>Database</a:t>
-            </a:r>
-            <a:r>
-              <a:rPr lang="en-US" sz="2400" dirty="0" smtClean="0">
-                <a:latin typeface="Times New Roman" panose="02020603050405020304" pitchFamily="18" charset="0"/>
-                <a:ea typeface="Calibri" panose="020F0502020204030204" pitchFamily="34" charset="0"/>
-                <a:cs typeface="Times New Roman" panose="02020603050405020304" pitchFamily="18" charset="0"/>
-              </a:rPr>
-              <a:t/>
-            </a:r>
-            <a:br>
-              <a:rPr lang="en-US" sz="2400" dirty="0" smtClean="0">
-                <a:latin typeface="Times New Roman" panose="02020603050405020304" pitchFamily="18" charset="0"/>
-                <a:ea typeface="Calibri" panose="020F0502020204030204" pitchFamily="34" charset="0"/>
-                <a:cs typeface="Times New Roman" panose="02020603050405020304" pitchFamily="18" charset="0"/>
-              </a:rPr>
-            </a:br>
-            <a:r>
-              <a:rPr lang="en-US" sz="2400" dirty="0">
-                <a:latin typeface="Times New Roman" panose="02020603050405020304" pitchFamily="18" charset="0"/>
-                <a:ea typeface="Calibri" panose="020F0502020204030204" pitchFamily="34" charset="0"/>
-                <a:cs typeface="Times New Roman" panose="02020603050405020304" pitchFamily="18" charset="0"/>
-              </a:rPr>
-              <a:t/>
-            </a:r>
-            <a:br>
-              <a:rPr lang="en-US" sz="2400" dirty="0">
-                <a:latin typeface="Times New Roman" panose="02020603050405020304" pitchFamily="18" charset="0"/>
-                <a:ea typeface="Calibri" panose="020F0502020204030204" pitchFamily="34" charset="0"/>
-                <a:cs typeface="Times New Roman" panose="02020603050405020304" pitchFamily="18" charset="0"/>
-              </a:rPr>
-            </a:br>
-            <a:r>
-              <a:rPr lang="en-US" sz="2400" dirty="0" smtClean="0">
-                <a:latin typeface="Times New Roman" panose="02020603050405020304" pitchFamily="18" charset="0"/>
-                <a:ea typeface="Calibri" panose="020F0502020204030204" pitchFamily="34" charset="0"/>
-                <a:cs typeface="Times New Roman" panose="02020603050405020304" pitchFamily="18" charset="0"/>
-              </a:rPr>
-              <a:t>*</a:t>
-            </a:r>
-            <a:br>
-              <a:rPr lang="en-US" sz="2400" dirty="0" smtClean="0">
-                <a:latin typeface="Times New Roman" panose="02020603050405020304" pitchFamily="18" charset="0"/>
-                <a:ea typeface="Calibri" panose="020F0502020204030204" pitchFamily="34" charset="0"/>
-                <a:cs typeface="Times New Roman" panose="02020603050405020304" pitchFamily="18" charset="0"/>
-              </a:rPr>
-            </a:br>
-            <a:r>
-              <a:rPr lang="en-US" sz="2400" dirty="0" smtClean="0">
-                <a:latin typeface="Times New Roman" panose="02020603050405020304" pitchFamily="18" charset="0"/>
-                <a:ea typeface="Calibri" panose="020F0502020204030204" pitchFamily="34" charset="0"/>
-                <a:cs typeface="Times New Roman" panose="02020603050405020304" pitchFamily="18" charset="0"/>
-              </a:rPr>
-              <a:t>*</a:t>
-            </a:r>
-            <a:br>
-              <a:rPr lang="en-US" sz="2400" dirty="0" smtClean="0">
-                <a:latin typeface="Times New Roman" panose="02020603050405020304" pitchFamily="18" charset="0"/>
-                <a:ea typeface="Calibri" panose="020F0502020204030204" pitchFamily="34" charset="0"/>
-                <a:cs typeface="Times New Roman" panose="02020603050405020304" pitchFamily="18" charset="0"/>
-              </a:rPr>
-            </a:br>
-            <a:r>
-              <a:rPr lang="en-US" sz="2400" dirty="0" smtClean="0">
-                <a:latin typeface="Times New Roman" panose="02020603050405020304" pitchFamily="18" charset="0"/>
-                <a:ea typeface="Calibri" panose="020F0502020204030204" pitchFamily="34" charset="0"/>
-                <a:cs typeface="Times New Roman" panose="02020603050405020304" pitchFamily="18" charset="0"/>
-              </a:rPr>
-              <a:t>*</a:t>
-            </a:r>
-            <a:r>
-              <a:rPr lang="en-US" sz="2400" dirty="0" smtClean="0">
-                <a:latin typeface="Calibri" panose="020F0502020204030204" pitchFamily="34" charset="0"/>
-                <a:ea typeface="Calibri" panose="020F0502020204030204" pitchFamily="34" charset="0"/>
-                <a:cs typeface="Times New Roman" panose="02020603050405020304" pitchFamily="18" charset="0"/>
-              </a:rPr>
-              <a:t/>
-            </a:r>
-            <a:br>
-              <a:rPr lang="en-US" sz="2400" dirty="0" smtClean="0">
-                <a:latin typeface="Calibri" panose="020F0502020204030204" pitchFamily="34" charset="0"/>
-                <a:ea typeface="Calibri" panose="020F0502020204030204" pitchFamily="34" charset="0"/>
-                <a:cs typeface="Times New Roman" panose="02020603050405020304" pitchFamily="18" charset="0"/>
-              </a:rPr>
-            </a:br>
-            <a:endParaRPr lang="en-US" sz="2400" dirty="0">
-              <a:latin typeface="Calibri" panose="020F0502020204030204" pitchFamily="34" charset="0"/>
-              <a:ea typeface="Calibri" panose="020F0502020204030204" pitchFamily="34" charset="0"/>
-              <a:cs typeface="Times New Roman" panose="02020603050405020304" pitchFamily="18" charset="0"/>
-            </a:endParaRPr>
-          </a:p>
-        </p:txBody>
-      </p:sp>
       <p:pic>
         <p:nvPicPr>
           <p:cNvPr id="5" name="Picture 4"/>
@@ -14323,6 +14105,2189 @@
           </a:prstGeom>
         </p:spPr>
       </p:pic>
+      <p:sp>
+        <p:nvSpPr>
+          <p:cNvPr id="6" name="Rectangle 5"/>
+          <p:cNvSpPr/>
+          <p:nvPr/>
+        </p:nvSpPr>
+        <p:spPr>
+          <a:xfrm>
+            <a:off x="965477" y="2712532"/>
+            <a:ext cx="9478072" cy="3416320"/>
+          </a:xfrm>
+          <a:prstGeom prst="rect">
+            <a:avLst/>
+          </a:prstGeom>
+        </p:spPr>
+        <p:txBody>
+          <a:bodyPr wrap="square">
+            <a:spAutoFit/>
+          </a:bodyPr>
+          <a:lstStyle/>
+          <a:p>
+            <a:r>
+              <a:rPr lang="en-US" sz="2400" dirty="0">
+                <a:solidFill>
+                  <a:schemeClr val="bg1"/>
+                </a:solidFill>
+                <a:latin typeface="Times New Roman" panose="02020603050405020304" pitchFamily="18" charset="0"/>
+                <a:ea typeface="Calibri" panose="020F0502020204030204" pitchFamily="34" charset="0"/>
+                <a:cs typeface="Times New Roman" panose="02020603050405020304" pitchFamily="18" charset="0"/>
+              </a:rPr>
+              <a:t>The 311 Houston Help and Information Helpline puts City government at your fingertips and you get answers, find the right person, or have your City service problem solved.</a:t>
+            </a:r>
+            <a:br>
+              <a:rPr lang="en-US" sz="2400" dirty="0">
+                <a:solidFill>
+                  <a:schemeClr val="bg1"/>
+                </a:solidFill>
+                <a:latin typeface="Times New Roman" panose="02020603050405020304" pitchFamily="18" charset="0"/>
+                <a:ea typeface="Calibri" panose="020F0502020204030204" pitchFamily="34" charset="0"/>
+                <a:cs typeface="Times New Roman" panose="02020603050405020304" pitchFamily="18" charset="0"/>
+              </a:rPr>
+            </a:br>
+            <a:endParaRPr lang="en-US" sz="2400" dirty="0">
+              <a:solidFill>
+                <a:schemeClr val="bg1"/>
+              </a:solidFill>
+              <a:ea typeface="+mj-ea"/>
+              <a:cs typeface="+mj-cs"/>
+            </a:endParaRPr>
+          </a:p>
+          <a:p>
+            <a:pPr marL="342900" indent="-342900">
+              <a:buFont typeface="Wingdings" panose="05000000000000000000" pitchFamily="2" charset="2"/>
+              <a:buChar char="v"/>
+            </a:pPr>
+            <a:r>
+              <a:rPr lang="en-US" dirty="0">
+                <a:solidFill>
+                  <a:schemeClr val="bg1"/>
+                </a:solidFill>
+                <a:latin typeface="Times New Roman" panose="02020603050405020304" pitchFamily="18" charset="0"/>
+                <a:ea typeface="Calibri" panose="020F0502020204030204" pitchFamily="34" charset="0"/>
+                <a:cs typeface="Times New Roman" panose="02020603050405020304" pitchFamily="18" charset="0"/>
+              </a:rPr>
+              <a:t>Houston citizens can call 311 or fill out an online form to report issue</a:t>
+            </a:r>
+          </a:p>
+          <a:p>
+            <a:pPr marL="342900" indent="-342900">
+              <a:buFont typeface="Wingdings" panose="05000000000000000000" pitchFamily="2" charset="2"/>
+              <a:buChar char="v"/>
+            </a:pPr>
+            <a:r>
+              <a:rPr lang="en-US" dirty="0">
+                <a:solidFill>
+                  <a:schemeClr val="bg1"/>
+                </a:solidFill>
+                <a:latin typeface="Times New Roman" panose="02020603050405020304" pitchFamily="18" charset="0"/>
+                <a:ea typeface="Calibri" panose="020F0502020204030204" pitchFamily="34" charset="0"/>
+                <a:cs typeface="Times New Roman" panose="02020603050405020304" pitchFamily="18" charset="0"/>
+              </a:rPr>
+              <a:t>Issues are logged when created and a due date is assigned; the closed date is logged when issue      resolved</a:t>
+            </a:r>
+          </a:p>
+          <a:p>
+            <a:pPr marL="342900" indent="-342900">
+              <a:buFont typeface="Wingdings" panose="05000000000000000000" pitchFamily="2" charset="2"/>
+              <a:buChar char="v"/>
+            </a:pPr>
+            <a:r>
+              <a:rPr lang="en-US" dirty="0">
+                <a:solidFill>
+                  <a:schemeClr val="bg1"/>
+                </a:solidFill>
+                <a:latin typeface="Times New Roman" panose="02020603050405020304" pitchFamily="18" charset="0"/>
+                <a:ea typeface="Calibri" panose="020F0502020204030204" pitchFamily="34" charset="0"/>
+                <a:cs typeface="Times New Roman" panose="02020603050405020304" pitchFamily="18" charset="0"/>
+              </a:rPr>
+              <a:t>There are about 350,000 to 400,000 request each year</a:t>
+            </a:r>
+          </a:p>
+          <a:p>
+            <a:endParaRPr lang="en-US" sz="2400" dirty="0">
+              <a:solidFill>
+                <a:schemeClr val="bg1"/>
+              </a:solidFill>
+            </a:endParaRPr>
+          </a:p>
+          <a:p>
+            <a:endParaRPr lang="en-US" sz="2400" dirty="0">
+              <a:solidFill>
+                <a:schemeClr val="bg1"/>
+              </a:solidFill>
+            </a:endParaRPr>
+          </a:p>
+        </p:txBody>
+      </p:sp>
+    </p:spTree>
+    <p:extLst>
+      <p:ext uri="{BB962C8B-B14F-4D97-AF65-F5344CB8AC3E}">
+        <p14:creationId xmlns:p14="http://schemas.microsoft.com/office/powerpoint/2010/main" val="1139404042"/>
+      </p:ext>
+    </p:extLst>
+  </p:cSld>
+  <p:clrMapOvr>
+    <a:masterClrMapping/>
+  </p:clrMapOvr>
+</p:sld>
+</file>
+
+<file path=ppt/slides/slide3.xml><?xml version="1.0" encoding="utf-8"?>
+<p:sld xmlns:a="http://schemas.openxmlformats.org/drawingml/2006/main" xmlns:r="http://schemas.openxmlformats.org/officeDocument/2006/relationships" xmlns:p="http://schemas.openxmlformats.org/presentationml/2006/main">
+  <p:cSld>
+    <p:spTree>
+      <p:nvGrpSpPr>
+        <p:cNvPr id="1" name=""/>
+        <p:cNvGrpSpPr/>
+        <p:nvPr/>
+      </p:nvGrpSpPr>
+      <p:grpSpPr>
+        <a:xfrm>
+          <a:off x="0" y="0"/>
+          <a:ext cx="0" cy="0"/>
+          <a:chOff x="0" y="0"/>
+          <a:chExt cx="0" cy="0"/>
+        </a:xfrm>
+      </p:grpSpPr>
+      <p:pic>
+        <p:nvPicPr>
+          <p:cNvPr id="5" name="Picture 4"/>
+          <p:cNvPicPr>
+            <a:picLocks noChangeAspect="1"/>
+          </p:cNvPicPr>
+          <p:nvPr/>
+        </p:nvPicPr>
+        <p:blipFill>
+          <a:blip r:embed="rId2">
+            <a:extLst>
+              <a:ext uri="{28A0092B-C50C-407E-A947-70E740481C1C}">
+                <a14:useLocalDpi xmlns:a14="http://schemas.microsoft.com/office/drawing/2010/main" val="0"/>
+              </a:ext>
+            </a:extLst>
+          </a:blip>
+          <a:stretch>
+            <a:fillRect/>
+          </a:stretch>
+        </p:blipFill>
+        <p:spPr>
+          <a:xfrm>
+            <a:off x="965477" y="753120"/>
+            <a:ext cx="9478072" cy="1959412"/>
+          </a:xfrm>
+          <a:prstGeom prst="rect">
+            <a:avLst/>
+          </a:prstGeom>
+        </p:spPr>
+      </p:pic>
+      <p:sp>
+        <p:nvSpPr>
+          <p:cNvPr id="6" name="Rectangle 5"/>
+          <p:cNvSpPr/>
+          <p:nvPr/>
+        </p:nvSpPr>
+        <p:spPr>
+          <a:xfrm>
+            <a:off x="965477" y="2228671"/>
+            <a:ext cx="9478072" cy="1200329"/>
+          </a:xfrm>
+          <a:prstGeom prst="rect">
+            <a:avLst/>
+          </a:prstGeom>
+        </p:spPr>
+        <p:txBody>
+          <a:bodyPr wrap="square">
+            <a:spAutoFit/>
+          </a:bodyPr>
+          <a:lstStyle/>
+          <a:p>
+            <a:r>
+              <a:rPr lang="en-US" sz="2400" dirty="0">
+                <a:solidFill>
+                  <a:srgbClr val="EBEBEB"/>
+                </a:solidFill>
+                <a:latin typeface="Times New Roman" panose="02020603050405020304" pitchFamily="18" charset="0"/>
+                <a:ea typeface="+mj-ea"/>
+                <a:cs typeface="Times New Roman" panose="02020603050405020304" pitchFamily="18" charset="0"/>
+              </a:rPr>
+              <a:t>Top Issues (2017 – 2019)</a:t>
+            </a:r>
+            <a:endParaRPr lang="en-US" sz="2400" dirty="0">
+              <a:solidFill>
+                <a:srgbClr val="EBEBEB"/>
+              </a:solidFill>
+              <a:ea typeface="+mj-ea"/>
+              <a:cs typeface="+mj-cs"/>
+            </a:endParaRPr>
+          </a:p>
+          <a:p>
+            <a:endParaRPr lang="en-US" sz="2400" dirty="0">
+              <a:solidFill>
+                <a:schemeClr val="bg1"/>
+              </a:solidFill>
+            </a:endParaRPr>
+          </a:p>
+          <a:p>
+            <a:endParaRPr lang="en-US" sz="2400" dirty="0">
+              <a:solidFill>
+                <a:schemeClr val="bg1"/>
+              </a:solidFill>
+            </a:endParaRPr>
+          </a:p>
+        </p:txBody>
+      </p:sp>
+      <p:graphicFrame>
+        <p:nvGraphicFramePr>
+          <p:cNvPr id="3" name="Table 3">
+            <a:extLst>
+              <a:ext uri="{FF2B5EF4-FFF2-40B4-BE49-F238E27FC236}">
+                <a16:creationId xmlns:a16="http://schemas.microsoft.com/office/drawing/2014/main" id="{DEFB6C61-0396-49C1-A950-3B9E25415696}"/>
+              </a:ext>
+            </a:extLst>
+          </p:cNvPr>
+          <p:cNvGraphicFramePr>
+            <a:graphicFrameLocks noGrp="1"/>
+          </p:cNvGraphicFramePr>
+          <p:nvPr>
+            <p:extLst>
+              <p:ext uri="{D42A27DB-BD31-4B8C-83A1-F6EECF244321}">
+                <p14:modId xmlns:p14="http://schemas.microsoft.com/office/powerpoint/2010/main" val="3558507886"/>
+              </p:ext>
+            </p:extLst>
+          </p:nvPr>
+        </p:nvGraphicFramePr>
+        <p:xfrm>
+          <a:off x="1210642" y="2712532"/>
+          <a:ext cx="8631024" cy="3459480"/>
+        </p:xfrm>
+        <a:graphic>
+          <a:graphicData uri="http://schemas.openxmlformats.org/drawingml/2006/table">
+            <a:tbl>
+              <a:tblPr firstRow="1" bandRow="1">
+                <a:tableStyleId>{00A15C55-8517-42AA-B614-E9B94910E393}</a:tableStyleId>
+              </a:tblPr>
+              <a:tblGrid>
+                <a:gridCol w="1737360">
+                  <a:extLst>
+                    <a:ext uri="{9D8B030D-6E8A-4147-A177-3AD203B41FA5}">
+                      <a16:colId xmlns:a16="http://schemas.microsoft.com/office/drawing/2014/main" val="3728148191"/>
+                    </a:ext>
+                  </a:extLst>
+                </a:gridCol>
+                <a:gridCol w="1188720">
+                  <a:extLst>
+                    <a:ext uri="{9D8B030D-6E8A-4147-A177-3AD203B41FA5}">
+                      <a16:colId xmlns:a16="http://schemas.microsoft.com/office/drawing/2014/main" val="3454429895"/>
+                    </a:ext>
+                  </a:extLst>
+                </a:gridCol>
+                <a:gridCol w="1188720">
+                  <a:extLst>
+                    <a:ext uri="{9D8B030D-6E8A-4147-A177-3AD203B41FA5}">
+                      <a16:colId xmlns:a16="http://schemas.microsoft.com/office/drawing/2014/main" val="1661784598"/>
+                    </a:ext>
+                  </a:extLst>
+                </a:gridCol>
+                <a:gridCol w="401424">
+                  <a:extLst>
+                    <a:ext uri="{9D8B030D-6E8A-4147-A177-3AD203B41FA5}">
+                      <a16:colId xmlns:a16="http://schemas.microsoft.com/office/drawing/2014/main" val="1850544297"/>
+                    </a:ext>
+                  </a:extLst>
+                </a:gridCol>
+                <a:gridCol w="1737360">
+                  <a:extLst>
+                    <a:ext uri="{9D8B030D-6E8A-4147-A177-3AD203B41FA5}">
+                      <a16:colId xmlns:a16="http://schemas.microsoft.com/office/drawing/2014/main" val="2497600869"/>
+                    </a:ext>
+                  </a:extLst>
+                </a:gridCol>
+                <a:gridCol w="1188720">
+                  <a:extLst>
+                    <a:ext uri="{9D8B030D-6E8A-4147-A177-3AD203B41FA5}">
+                      <a16:colId xmlns:a16="http://schemas.microsoft.com/office/drawing/2014/main" val="1382927686"/>
+                    </a:ext>
+                  </a:extLst>
+                </a:gridCol>
+                <a:gridCol w="1188720">
+                  <a:extLst>
+                    <a:ext uri="{9D8B030D-6E8A-4147-A177-3AD203B41FA5}">
+                      <a16:colId xmlns:a16="http://schemas.microsoft.com/office/drawing/2014/main" val="4207861450"/>
+                    </a:ext>
+                  </a:extLst>
+                </a:gridCol>
+              </a:tblGrid>
+              <a:tr h="0">
+                <a:tc>
+                  <a:txBody>
+                    <a:bodyPr/>
+                    <a:lstStyle/>
+                    <a:p>
+                      <a:r>
+                        <a:rPr lang="en-US" sz="1600" dirty="0"/>
+                        <a:t>Issue</a:t>
+                      </a:r>
+                    </a:p>
+                  </a:txBody>
+                  <a:tcPr/>
+                </a:tc>
+                <a:tc>
+                  <a:txBody>
+                    <a:bodyPr/>
+                    <a:lstStyle/>
+                    <a:p>
+                      <a:r>
+                        <a:rPr lang="en-US" sz="1600" dirty="0"/>
+                        <a:t>Count</a:t>
+                      </a:r>
+                    </a:p>
+                  </a:txBody>
+                  <a:tcPr/>
+                </a:tc>
+                <a:tc>
+                  <a:txBody>
+                    <a:bodyPr/>
+                    <a:lstStyle/>
+                    <a:p>
+                      <a:r>
+                        <a:rPr lang="en-US" sz="1600" dirty="0"/>
+                        <a:t>Day until Due(Avg)</a:t>
+                      </a:r>
+                    </a:p>
+                  </a:txBody>
+                  <a:tcPr/>
+                </a:tc>
+                <a:tc>
+                  <a:txBody>
+                    <a:bodyPr/>
+                    <a:lstStyle/>
+                    <a:p>
+                      <a:endParaRPr lang="en-US" dirty="0"/>
+                    </a:p>
+                  </a:txBody>
+                  <a:tcPr/>
+                </a:tc>
+                <a:tc>
+                  <a:txBody>
+                    <a:bodyPr/>
+                    <a:lstStyle/>
+                    <a:p>
+                      <a:r>
+                        <a:rPr lang="en-US" sz="1600" dirty="0"/>
+                        <a:t>Issue</a:t>
+                      </a:r>
+                    </a:p>
+                  </a:txBody>
+                  <a:tcPr/>
+                </a:tc>
+                <a:tc>
+                  <a:txBody>
+                    <a:bodyPr/>
+                    <a:lstStyle/>
+                    <a:p>
+                      <a:r>
+                        <a:rPr lang="en-US" sz="1600" dirty="0"/>
+                        <a:t>Count</a:t>
+                      </a:r>
+                    </a:p>
+                  </a:txBody>
+                  <a:tcPr/>
+                </a:tc>
+                <a:tc>
+                  <a:txBody>
+                    <a:bodyPr/>
+                    <a:lstStyle/>
+                    <a:p>
+                      <a:r>
+                        <a:rPr lang="en-US" sz="1600" dirty="0"/>
+                        <a:t>Day until Due(Avg)</a:t>
+                      </a:r>
+                    </a:p>
+                  </a:txBody>
+                  <a:tcPr/>
+                </a:tc>
+                <a:extLst>
+                  <a:ext uri="{0D108BD9-81ED-4DB2-BD59-A6C34878D82A}">
+                    <a16:rowId xmlns:a16="http://schemas.microsoft.com/office/drawing/2014/main" val="1158437450"/>
+                  </a:ext>
+                </a:extLst>
+              </a:tr>
+              <a:tr h="360045">
+                <a:tc>
+                  <a:txBody>
+                    <a:bodyPr/>
+                    <a:lstStyle/>
+                    <a:p>
+                      <a:pPr algn="l" fontAlgn="b"/>
+                      <a:r>
+                        <a:rPr lang="en-US" sz="1200" b="1" u="none" strike="noStrike" dirty="0">
+                          <a:effectLst/>
+                          <a:latin typeface="Times New Roman" panose="02020603050405020304" pitchFamily="18" charset="0"/>
+                          <a:cs typeface="Times New Roman" panose="02020603050405020304" pitchFamily="18" charset="0"/>
+                        </a:rPr>
+                        <a:t>Missed Garbage</a:t>
+                      </a:r>
+                      <a:endParaRPr lang="en-US" sz="1200" b="1" i="0" u="none" strike="noStrike" dirty="0">
+                        <a:solidFill>
+                          <a:srgbClr val="000000"/>
+                        </a:solidFill>
+                        <a:effectLst/>
+                        <a:latin typeface="Times New Roman" panose="02020603050405020304" pitchFamily="18" charset="0"/>
+                        <a:cs typeface="Times New Roman" panose="02020603050405020304" pitchFamily="18" charset="0"/>
+                      </a:endParaRPr>
+                    </a:p>
+                  </a:txBody>
+                  <a:tcPr marL="9525" marR="9525" marT="9525" marB="0" anchor="b"/>
+                </a:tc>
+                <a:tc>
+                  <a:txBody>
+                    <a:bodyPr/>
+                    <a:lstStyle/>
+                    <a:p>
+                      <a:pPr algn="l" fontAlgn="b"/>
+                      <a:r>
+                        <a:rPr lang="en-US" sz="1200" b="1" i="0" u="none" strike="noStrike" dirty="0">
+                          <a:solidFill>
+                            <a:srgbClr val="000000"/>
+                          </a:solidFill>
+                          <a:effectLst/>
+                          <a:latin typeface="Calibri" panose="020F0502020204030204" pitchFamily="34" charset="0"/>
+                        </a:rPr>
+                        <a:t>             82,063 </a:t>
+                      </a:r>
+                    </a:p>
+                  </a:txBody>
+                  <a:tcPr marL="9525" marR="9525" marT="9525" marB="0" anchor="b"/>
+                </a:tc>
+                <a:tc>
+                  <a:txBody>
+                    <a:bodyPr/>
+                    <a:lstStyle/>
+                    <a:p>
+                      <a:pPr algn="ctr" fontAlgn="b"/>
+                      <a:r>
+                        <a:rPr lang="en-US" sz="1200" b="1" i="0" u="none" strike="noStrike" dirty="0">
+                          <a:solidFill>
+                            <a:srgbClr val="000000"/>
+                          </a:solidFill>
+                          <a:effectLst/>
+                          <a:latin typeface="Calibri" panose="020F0502020204030204" pitchFamily="34" charset="0"/>
+                        </a:rPr>
+                        <a:t>6</a:t>
+                      </a:r>
+                    </a:p>
+                  </a:txBody>
+                  <a:tcPr marL="9525" marR="9525" marT="9525" marB="0" anchor="b"/>
+                </a:tc>
+                <a:tc>
+                  <a:txBody>
+                    <a:bodyPr/>
+                    <a:lstStyle/>
+                    <a:p>
+                      <a:endParaRPr lang="en-US" sz="1200" b="1" dirty="0"/>
+                    </a:p>
+                  </a:txBody>
+                  <a:tcPr/>
+                </a:tc>
+                <a:tc>
+                  <a:txBody>
+                    <a:bodyPr/>
+                    <a:lstStyle/>
+                    <a:p>
+                      <a:pPr algn="l" fontAlgn="b"/>
+                      <a:r>
+                        <a:rPr lang="en-US" sz="1200" b="1" u="none" strike="noStrike" dirty="0">
+                          <a:effectLst/>
+                          <a:latin typeface="Times New Roman" panose="02020603050405020304" pitchFamily="18" charset="0"/>
+                          <a:cs typeface="Times New Roman" panose="02020603050405020304" pitchFamily="18" charset="0"/>
+                        </a:rPr>
+                        <a:t>Street Hazard</a:t>
+                      </a:r>
+                      <a:endParaRPr lang="en-US" sz="1200" b="1" i="0" u="none" strike="noStrike" dirty="0">
+                        <a:solidFill>
+                          <a:srgbClr val="000000"/>
+                        </a:solidFill>
+                        <a:effectLst/>
+                        <a:latin typeface="Times New Roman" panose="02020603050405020304" pitchFamily="18" charset="0"/>
+                        <a:cs typeface="Times New Roman" panose="02020603050405020304" pitchFamily="18" charset="0"/>
+                      </a:endParaRPr>
+                    </a:p>
+                  </a:txBody>
+                  <a:tcPr marL="9525" marR="9525" marT="9525" marB="0" anchor="b"/>
+                </a:tc>
+                <a:tc>
+                  <a:txBody>
+                    <a:bodyPr/>
+                    <a:lstStyle/>
+                    <a:p>
+                      <a:pPr algn="l" fontAlgn="b"/>
+                      <a:r>
+                        <a:rPr lang="en-US" sz="1200" b="1" i="0" u="none" strike="noStrike" dirty="0">
+                          <a:solidFill>
+                            <a:srgbClr val="000000"/>
+                          </a:solidFill>
+                          <a:effectLst/>
+                          <a:latin typeface="Calibri" panose="020F0502020204030204" pitchFamily="34" charset="0"/>
+                        </a:rPr>
+                        <a:t>             32,746 </a:t>
+                      </a:r>
+                    </a:p>
+                  </a:txBody>
+                  <a:tcPr marL="9525" marR="9525" marT="9525" marB="0" anchor="b"/>
+                </a:tc>
+                <a:tc>
+                  <a:txBody>
+                    <a:bodyPr/>
+                    <a:lstStyle/>
+                    <a:p>
+                      <a:pPr algn="ctr" fontAlgn="b"/>
+                      <a:r>
+                        <a:rPr lang="en-US" sz="1200" b="1" i="0" u="none" strike="noStrike" dirty="0">
+                          <a:solidFill>
+                            <a:srgbClr val="000000"/>
+                          </a:solidFill>
+                          <a:effectLst/>
+                          <a:latin typeface="Calibri" panose="020F0502020204030204" pitchFamily="34" charset="0"/>
+                        </a:rPr>
+                        <a:t>10</a:t>
+                      </a:r>
+                    </a:p>
+                  </a:txBody>
+                  <a:tcPr marL="9525" marR="9525" marT="9525" marB="0" anchor="b"/>
+                </a:tc>
+                <a:extLst>
+                  <a:ext uri="{0D108BD9-81ED-4DB2-BD59-A6C34878D82A}">
+                    <a16:rowId xmlns:a16="http://schemas.microsoft.com/office/drawing/2014/main" val="641858960"/>
+                  </a:ext>
+                </a:extLst>
+              </a:tr>
+              <a:tr h="360045">
+                <a:tc>
+                  <a:txBody>
+                    <a:bodyPr/>
+                    <a:lstStyle/>
+                    <a:p>
+                      <a:pPr algn="l" fontAlgn="b"/>
+                      <a:r>
+                        <a:rPr lang="en-US" sz="1200" b="1" u="none" strike="noStrike" dirty="0">
+                          <a:effectLst/>
+                          <a:latin typeface="Times New Roman" panose="02020603050405020304" pitchFamily="18" charset="0"/>
+                          <a:cs typeface="Times New Roman" panose="02020603050405020304" pitchFamily="18" charset="0"/>
+                        </a:rPr>
+                        <a:t>Water Leak</a:t>
+                      </a:r>
+                      <a:endParaRPr lang="en-US" sz="1200" b="1" i="0" u="none" strike="noStrike" dirty="0">
+                        <a:solidFill>
+                          <a:srgbClr val="000000"/>
+                        </a:solidFill>
+                        <a:effectLst/>
+                        <a:latin typeface="Times New Roman" panose="02020603050405020304" pitchFamily="18" charset="0"/>
+                        <a:cs typeface="Times New Roman" panose="02020603050405020304" pitchFamily="18" charset="0"/>
+                      </a:endParaRPr>
+                    </a:p>
+                  </a:txBody>
+                  <a:tcPr marL="9525" marR="9525" marT="9525" marB="0" anchor="b"/>
+                </a:tc>
+                <a:tc>
+                  <a:txBody>
+                    <a:bodyPr/>
+                    <a:lstStyle/>
+                    <a:p>
+                      <a:pPr algn="l" fontAlgn="b"/>
+                      <a:r>
+                        <a:rPr lang="en-US" sz="1200" b="1" i="0" u="none" strike="noStrike" dirty="0">
+                          <a:solidFill>
+                            <a:srgbClr val="000000"/>
+                          </a:solidFill>
+                          <a:effectLst/>
+                          <a:latin typeface="Calibri" panose="020F0502020204030204" pitchFamily="34" charset="0"/>
+                        </a:rPr>
+                        <a:t>             74,707 </a:t>
+                      </a:r>
+                    </a:p>
+                  </a:txBody>
+                  <a:tcPr marL="9525" marR="9525" marT="9525" marB="0" anchor="b"/>
+                </a:tc>
+                <a:tc>
+                  <a:txBody>
+                    <a:bodyPr/>
+                    <a:lstStyle/>
+                    <a:p>
+                      <a:pPr algn="ctr" fontAlgn="b"/>
+                      <a:r>
+                        <a:rPr lang="en-US" sz="1200" b="1" i="0" u="none" strike="noStrike" dirty="0">
+                          <a:solidFill>
+                            <a:srgbClr val="000000"/>
+                          </a:solidFill>
+                          <a:effectLst/>
+                          <a:latin typeface="Calibri" panose="020F0502020204030204" pitchFamily="34" charset="0"/>
+                        </a:rPr>
+                        <a:t>10</a:t>
+                      </a:r>
+                    </a:p>
+                  </a:txBody>
+                  <a:tcPr marL="9525" marR="9525" marT="9525" marB="0" anchor="b"/>
+                </a:tc>
+                <a:tc>
+                  <a:txBody>
+                    <a:bodyPr/>
+                    <a:lstStyle/>
+                    <a:p>
+                      <a:endParaRPr lang="en-US" sz="1200" b="1" dirty="0"/>
+                    </a:p>
+                  </a:txBody>
+                  <a:tcPr/>
+                </a:tc>
+                <a:tc>
+                  <a:txBody>
+                    <a:bodyPr/>
+                    <a:lstStyle/>
+                    <a:p>
+                      <a:pPr algn="l" fontAlgn="b"/>
+                      <a:r>
+                        <a:rPr lang="en-US" sz="1200" b="1" u="none" strike="noStrike" dirty="0">
+                          <a:effectLst/>
+                          <a:latin typeface="Times New Roman" panose="02020603050405020304" pitchFamily="18" charset="0"/>
+                          <a:cs typeface="Times New Roman" panose="02020603050405020304" pitchFamily="18" charset="0"/>
+                        </a:rPr>
+                        <a:t>Drainage</a:t>
+                      </a:r>
+                      <a:endParaRPr lang="en-US" sz="1200" b="1" i="0" u="none" strike="noStrike" dirty="0">
+                        <a:solidFill>
+                          <a:srgbClr val="000000"/>
+                        </a:solidFill>
+                        <a:effectLst/>
+                        <a:latin typeface="Times New Roman" panose="02020603050405020304" pitchFamily="18" charset="0"/>
+                        <a:cs typeface="Times New Roman" panose="02020603050405020304" pitchFamily="18" charset="0"/>
+                      </a:endParaRPr>
+                    </a:p>
+                  </a:txBody>
+                  <a:tcPr marL="9525" marR="9525" marT="9525" marB="0" anchor="b"/>
+                </a:tc>
+                <a:tc>
+                  <a:txBody>
+                    <a:bodyPr/>
+                    <a:lstStyle/>
+                    <a:p>
+                      <a:pPr algn="l" fontAlgn="b"/>
+                      <a:r>
+                        <a:rPr lang="en-US" sz="1200" b="1" i="0" u="none" strike="noStrike" dirty="0">
+                          <a:solidFill>
+                            <a:srgbClr val="000000"/>
+                          </a:solidFill>
+                          <a:effectLst/>
+                          <a:latin typeface="Calibri" panose="020F0502020204030204" pitchFamily="34" charset="0"/>
+                        </a:rPr>
+                        <a:t>             28,840 </a:t>
+                      </a:r>
+                    </a:p>
+                  </a:txBody>
+                  <a:tcPr marL="9525" marR="9525" marT="9525" marB="0" anchor="b"/>
+                </a:tc>
+                <a:tc>
+                  <a:txBody>
+                    <a:bodyPr/>
+                    <a:lstStyle/>
+                    <a:p>
+                      <a:pPr algn="ctr" fontAlgn="b"/>
+                      <a:r>
+                        <a:rPr lang="en-US" sz="1200" b="1" i="0" u="none" strike="noStrike" dirty="0">
+                          <a:solidFill>
+                            <a:srgbClr val="000000"/>
+                          </a:solidFill>
+                          <a:effectLst/>
+                          <a:latin typeface="Calibri" panose="020F0502020204030204" pitchFamily="34" charset="0"/>
+                        </a:rPr>
+                        <a:t>30</a:t>
+                      </a:r>
+                    </a:p>
+                  </a:txBody>
+                  <a:tcPr marL="9525" marR="9525" marT="9525" marB="0" anchor="b"/>
+                </a:tc>
+                <a:extLst>
+                  <a:ext uri="{0D108BD9-81ED-4DB2-BD59-A6C34878D82A}">
+                    <a16:rowId xmlns:a16="http://schemas.microsoft.com/office/drawing/2014/main" val="4006077035"/>
+                  </a:ext>
+                </a:extLst>
+              </a:tr>
+              <a:tr h="360045">
+                <a:tc>
+                  <a:txBody>
+                    <a:bodyPr/>
+                    <a:lstStyle/>
+                    <a:p>
+                      <a:pPr algn="l" fontAlgn="b"/>
+                      <a:r>
+                        <a:rPr lang="en-US" sz="1200" b="1" u="none" strike="noStrike" dirty="0">
+                          <a:effectLst/>
+                          <a:latin typeface="Times New Roman" panose="02020603050405020304" pitchFamily="18" charset="0"/>
+                          <a:cs typeface="Times New Roman" panose="02020603050405020304" pitchFamily="18" charset="0"/>
+                        </a:rPr>
+                        <a:t>Container Problem</a:t>
+                      </a:r>
+                      <a:endParaRPr lang="en-US" sz="1200" b="1" i="0" u="none" strike="noStrike" dirty="0">
+                        <a:solidFill>
+                          <a:srgbClr val="000000"/>
+                        </a:solidFill>
+                        <a:effectLst/>
+                        <a:latin typeface="Times New Roman" panose="02020603050405020304" pitchFamily="18" charset="0"/>
+                        <a:cs typeface="Times New Roman" panose="02020603050405020304" pitchFamily="18" charset="0"/>
+                      </a:endParaRPr>
+                    </a:p>
+                  </a:txBody>
+                  <a:tcPr marL="9525" marR="9525" marT="9525" marB="0" anchor="b"/>
+                </a:tc>
+                <a:tc>
+                  <a:txBody>
+                    <a:bodyPr/>
+                    <a:lstStyle/>
+                    <a:p>
+                      <a:pPr algn="l" fontAlgn="b"/>
+                      <a:r>
+                        <a:rPr lang="en-US" sz="1200" b="1" i="0" u="none" strike="noStrike" dirty="0">
+                          <a:solidFill>
+                            <a:srgbClr val="000000"/>
+                          </a:solidFill>
+                          <a:effectLst/>
+                          <a:latin typeface="Calibri" panose="020F0502020204030204" pitchFamily="34" charset="0"/>
+                        </a:rPr>
+                        <a:t>             74,126 </a:t>
+                      </a:r>
+                    </a:p>
+                  </a:txBody>
+                  <a:tcPr marL="9525" marR="9525" marT="9525" marB="0" anchor="b"/>
+                </a:tc>
+                <a:tc>
+                  <a:txBody>
+                    <a:bodyPr/>
+                    <a:lstStyle/>
+                    <a:p>
+                      <a:pPr algn="ctr" fontAlgn="b"/>
+                      <a:r>
+                        <a:rPr lang="en-US" sz="1200" b="1" i="0" u="none" strike="noStrike" dirty="0">
+                          <a:solidFill>
+                            <a:srgbClr val="000000"/>
+                          </a:solidFill>
+                          <a:effectLst/>
+                          <a:latin typeface="Calibri" panose="020F0502020204030204" pitchFamily="34" charset="0"/>
+                        </a:rPr>
+                        <a:t>11</a:t>
+                      </a:r>
+                    </a:p>
+                  </a:txBody>
+                  <a:tcPr marL="9525" marR="9525" marT="9525" marB="0" anchor="b"/>
+                </a:tc>
+                <a:tc>
+                  <a:txBody>
+                    <a:bodyPr/>
+                    <a:lstStyle/>
+                    <a:p>
+                      <a:endParaRPr lang="en-US" sz="1200" b="1" dirty="0"/>
+                    </a:p>
+                  </a:txBody>
+                  <a:tcPr/>
+                </a:tc>
+                <a:tc>
+                  <a:txBody>
+                    <a:bodyPr/>
+                    <a:lstStyle/>
+                    <a:p>
+                      <a:pPr algn="l" fontAlgn="b"/>
+                      <a:r>
+                        <a:rPr lang="en-US" sz="1200" b="1" u="none" strike="noStrike" dirty="0">
+                          <a:effectLst/>
+                          <a:latin typeface="Times New Roman" panose="02020603050405020304" pitchFamily="18" charset="0"/>
+                          <a:cs typeface="Times New Roman" panose="02020603050405020304" pitchFamily="18" charset="0"/>
+                        </a:rPr>
+                        <a:t>Traffic Signal</a:t>
+                      </a:r>
+                      <a:endParaRPr lang="en-US" sz="1200" b="1" i="0" u="none" strike="noStrike" dirty="0">
+                        <a:solidFill>
+                          <a:srgbClr val="000000"/>
+                        </a:solidFill>
+                        <a:effectLst/>
+                        <a:latin typeface="Times New Roman" panose="02020603050405020304" pitchFamily="18" charset="0"/>
+                        <a:cs typeface="Times New Roman" panose="02020603050405020304" pitchFamily="18" charset="0"/>
+                      </a:endParaRPr>
+                    </a:p>
+                  </a:txBody>
+                  <a:tcPr marL="9525" marR="9525" marT="9525" marB="0" anchor="b"/>
+                </a:tc>
+                <a:tc>
+                  <a:txBody>
+                    <a:bodyPr/>
+                    <a:lstStyle/>
+                    <a:p>
+                      <a:pPr algn="l" fontAlgn="b"/>
+                      <a:r>
+                        <a:rPr lang="en-US" sz="1200" b="1" i="0" u="none" strike="noStrike" dirty="0">
+                          <a:solidFill>
+                            <a:srgbClr val="000000"/>
+                          </a:solidFill>
+                          <a:effectLst/>
+                          <a:latin typeface="Calibri" panose="020F0502020204030204" pitchFamily="34" charset="0"/>
+                        </a:rPr>
+                        <a:t>             27,753 </a:t>
+                      </a:r>
+                    </a:p>
+                  </a:txBody>
+                  <a:tcPr marL="9525" marR="9525" marT="9525" marB="0" anchor="b"/>
+                </a:tc>
+                <a:tc>
+                  <a:txBody>
+                    <a:bodyPr/>
+                    <a:lstStyle/>
+                    <a:p>
+                      <a:pPr algn="ctr" fontAlgn="b"/>
+                      <a:r>
+                        <a:rPr lang="en-US" sz="1200" b="1" i="0" u="none" strike="noStrike" dirty="0">
+                          <a:solidFill>
+                            <a:srgbClr val="000000"/>
+                          </a:solidFill>
+                          <a:effectLst/>
+                          <a:latin typeface="Calibri" panose="020F0502020204030204" pitchFamily="34" charset="0"/>
+                        </a:rPr>
+                        <a:t>1</a:t>
+                      </a:r>
+                    </a:p>
+                  </a:txBody>
+                  <a:tcPr marL="9525" marR="9525" marT="9525" marB="0" anchor="b"/>
+                </a:tc>
+                <a:extLst>
+                  <a:ext uri="{0D108BD9-81ED-4DB2-BD59-A6C34878D82A}">
+                    <a16:rowId xmlns:a16="http://schemas.microsoft.com/office/drawing/2014/main" val="1598901327"/>
+                  </a:ext>
+                </a:extLst>
+              </a:tr>
+              <a:tr h="360045">
+                <a:tc>
+                  <a:txBody>
+                    <a:bodyPr/>
+                    <a:lstStyle/>
+                    <a:p>
+                      <a:pPr algn="l" fontAlgn="b"/>
+                      <a:r>
+                        <a:rPr lang="en-US" sz="1200" b="1" u="none" strike="noStrike" dirty="0">
+                          <a:effectLst/>
+                          <a:latin typeface="Times New Roman" panose="02020603050405020304" pitchFamily="18" charset="0"/>
+                          <a:cs typeface="Times New Roman" panose="02020603050405020304" pitchFamily="18" charset="0"/>
+                        </a:rPr>
+                        <a:t>Sewer Wastewater</a:t>
+                      </a:r>
+                      <a:endParaRPr lang="en-US" sz="1200" b="1" i="0" u="none" strike="noStrike" dirty="0">
+                        <a:solidFill>
+                          <a:srgbClr val="000000"/>
+                        </a:solidFill>
+                        <a:effectLst/>
+                        <a:latin typeface="Times New Roman" panose="02020603050405020304" pitchFamily="18" charset="0"/>
+                        <a:cs typeface="Times New Roman" panose="02020603050405020304" pitchFamily="18" charset="0"/>
+                      </a:endParaRPr>
+                    </a:p>
+                  </a:txBody>
+                  <a:tcPr marL="9525" marR="9525" marT="9525" marB="0" anchor="b"/>
+                </a:tc>
+                <a:tc>
+                  <a:txBody>
+                    <a:bodyPr/>
+                    <a:lstStyle/>
+                    <a:p>
+                      <a:pPr algn="l" fontAlgn="b"/>
+                      <a:r>
+                        <a:rPr lang="en-US" sz="1200" b="1" i="0" u="none" strike="noStrike" dirty="0">
+                          <a:solidFill>
+                            <a:srgbClr val="000000"/>
+                          </a:solidFill>
+                          <a:effectLst/>
+                          <a:latin typeface="Calibri" panose="020F0502020204030204" pitchFamily="34" charset="0"/>
+                        </a:rPr>
+                        <a:t>             66,549 </a:t>
+                      </a:r>
+                    </a:p>
+                  </a:txBody>
+                  <a:tcPr marL="9525" marR="9525" marT="9525" marB="0" anchor="b"/>
+                </a:tc>
+                <a:tc>
+                  <a:txBody>
+                    <a:bodyPr/>
+                    <a:lstStyle/>
+                    <a:p>
+                      <a:pPr algn="ctr" fontAlgn="b"/>
+                      <a:r>
+                        <a:rPr lang="en-US" sz="1200" b="1" i="0" u="none" strike="noStrike" dirty="0">
+                          <a:solidFill>
+                            <a:srgbClr val="000000"/>
+                          </a:solidFill>
+                          <a:effectLst/>
+                          <a:latin typeface="Calibri" panose="020F0502020204030204" pitchFamily="34" charset="0"/>
+                        </a:rPr>
+                        <a:t>1</a:t>
+                      </a:r>
+                    </a:p>
+                  </a:txBody>
+                  <a:tcPr marL="9525" marR="9525" marT="9525" marB="0" anchor="b"/>
+                </a:tc>
+                <a:tc>
+                  <a:txBody>
+                    <a:bodyPr/>
+                    <a:lstStyle/>
+                    <a:p>
+                      <a:endParaRPr lang="en-US" sz="1200" b="1" dirty="0"/>
+                    </a:p>
+                  </a:txBody>
+                  <a:tcPr/>
+                </a:tc>
+                <a:tc>
+                  <a:txBody>
+                    <a:bodyPr/>
+                    <a:lstStyle/>
+                    <a:p>
+                      <a:pPr algn="l" fontAlgn="b"/>
+                      <a:r>
+                        <a:rPr lang="en-US" sz="1200" b="1" u="none" strike="noStrike" dirty="0">
+                          <a:effectLst/>
+                          <a:latin typeface="Times New Roman" panose="02020603050405020304" pitchFamily="18" charset="0"/>
+                          <a:cs typeface="Times New Roman" panose="02020603050405020304" pitchFamily="18" charset="0"/>
+                        </a:rPr>
+                        <a:t>SWM Escalation</a:t>
+                      </a:r>
+                      <a:endParaRPr lang="en-US" sz="1200" b="1" i="0" u="none" strike="noStrike" dirty="0">
+                        <a:solidFill>
+                          <a:srgbClr val="000000"/>
+                        </a:solidFill>
+                        <a:effectLst/>
+                        <a:latin typeface="Times New Roman" panose="02020603050405020304" pitchFamily="18" charset="0"/>
+                        <a:cs typeface="Times New Roman" panose="02020603050405020304" pitchFamily="18" charset="0"/>
+                      </a:endParaRPr>
+                    </a:p>
+                  </a:txBody>
+                  <a:tcPr marL="9525" marR="9525" marT="9525" marB="0" anchor="b"/>
+                </a:tc>
+                <a:tc>
+                  <a:txBody>
+                    <a:bodyPr/>
+                    <a:lstStyle/>
+                    <a:p>
+                      <a:pPr algn="l" fontAlgn="b"/>
+                      <a:r>
+                        <a:rPr lang="en-US" sz="1200" b="1" i="0" u="none" strike="noStrike" dirty="0">
+                          <a:solidFill>
+                            <a:srgbClr val="000000"/>
+                          </a:solidFill>
+                          <a:effectLst/>
+                          <a:latin typeface="Calibri" panose="020F0502020204030204" pitchFamily="34" charset="0"/>
+                        </a:rPr>
+                        <a:t>             26,293 </a:t>
+                      </a:r>
+                    </a:p>
+                  </a:txBody>
+                  <a:tcPr marL="9525" marR="9525" marT="9525" marB="0" anchor="b"/>
+                </a:tc>
+                <a:tc>
+                  <a:txBody>
+                    <a:bodyPr/>
+                    <a:lstStyle/>
+                    <a:p>
+                      <a:pPr algn="ctr" fontAlgn="b"/>
+                      <a:r>
+                        <a:rPr lang="en-US" sz="1200" b="1" i="0" u="none" strike="noStrike" dirty="0">
+                          <a:solidFill>
+                            <a:srgbClr val="000000"/>
+                          </a:solidFill>
+                          <a:effectLst/>
+                          <a:latin typeface="Calibri" panose="020F0502020204030204" pitchFamily="34" charset="0"/>
+                        </a:rPr>
+                        <a:t>5</a:t>
+                      </a:r>
+                    </a:p>
+                  </a:txBody>
+                  <a:tcPr marL="9525" marR="9525" marT="9525" marB="0" anchor="b"/>
+                </a:tc>
+                <a:extLst>
+                  <a:ext uri="{0D108BD9-81ED-4DB2-BD59-A6C34878D82A}">
+                    <a16:rowId xmlns:a16="http://schemas.microsoft.com/office/drawing/2014/main" val="3000849543"/>
+                  </a:ext>
+                </a:extLst>
+              </a:tr>
+              <a:tr h="360045">
+                <a:tc>
+                  <a:txBody>
+                    <a:bodyPr/>
+                    <a:lstStyle/>
+                    <a:p>
+                      <a:pPr algn="l" fontAlgn="b"/>
+                      <a:r>
+                        <a:rPr lang="en-US" sz="1200" b="1" u="none" strike="noStrike" dirty="0">
+                          <a:effectLst/>
+                          <a:latin typeface="Times New Roman" panose="02020603050405020304" pitchFamily="18" charset="0"/>
+                          <a:cs typeface="Times New Roman" panose="02020603050405020304" pitchFamily="18" charset="0"/>
+                        </a:rPr>
+                        <a:t>Nuisance on Property</a:t>
+                      </a:r>
+                      <a:endParaRPr lang="en-US" sz="1200" b="1" i="0" u="none" strike="noStrike" dirty="0">
+                        <a:solidFill>
+                          <a:srgbClr val="000000"/>
+                        </a:solidFill>
+                        <a:effectLst/>
+                        <a:latin typeface="Times New Roman" panose="02020603050405020304" pitchFamily="18" charset="0"/>
+                        <a:cs typeface="Times New Roman" panose="02020603050405020304" pitchFamily="18" charset="0"/>
+                      </a:endParaRPr>
+                    </a:p>
+                  </a:txBody>
+                  <a:tcPr marL="9525" marR="9525" marT="9525" marB="0" anchor="b"/>
+                </a:tc>
+                <a:tc>
+                  <a:txBody>
+                    <a:bodyPr/>
+                    <a:lstStyle/>
+                    <a:p>
+                      <a:pPr algn="l" fontAlgn="b"/>
+                      <a:r>
+                        <a:rPr lang="en-US" sz="1200" b="1" i="0" u="none" strike="noStrike" dirty="0">
+                          <a:solidFill>
+                            <a:srgbClr val="000000"/>
+                          </a:solidFill>
+                          <a:effectLst/>
+                          <a:latin typeface="Calibri" panose="020F0502020204030204" pitchFamily="34" charset="0"/>
+                        </a:rPr>
+                        <a:t>             57,571 </a:t>
+                      </a:r>
+                    </a:p>
+                  </a:txBody>
+                  <a:tcPr marL="9525" marR="9525" marT="9525" marB="0" anchor="b"/>
+                </a:tc>
+                <a:tc>
+                  <a:txBody>
+                    <a:bodyPr/>
+                    <a:lstStyle/>
+                    <a:p>
+                      <a:pPr algn="ctr" fontAlgn="b"/>
+                      <a:r>
+                        <a:rPr lang="en-US" sz="1200" b="1" i="0" u="none" strike="noStrike" dirty="0">
+                          <a:solidFill>
+                            <a:srgbClr val="000000"/>
+                          </a:solidFill>
+                          <a:effectLst/>
+                          <a:latin typeface="Calibri" panose="020F0502020204030204" pitchFamily="34" charset="0"/>
+                        </a:rPr>
+                        <a:t>254</a:t>
+                      </a:r>
+                    </a:p>
+                  </a:txBody>
+                  <a:tcPr marL="9525" marR="9525" marT="9525" marB="0" anchor="b"/>
+                </a:tc>
+                <a:tc>
+                  <a:txBody>
+                    <a:bodyPr/>
+                    <a:lstStyle/>
+                    <a:p>
+                      <a:endParaRPr lang="en-US" sz="1200" b="1" dirty="0"/>
+                    </a:p>
+                  </a:txBody>
+                  <a:tcPr/>
+                </a:tc>
+                <a:tc>
+                  <a:txBody>
+                    <a:bodyPr/>
+                    <a:lstStyle/>
+                    <a:p>
+                      <a:pPr algn="l" fontAlgn="b"/>
+                      <a:r>
+                        <a:rPr lang="en-US" sz="1200" b="1" u="none" strike="noStrike" dirty="0">
+                          <a:effectLst/>
+                          <a:latin typeface="Times New Roman" panose="02020603050405020304" pitchFamily="18" charset="0"/>
+                          <a:cs typeface="Times New Roman" panose="02020603050405020304" pitchFamily="18" charset="0"/>
+                        </a:rPr>
+                        <a:t>Traffic Signs</a:t>
+                      </a:r>
+                      <a:endParaRPr lang="en-US" sz="1200" b="1" i="0" u="none" strike="noStrike" dirty="0">
+                        <a:solidFill>
+                          <a:srgbClr val="000000"/>
+                        </a:solidFill>
+                        <a:effectLst/>
+                        <a:latin typeface="Times New Roman" panose="02020603050405020304" pitchFamily="18" charset="0"/>
+                        <a:cs typeface="Times New Roman" panose="02020603050405020304" pitchFamily="18" charset="0"/>
+                      </a:endParaRPr>
+                    </a:p>
+                  </a:txBody>
+                  <a:tcPr marL="9525" marR="9525" marT="9525" marB="0" anchor="b"/>
+                </a:tc>
+                <a:tc>
+                  <a:txBody>
+                    <a:bodyPr/>
+                    <a:lstStyle/>
+                    <a:p>
+                      <a:pPr algn="l" fontAlgn="b"/>
+                      <a:r>
+                        <a:rPr lang="en-US" sz="1200" b="1" i="0" u="none" strike="noStrike" dirty="0">
+                          <a:solidFill>
+                            <a:srgbClr val="000000"/>
+                          </a:solidFill>
+                          <a:effectLst/>
+                          <a:latin typeface="Calibri" panose="020F0502020204030204" pitchFamily="34" charset="0"/>
+                        </a:rPr>
+                        <a:t>             23,198 </a:t>
+                      </a:r>
+                    </a:p>
+                  </a:txBody>
+                  <a:tcPr marL="9525" marR="9525" marT="9525" marB="0" anchor="b"/>
+                </a:tc>
+                <a:tc>
+                  <a:txBody>
+                    <a:bodyPr/>
+                    <a:lstStyle/>
+                    <a:p>
+                      <a:pPr algn="ctr" fontAlgn="b"/>
+                      <a:r>
+                        <a:rPr lang="en-US" sz="1200" b="1" i="0" u="none" strike="noStrike" dirty="0">
+                          <a:solidFill>
+                            <a:srgbClr val="000000"/>
+                          </a:solidFill>
+                          <a:effectLst/>
+                          <a:latin typeface="Calibri" panose="020F0502020204030204" pitchFamily="34" charset="0"/>
+                        </a:rPr>
+                        <a:t>16</a:t>
+                      </a:r>
+                    </a:p>
+                  </a:txBody>
+                  <a:tcPr marL="9525" marR="9525" marT="9525" marB="0" anchor="b"/>
+                </a:tc>
+                <a:extLst>
+                  <a:ext uri="{0D108BD9-81ED-4DB2-BD59-A6C34878D82A}">
+                    <a16:rowId xmlns:a16="http://schemas.microsoft.com/office/drawing/2014/main" val="3270717341"/>
+                  </a:ext>
+                </a:extLst>
+              </a:tr>
+              <a:tr h="360045">
+                <a:tc>
+                  <a:txBody>
+                    <a:bodyPr/>
+                    <a:lstStyle/>
+                    <a:p>
+                      <a:pPr algn="l" fontAlgn="b"/>
+                      <a:r>
+                        <a:rPr lang="en-US" sz="1200" b="1" u="none" strike="noStrike" dirty="0">
+                          <a:effectLst/>
+                          <a:latin typeface="Times New Roman" panose="02020603050405020304" pitchFamily="18" charset="0"/>
+                          <a:cs typeface="Times New Roman" panose="02020603050405020304" pitchFamily="18" charset="0"/>
+                        </a:rPr>
+                        <a:t>Missed Recycling</a:t>
+                      </a:r>
+                      <a:endParaRPr lang="en-US" sz="1200" b="1" i="0" u="none" strike="noStrike" dirty="0">
+                        <a:solidFill>
+                          <a:srgbClr val="000000"/>
+                        </a:solidFill>
+                        <a:effectLst/>
+                        <a:latin typeface="Times New Roman" panose="02020603050405020304" pitchFamily="18" charset="0"/>
+                        <a:cs typeface="Times New Roman" panose="02020603050405020304" pitchFamily="18" charset="0"/>
+                      </a:endParaRPr>
+                    </a:p>
+                  </a:txBody>
+                  <a:tcPr marL="9525" marR="9525" marT="9525" marB="0" anchor="b"/>
+                </a:tc>
+                <a:tc>
+                  <a:txBody>
+                    <a:bodyPr/>
+                    <a:lstStyle/>
+                    <a:p>
+                      <a:pPr algn="l" fontAlgn="b"/>
+                      <a:r>
+                        <a:rPr lang="en-US" sz="1200" b="1" i="0" u="none" strike="noStrike" dirty="0">
+                          <a:solidFill>
+                            <a:srgbClr val="000000"/>
+                          </a:solidFill>
+                          <a:effectLst/>
+                          <a:latin typeface="Calibri" panose="020F0502020204030204" pitchFamily="34" charset="0"/>
+                        </a:rPr>
+                        <a:t>             54,796 </a:t>
+                      </a:r>
+                    </a:p>
+                  </a:txBody>
+                  <a:tcPr marL="9525" marR="9525" marT="9525" marB="0" anchor="b"/>
+                </a:tc>
+                <a:tc>
+                  <a:txBody>
+                    <a:bodyPr/>
+                    <a:lstStyle/>
+                    <a:p>
+                      <a:pPr algn="ctr" fontAlgn="b"/>
+                      <a:r>
+                        <a:rPr lang="en-US" sz="1200" b="1" i="0" u="none" strike="noStrike" dirty="0">
+                          <a:solidFill>
+                            <a:srgbClr val="000000"/>
+                          </a:solidFill>
+                          <a:effectLst/>
+                          <a:latin typeface="Calibri" panose="020F0502020204030204" pitchFamily="34" charset="0"/>
+                        </a:rPr>
+                        <a:t>6</a:t>
+                      </a:r>
+                    </a:p>
+                  </a:txBody>
+                  <a:tcPr marL="9525" marR="9525" marT="9525" marB="0" anchor="b"/>
+                </a:tc>
+                <a:tc>
+                  <a:txBody>
+                    <a:bodyPr/>
+                    <a:lstStyle/>
+                    <a:p>
+                      <a:endParaRPr lang="en-US" sz="1200" b="1" dirty="0"/>
+                    </a:p>
+                  </a:txBody>
+                  <a:tcPr/>
+                </a:tc>
+                <a:tc>
+                  <a:txBody>
+                    <a:bodyPr/>
+                    <a:lstStyle/>
+                    <a:p>
+                      <a:pPr algn="l" fontAlgn="b"/>
+                      <a:r>
+                        <a:rPr lang="en-US" sz="1200" b="1" u="none" strike="noStrike" dirty="0">
+                          <a:effectLst/>
+                          <a:latin typeface="Times New Roman" panose="02020603050405020304" pitchFamily="18" charset="0"/>
+                          <a:cs typeface="Times New Roman" panose="02020603050405020304" pitchFamily="18" charset="0"/>
+                        </a:rPr>
+                        <a:t>Street Condition</a:t>
+                      </a:r>
+                      <a:endParaRPr lang="en-US" sz="1200" b="1" i="0" u="none" strike="noStrike" dirty="0">
+                        <a:solidFill>
+                          <a:srgbClr val="000000"/>
+                        </a:solidFill>
+                        <a:effectLst/>
+                        <a:latin typeface="Times New Roman" panose="02020603050405020304" pitchFamily="18" charset="0"/>
+                        <a:cs typeface="Times New Roman" panose="02020603050405020304" pitchFamily="18" charset="0"/>
+                      </a:endParaRPr>
+                    </a:p>
+                  </a:txBody>
+                  <a:tcPr marL="9525" marR="9525" marT="9525" marB="0" anchor="b"/>
+                </a:tc>
+                <a:tc>
+                  <a:txBody>
+                    <a:bodyPr/>
+                    <a:lstStyle/>
+                    <a:p>
+                      <a:pPr algn="l" fontAlgn="b"/>
+                      <a:r>
+                        <a:rPr lang="en-US" sz="1200" b="1" i="0" u="none" strike="noStrike" dirty="0">
+                          <a:solidFill>
+                            <a:srgbClr val="000000"/>
+                          </a:solidFill>
+                          <a:effectLst/>
+                          <a:latin typeface="Calibri" panose="020F0502020204030204" pitchFamily="34" charset="0"/>
+                        </a:rPr>
+                        <a:t>             19,651 </a:t>
+                      </a:r>
+                    </a:p>
+                  </a:txBody>
+                  <a:tcPr marL="9525" marR="9525" marT="9525" marB="0" anchor="b"/>
+                </a:tc>
+                <a:tc>
+                  <a:txBody>
+                    <a:bodyPr/>
+                    <a:lstStyle/>
+                    <a:p>
+                      <a:pPr algn="ctr" fontAlgn="b"/>
+                      <a:r>
+                        <a:rPr lang="en-US" sz="1200" b="1" i="0" u="none" strike="noStrike" dirty="0">
+                          <a:solidFill>
+                            <a:srgbClr val="000000"/>
+                          </a:solidFill>
+                          <a:effectLst/>
+                          <a:latin typeface="Calibri" panose="020F0502020204030204" pitchFamily="34" charset="0"/>
+                        </a:rPr>
+                        <a:t>30</a:t>
+                      </a:r>
+                    </a:p>
+                  </a:txBody>
+                  <a:tcPr marL="9525" marR="9525" marT="9525" marB="0" anchor="b"/>
+                </a:tc>
+                <a:extLst>
+                  <a:ext uri="{0D108BD9-81ED-4DB2-BD59-A6C34878D82A}">
+                    <a16:rowId xmlns:a16="http://schemas.microsoft.com/office/drawing/2014/main" val="3590617018"/>
+                  </a:ext>
+                </a:extLst>
+              </a:tr>
+              <a:tr h="360045">
+                <a:tc>
+                  <a:txBody>
+                    <a:bodyPr/>
+                    <a:lstStyle/>
+                    <a:p>
+                      <a:pPr algn="l" fontAlgn="b"/>
+                      <a:r>
+                        <a:rPr lang="en-US" sz="1200" b="1" u="none" strike="noStrike" dirty="0">
+                          <a:effectLst/>
+                          <a:latin typeface="Times New Roman" panose="02020603050405020304" pitchFamily="18" charset="0"/>
+                          <a:cs typeface="Times New Roman" panose="02020603050405020304" pitchFamily="18" charset="0"/>
+                        </a:rPr>
+                        <a:t>Missed Heavy Trash</a:t>
+                      </a:r>
+                      <a:endParaRPr lang="en-US" sz="1200" b="1" i="0" u="none" strike="noStrike" dirty="0">
+                        <a:solidFill>
+                          <a:srgbClr val="000000"/>
+                        </a:solidFill>
+                        <a:effectLst/>
+                        <a:latin typeface="Times New Roman" panose="02020603050405020304" pitchFamily="18" charset="0"/>
+                        <a:cs typeface="Times New Roman" panose="02020603050405020304" pitchFamily="18" charset="0"/>
+                      </a:endParaRPr>
+                    </a:p>
+                  </a:txBody>
+                  <a:tcPr marL="9525" marR="9525" marT="9525" marB="0" anchor="b"/>
+                </a:tc>
+                <a:tc>
+                  <a:txBody>
+                    <a:bodyPr/>
+                    <a:lstStyle/>
+                    <a:p>
+                      <a:pPr algn="l" fontAlgn="b"/>
+                      <a:r>
+                        <a:rPr lang="en-US" sz="1200" b="1" i="0" u="none" strike="noStrike" dirty="0">
+                          <a:solidFill>
+                            <a:srgbClr val="000000"/>
+                          </a:solidFill>
+                          <a:effectLst/>
+                          <a:latin typeface="Calibri" panose="020F0502020204030204" pitchFamily="34" charset="0"/>
+                        </a:rPr>
+                        <a:t>             45,476 </a:t>
+                      </a:r>
+                    </a:p>
+                  </a:txBody>
+                  <a:tcPr marL="9525" marR="9525" marT="9525" marB="0" anchor="b"/>
+                </a:tc>
+                <a:tc>
+                  <a:txBody>
+                    <a:bodyPr/>
+                    <a:lstStyle/>
+                    <a:p>
+                      <a:pPr algn="ctr" fontAlgn="b"/>
+                      <a:r>
+                        <a:rPr lang="en-US" sz="1200" b="1" i="0" u="none" strike="noStrike" dirty="0">
+                          <a:solidFill>
+                            <a:srgbClr val="000000"/>
+                          </a:solidFill>
+                          <a:effectLst/>
+                          <a:latin typeface="Calibri" panose="020F0502020204030204" pitchFamily="34" charset="0"/>
+                        </a:rPr>
+                        <a:t>11</a:t>
+                      </a:r>
+                    </a:p>
+                  </a:txBody>
+                  <a:tcPr marL="9525" marR="9525" marT="9525" marB="0" anchor="b"/>
+                </a:tc>
+                <a:tc>
+                  <a:txBody>
+                    <a:bodyPr/>
+                    <a:lstStyle/>
+                    <a:p>
+                      <a:endParaRPr lang="en-US" sz="1200" b="1" dirty="0"/>
+                    </a:p>
+                  </a:txBody>
+                  <a:tcPr/>
+                </a:tc>
+                <a:tc>
+                  <a:txBody>
+                    <a:bodyPr/>
+                    <a:lstStyle/>
+                    <a:p>
+                      <a:pPr algn="l" fontAlgn="b"/>
+                      <a:r>
+                        <a:rPr lang="en-US" sz="1200" b="1" u="none" strike="noStrike" dirty="0">
+                          <a:effectLst/>
+                          <a:latin typeface="Times New Roman" panose="02020603050405020304" pitchFamily="18" charset="0"/>
+                          <a:cs typeface="Times New Roman" panose="02020603050405020304" pitchFamily="18" charset="0"/>
+                        </a:rPr>
+                        <a:t>Storm Debris Collection</a:t>
+                      </a:r>
+                      <a:endParaRPr lang="en-US" sz="1200" b="1" i="0" u="none" strike="noStrike" dirty="0">
+                        <a:solidFill>
+                          <a:srgbClr val="000000"/>
+                        </a:solidFill>
+                        <a:effectLst/>
+                        <a:latin typeface="Times New Roman" panose="02020603050405020304" pitchFamily="18" charset="0"/>
+                        <a:cs typeface="Times New Roman" panose="02020603050405020304" pitchFamily="18" charset="0"/>
+                      </a:endParaRPr>
+                    </a:p>
+                  </a:txBody>
+                  <a:tcPr marL="9525" marR="9525" marT="9525" marB="0" anchor="b"/>
+                </a:tc>
+                <a:tc>
+                  <a:txBody>
+                    <a:bodyPr/>
+                    <a:lstStyle/>
+                    <a:p>
+                      <a:pPr algn="l" fontAlgn="b"/>
+                      <a:r>
+                        <a:rPr lang="en-US" sz="1200" b="1" i="0" u="none" strike="noStrike" dirty="0">
+                          <a:solidFill>
+                            <a:srgbClr val="000000"/>
+                          </a:solidFill>
+                          <a:effectLst/>
+                          <a:latin typeface="Calibri" panose="020F0502020204030204" pitchFamily="34" charset="0"/>
+                        </a:rPr>
+                        <a:t>             12,816 </a:t>
+                      </a:r>
+                    </a:p>
+                  </a:txBody>
+                  <a:tcPr marL="9525" marR="9525" marT="9525" marB="0" anchor="b"/>
+                </a:tc>
+                <a:tc>
+                  <a:txBody>
+                    <a:bodyPr/>
+                    <a:lstStyle/>
+                    <a:p>
+                      <a:pPr algn="ctr" fontAlgn="b"/>
+                      <a:r>
+                        <a:rPr lang="en-US" sz="1200" b="1" i="0" u="none" strike="noStrike" dirty="0">
+                          <a:solidFill>
+                            <a:srgbClr val="000000"/>
+                          </a:solidFill>
+                          <a:effectLst/>
+                          <a:latin typeface="Calibri" panose="020F0502020204030204" pitchFamily="34" charset="0"/>
+                        </a:rPr>
+                        <a:t>5</a:t>
+                      </a:r>
+                    </a:p>
+                  </a:txBody>
+                  <a:tcPr marL="9525" marR="9525" marT="9525" marB="0" anchor="b"/>
+                </a:tc>
+                <a:extLst>
+                  <a:ext uri="{0D108BD9-81ED-4DB2-BD59-A6C34878D82A}">
+                    <a16:rowId xmlns:a16="http://schemas.microsoft.com/office/drawing/2014/main" val="3062575506"/>
+                  </a:ext>
+                </a:extLst>
+              </a:tr>
+              <a:tr h="360045">
+                <a:tc>
+                  <a:txBody>
+                    <a:bodyPr/>
+                    <a:lstStyle/>
+                    <a:p>
+                      <a:pPr algn="l" fontAlgn="b"/>
+                      <a:r>
+                        <a:rPr lang="en-US" sz="1200" b="1" u="none" strike="noStrike" dirty="0">
+                          <a:effectLst/>
+                          <a:latin typeface="Times New Roman" panose="02020603050405020304" pitchFamily="18" charset="0"/>
+                          <a:cs typeface="Times New Roman" panose="02020603050405020304" pitchFamily="18" charset="0"/>
+                        </a:rPr>
+                        <a:t>Water Service</a:t>
+                      </a:r>
+                      <a:endParaRPr lang="en-US" sz="1200" b="1" i="0" u="none" strike="noStrike" dirty="0">
+                        <a:solidFill>
+                          <a:srgbClr val="000000"/>
+                        </a:solidFill>
+                        <a:effectLst/>
+                        <a:latin typeface="Times New Roman" panose="02020603050405020304" pitchFamily="18" charset="0"/>
+                        <a:cs typeface="Times New Roman" panose="02020603050405020304" pitchFamily="18" charset="0"/>
+                      </a:endParaRPr>
+                    </a:p>
+                  </a:txBody>
+                  <a:tcPr marL="9525" marR="9525" marT="9525" marB="0" anchor="b"/>
+                </a:tc>
+                <a:tc>
+                  <a:txBody>
+                    <a:bodyPr/>
+                    <a:lstStyle/>
+                    <a:p>
+                      <a:pPr algn="l" fontAlgn="b"/>
+                      <a:r>
+                        <a:rPr lang="en-US" sz="1200" b="1" i="0" u="none" strike="noStrike" dirty="0">
+                          <a:solidFill>
+                            <a:srgbClr val="000000"/>
+                          </a:solidFill>
+                          <a:effectLst/>
+                          <a:latin typeface="Calibri" panose="020F0502020204030204" pitchFamily="34" charset="0"/>
+                        </a:rPr>
+                        <a:t>             35,341 </a:t>
+                      </a:r>
+                    </a:p>
+                  </a:txBody>
+                  <a:tcPr marL="9525" marR="9525" marT="9525" marB="0" anchor="b"/>
+                </a:tc>
+                <a:tc>
+                  <a:txBody>
+                    <a:bodyPr/>
+                    <a:lstStyle/>
+                    <a:p>
+                      <a:pPr algn="ctr" fontAlgn="b"/>
+                      <a:r>
+                        <a:rPr lang="en-US" sz="1200" b="1" i="0" u="none" strike="noStrike" dirty="0">
+                          <a:solidFill>
+                            <a:srgbClr val="000000"/>
+                          </a:solidFill>
+                          <a:effectLst/>
+                          <a:latin typeface="Calibri" panose="020F0502020204030204" pitchFamily="34" charset="0"/>
+                        </a:rPr>
+                        <a:t>2</a:t>
+                      </a:r>
+                    </a:p>
+                  </a:txBody>
+                  <a:tcPr marL="9525" marR="9525" marT="9525" marB="0" anchor="b"/>
+                </a:tc>
+                <a:tc>
+                  <a:txBody>
+                    <a:bodyPr/>
+                    <a:lstStyle/>
+                    <a:p>
+                      <a:endParaRPr lang="en-US" sz="1200" b="1" dirty="0"/>
+                    </a:p>
+                  </a:txBody>
+                  <a:tcPr/>
+                </a:tc>
+                <a:tc>
+                  <a:txBody>
+                    <a:bodyPr/>
+                    <a:lstStyle/>
+                    <a:p>
+                      <a:endParaRPr lang="en-US" sz="1200" b="1" dirty="0">
+                        <a:latin typeface="Times New Roman" panose="02020603050405020304" pitchFamily="18" charset="0"/>
+                        <a:cs typeface="Times New Roman" panose="02020603050405020304" pitchFamily="18" charset="0"/>
+                      </a:endParaRPr>
+                    </a:p>
+                  </a:txBody>
+                  <a:tcPr/>
+                </a:tc>
+                <a:tc>
+                  <a:txBody>
+                    <a:bodyPr/>
+                    <a:lstStyle/>
+                    <a:p>
+                      <a:pPr algn="l"/>
+                      <a:endParaRPr lang="en-US" sz="1200" b="1" dirty="0"/>
+                    </a:p>
+                  </a:txBody>
+                  <a:tcPr/>
+                </a:tc>
+                <a:tc>
+                  <a:txBody>
+                    <a:bodyPr/>
+                    <a:lstStyle/>
+                    <a:p>
+                      <a:pPr algn="ctr"/>
+                      <a:endParaRPr lang="en-US" sz="1200" b="1" dirty="0"/>
+                    </a:p>
+                  </a:txBody>
+                  <a:tcPr/>
+                </a:tc>
+                <a:extLst>
+                  <a:ext uri="{0D108BD9-81ED-4DB2-BD59-A6C34878D82A}">
+                    <a16:rowId xmlns:a16="http://schemas.microsoft.com/office/drawing/2014/main" val="340670456"/>
+                  </a:ext>
+                </a:extLst>
+              </a:tr>
+            </a:tbl>
+          </a:graphicData>
+        </a:graphic>
+      </p:graphicFrame>
+    </p:spTree>
+    <p:extLst>
+      <p:ext uri="{BB962C8B-B14F-4D97-AF65-F5344CB8AC3E}">
+        <p14:creationId xmlns:p14="http://schemas.microsoft.com/office/powerpoint/2010/main" val="2348135689"/>
+      </p:ext>
+    </p:extLst>
+  </p:cSld>
+  <p:clrMapOvr>
+    <a:masterClrMapping/>
+  </p:clrMapOvr>
+</p:sld>
+</file>
+
+<file path=ppt/slides/slide4.xml><?xml version="1.0" encoding="utf-8"?>
+<p:sld xmlns:a="http://schemas.openxmlformats.org/drawingml/2006/main" xmlns:r="http://schemas.openxmlformats.org/officeDocument/2006/relationships" xmlns:p="http://schemas.openxmlformats.org/presentationml/2006/main">
+  <p:cSld>
+    <p:spTree>
+      <p:nvGrpSpPr>
+        <p:cNvPr id="1" name=""/>
+        <p:cNvGrpSpPr/>
+        <p:nvPr/>
+      </p:nvGrpSpPr>
+      <p:grpSpPr>
+        <a:xfrm>
+          <a:off x="0" y="0"/>
+          <a:ext cx="0" cy="0"/>
+          <a:chOff x="0" y="0"/>
+          <a:chExt cx="0" cy="0"/>
+        </a:xfrm>
+      </p:grpSpPr>
+      <p:pic>
+        <p:nvPicPr>
+          <p:cNvPr id="5" name="Picture 4"/>
+          <p:cNvPicPr>
+            <a:picLocks noChangeAspect="1"/>
+          </p:cNvPicPr>
+          <p:nvPr/>
+        </p:nvPicPr>
+        <p:blipFill>
+          <a:blip r:embed="rId2">
+            <a:extLst>
+              <a:ext uri="{28A0092B-C50C-407E-A947-70E740481C1C}">
+                <a14:useLocalDpi xmlns:a14="http://schemas.microsoft.com/office/drawing/2010/main" val="0"/>
+              </a:ext>
+            </a:extLst>
+          </a:blip>
+          <a:stretch>
+            <a:fillRect/>
+          </a:stretch>
+        </p:blipFill>
+        <p:spPr>
+          <a:xfrm>
+            <a:off x="965477" y="753120"/>
+            <a:ext cx="9478072" cy="1959412"/>
+          </a:xfrm>
+          <a:prstGeom prst="rect">
+            <a:avLst/>
+          </a:prstGeom>
+        </p:spPr>
+      </p:pic>
+      <p:sp>
+        <p:nvSpPr>
+          <p:cNvPr id="6" name="Rectangle 5"/>
+          <p:cNvSpPr/>
+          <p:nvPr/>
+        </p:nvSpPr>
+        <p:spPr>
+          <a:xfrm>
+            <a:off x="965477" y="2712532"/>
+            <a:ext cx="9478072" cy="3477875"/>
+          </a:xfrm>
+          <a:prstGeom prst="rect">
+            <a:avLst/>
+          </a:prstGeom>
+        </p:spPr>
+        <p:txBody>
+          <a:bodyPr wrap="square">
+            <a:spAutoFit/>
+          </a:bodyPr>
+          <a:lstStyle/>
+          <a:p>
+            <a:r>
+              <a:rPr lang="en-US" sz="4000" dirty="0">
+                <a:solidFill>
+                  <a:srgbClr val="EBEBEB"/>
+                </a:solidFill>
+                <a:latin typeface="Times New Roman" panose="02020603050405020304" pitchFamily="18" charset="0"/>
+                <a:ea typeface="+mj-ea"/>
+                <a:cs typeface="Times New Roman" panose="02020603050405020304" pitchFamily="18" charset="0"/>
+              </a:rPr>
+              <a:t>Analysis</a:t>
+            </a:r>
+            <a:endParaRPr lang="en-US" sz="2400" dirty="0">
+              <a:solidFill>
+                <a:srgbClr val="EBEBEB"/>
+              </a:solidFill>
+              <a:ea typeface="+mj-ea"/>
+              <a:cs typeface="+mj-cs"/>
+            </a:endParaRPr>
+          </a:p>
+          <a:p>
+            <a:endParaRPr lang="en-US" sz="2400" dirty="0">
+              <a:solidFill>
+                <a:schemeClr val="bg1"/>
+              </a:solidFill>
+              <a:ea typeface="+mj-ea"/>
+              <a:cs typeface="+mj-cs"/>
+            </a:endParaRPr>
+          </a:p>
+          <a:p>
+            <a:pPr marL="342900" indent="-342900">
+              <a:buFont typeface="Wingdings" panose="05000000000000000000" pitchFamily="2" charset="2"/>
+              <a:buChar char="v"/>
+            </a:pPr>
+            <a:r>
+              <a:rPr lang="en-US" dirty="0">
+                <a:solidFill>
+                  <a:schemeClr val="bg1"/>
+                </a:solidFill>
+                <a:ea typeface="+mj-ea"/>
+                <a:cs typeface="+mj-cs"/>
+              </a:rPr>
+              <a:t>Goal of Analysis:  Identify factors that impact whether issue is closed by the due date or not</a:t>
+            </a:r>
+          </a:p>
+          <a:p>
+            <a:pPr marL="342900" indent="-342900">
+              <a:buFont typeface="Wingdings" panose="05000000000000000000" pitchFamily="2" charset="2"/>
+              <a:buChar char="v"/>
+            </a:pPr>
+            <a:r>
+              <a:rPr lang="en-US" dirty="0">
+                <a:solidFill>
+                  <a:schemeClr val="bg1"/>
+                </a:solidFill>
+                <a:ea typeface="+mj-ea"/>
+                <a:cs typeface="+mj-cs"/>
+              </a:rPr>
+              <a:t>Factors Considered:</a:t>
+            </a:r>
+          </a:p>
+          <a:p>
+            <a:pPr marL="800100" lvl="1" indent="-342900">
+              <a:buFont typeface="Wingdings" panose="05000000000000000000" pitchFamily="2" charset="2"/>
+              <a:buChar char="v"/>
+            </a:pPr>
+            <a:r>
+              <a:rPr lang="en-US" dirty="0">
+                <a:solidFill>
+                  <a:schemeClr val="bg1"/>
+                </a:solidFill>
+              </a:rPr>
+              <a:t>Type of Issue</a:t>
+            </a:r>
+            <a:endParaRPr lang="en-US" dirty="0">
+              <a:solidFill>
+                <a:schemeClr val="bg1"/>
+              </a:solidFill>
+              <a:ea typeface="+mj-ea"/>
+              <a:cs typeface="+mj-cs"/>
+            </a:endParaRPr>
+          </a:p>
+          <a:p>
+            <a:pPr marL="800100" lvl="1" indent="-342900">
+              <a:buFont typeface="Wingdings" panose="05000000000000000000" pitchFamily="2" charset="2"/>
+              <a:buChar char="v"/>
+            </a:pPr>
+            <a:r>
+              <a:rPr lang="en-US" dirty="0">
+                <a:solidFill>
+                  <a:schemeClr val="bg1"/>
+                </a:solidFill>
+                <a:ea typeface="+mj-ea"/>
+                <a:cs typeface="+mj-cs"/>
+              </a:rPr>
+              <a:t>Socioeconomic factors</a:t>
+            </a:r>
+          </a:p>
+          <a:p>
+            <a:pPr marL="800100" lvl="1" indent="-342900">
+              <a:buFont typeface="Wingdings" panose="05000000000000000000" pitchFamily="2" charset="2"/>
+              <a:buChar char="v"/>
+            </a:pPr>
+            <a:r>
+              <a:rPr lang="en-US" dirty="0">
+                <a:solidFill>
+                  <a:schemeClr val="bg1"/>
+                </a:solidFill>
+                <a:ea typeface="+mj-ea"/>
+                <a:cs typeface="+mj-cs"/>
+              </a:rPr>
+              <a:t>Weather</a:t>
+            </a:r>
+          </a:p>
+          <a:p>
+            <a:endParaRPr lang="en-US" sz="2400" dirty="0">
+              <a:solidFill>
+                <a:schemeClr val="bg1"/>
+              </a:solidFill>
+            </a:endParaRPr>
+          </a:p>
+          <a:p>
+            <a:endParaRPr lang="en-US" sz="2400" dirty="0">
+              <a:solidFill>
+                <a:schemeClr val="bg1"/>
+              </a:solidFill>
+            </a:endParaRPr>
+          </a:p>
+        </p:txBody>
+      </p:sp>
+    </p:spTree>
+    <p:extLst>
+      <p:ext uri="{BB962C8B-B14F-4D97-AF65-F5344CB8AC3E}">
+        <p14:creationId xmlns:p14="http://schemas.microsoft.com/office/powerpoint/2010/main" val="1715361934"/>
+      </p:ext>
+    </p:extLst>
+  </p:cSld>
+  <p:clrMapOvr>
+    <a:masterClrMapping/>
+  </p:clrMapOvr>
+</p:sld>
+</file>
+
+<file path=ppt/slides/slide5.xml><?xml version="1.0" encoding="utf-8"?>
+<p:sld xmlns:a="http://schemas.openxmlformats.org/drawingml/2006/main" xmlns:r="http://schemas.openxmlformats.org/officeDocument/2006/relationships" xmlns:p="http://schemas.openxmlformats.org/presentationml/2006/main">
+  <p:cSld>
+    <p:spTree>
+      <p:nvGrpSpPr>
+        <p:cNvPr id="1" name=""/>
+        <p:cNvGrpSpPr/>
+        <p:nvPr/>
+      </p:nvGrpSpPr>
+      <p:grpSpPr>
+        <a:xfrm>
+          <a:off x="0" y="0"/>
+          <a:ext cx="0" cy="0"/>
+          <a:chOff x="0" y="0"/>
+          <a:chExt cx="0" cy="0"/>
+        </a:xfrm>
+      </p:grpSpPr>
+      <p:pic>
+        <p:nvPicPr>
+          <p:cNvPr id="5" name="Picture 4"/>
+          <p:cNvPicPr>
+            <a:picLocks noChangeAspect="1"/>
+          </p:cNvPicPr>
+          <p:nvPr/>
+        </p:nvPicPr>
+        <p:blipFill>
+          <a:blip r:embed="rId2">
+            <a:extLst>
+              <a:ext uri="{28A0092B-C50C-407E-A947-70E740481C1C}">
+                <a14:useLocalDpi xmlns:a14="http://schemas.microsoft.com/office/drawing/2010/main" val="0"/>
+              </a:ext>
+            </a:extLst>
+          </a:blip>
+          <a:stretch>
+            <a:fillRect/>
+          </a:stretch>
+        </p:blipFill>
+        <p:spPr>
+          <a:xfrm>
+            <a:off x="965477" y="753120"/>
+            <a:ext cx="9478072" cy="1959412"/>
+          </a:xfrm>
+          <a:prstGeom prst="rect">
+            <a:avLst/>
+          </a:prstGeom>
+        </p:spPr>
+      </p:pic>
+      <p:sp>
+        <p:nvSpPr>
+          <p:cNvPr id="6" name="Rectangle 5"/>
+          <p:cNvSpPr/>
+          <p:nvPr/>
+        </p:nvSpPr>
+        <p:spPr>
+          <a:xfrm>
+            <a:off x="965477" y="2712532"/>
+            <a:ext cx="9478072" cy="3293209"/>
+          </a:xfrm>
+          <a:prstGeom prst="rect">
+            <a:avLst/>
+          </a:prstGeom>
+        </p:spPr>
+        <p:txBody>
+          <a:bodyPr wrap="square">
+            <a:spAutoFit/>
+          </a:bodyPr>
+          <a:lstStyle/>
+          <a:p>
+            <a:r>
+              <a:rPr lang="en-US" sz="4000" dirty="0">
+                <a:solidFill>
+                  <a:srgbClr val="EBEBEB"/>
+                </a:solidFill>
+                <a:latin typeface="Times New Roman" panose="02020603050405020304" pitchFamily="18" charset="0"/>
+                <a:ea typeface="+mj-ea"/>
+                <a:cs typeface="Times New Roman" panose="02020603050405020304" pitchFamily="18" charset="0"/>
+              </a:rPr>
+              <a:t>Datasets</a:t>
+            </a:r>
+            <a:endParaRPr lang="en-US" sz="2400" dirty="0">
+              <a:solidFill>
+                <a:srgbClr val="EBEBEB"/>
+              </a:solidFill>
+              <a:ea typeface="+mj-ea"/>
+              <a:cs typeface="+mj-cs"/>
+            </a:endParaRPr>
+          </a:p>
+          <a:p>
+            <a:endParaRPr lang="en-US" sz="2400" dirty="0">
+              <a:solidFill>
+                <a:schemeClr val="bg1"/>
+              </a:solidFill>
+              <a:ea typeface="+mj-ea"/>
+              <a:cs typeface="+mj-cs"/>
+            </a:endParaRPr>
+          </a:p>
+          <a:p>
+            <a:pPr marL="342900" indent="-342900">
+              <a:buFont typeface="Wingdings" panose="05000000000000000000" pitchFamily="2" charset="2"/>
+              <a:buChar char="v"/>
+            </a:pPr>
+            <a:r>
+              <a:rPr lang="en-US" sz="2400" dirty="0">
+                <a:solidFill>
+                  <a:schemeClr val="bg1"/>
+                </a:solidFill>
+                <a:ea typeface="+mj-ea"/>
+                <a:cs typeface="+mj-cs"/>
+              </a:rPr>
+              <a:t>City of Houston 311 - </a:t>
+            </a:r>
+            <a:r>
+              <a:rPr lang="en-US" sz="2400" u="sng" dirty="0">
+                <a:solidFill>
+                  <a:schemeClr val="bg1"/>
+                </a:solidFill>
+                <a:hlinkClick r:id="rId3"/>
+              </a:rPr>
+              <a:t>https://www.houstontx.gov/311/</a:t>
+            </a:r>
+            <a:endParaRPr lang="en-US" sz="2400" u="sng" dirty="0">
+              <a:solidFill>
+                <a:schemeClr val="bg1"/>
+              </a:solidFill>
+            </a:endParaRPr>
+          </a:p>
+          <a:p>
+            <a:pPr marL="342900" indent="-342900">
+              <a:buFont typeface="Wingdings" panose="05000000000000000000" pitchFamily="2" charset="2"/>
+              <a:buChar char="v"/>
+            </a:pPr>
+            <a:endParaRPr lang="en-US" sz="2400" u="sng" dirty="0">
+              <a:solidFill>
+                <a:schemeClr val="bg1"/>
+              </a:solidFill>
+            </a:endParaRPr>
+          </a:p>
+          <a:p>
+            <a:pPr marL="342900" indent="-342900">
+              <a:buFont typeface="Wingdings" panose="05000000000000000000" pitchFamily="2" charset="2"/>
+              <a:buChar char="v"/>
+            </a:pPr>
+            <a:r>
+              <a:rPr lang="en-US" sz="2400" dirty="0">
+                <a:solidFill>
+                  <a:schemeClr val="bg1"/>
+                </a:solidFill>
+              </a:rPr>
+              <a:t>Census Bureau -  </a:t>
+            </a:r>
+            <a:r>
+              <a:rPr lang="en-US" sz="2400" u="sng" dirty="0">
+                <a:solidFill>
+                  <a:schemeClr val="bg1"/>
+                </a:solidFill>
+                <a:hlinkClick r:id="rId4"/>
+              </a:rPr>
+              <a:t>https://www.census.gov/acs/www/data/</a:t>
+            </a:r>
+            <a:r>
+              <a:rPr lang="en-US" sz="2400" dirty="0">
+                <a:solidFill>
+                  <a:schemeClr val="bg1"/>
+                </a:solidFill>
+              </a:rPr>
+              <a:t>		</a:t>
+            </a:r>
+          </a:p>
+          <a:p>
+            <a:pPr marL="342900" indent="-342900">
+              <a:buFont typeface="Wingdings" panose="05000000000000000000" pitchFamily="2" charset="2"/>
+              <a:buChar char="v"/>
+            </a:pPr>
+            <a:r>
+              <a:rPr lang="en-US" sz="2400" dirty="0">
+                <a:solidFill>
+                  <a:schemeClr val="bg1"/>
+                </a:solidFill>
+              </a:rPr>
+              <a:t>Weather Underground - </a:t>
+            </a:r>
+            <a:r>
+              <a:rPr lang="en-US" sz="2400" u="sng" dirty="0">
+                <a:hlinkClick r:id="rId5"/>
+              </a:rPr>
+              <a:t>https://www.wunderground.com/</a:t>
+            </a:r>
+            <a:endParaRPr lang="en-US" sz="2400" dirty="0"/>
+          </a:p>
+          <a:p>
+            <a:endParaRPr lang="en-US" sz="2400" dirty="0">
+              <a:solidFill>
+                <a:schemeClr val="bg1"/>
+              </a:solidFill>
+            </a:endParaRPr>
+          </a:p>
+        </p:txBody>
+      </p:sp>
+    </p:spTree>
+    <p:extLst>
+      <p:ext uri="{BB962C8B-B14F-4D97-AF65-F5344CB8AC3E}">
+        <p14:creationId xmlns:p14="http://schemas.microsoft.com/office/powerpoint/2010/main" val="802031608"/>
+      </p:ext>
+    </p:extLst>
+  </p:cSld>
+  <p:clrMapOvr>
+    <a:masterClrMapping/>
+  </p:clrMapOvr>
+</p:sld>
+</file>
+
+<file path=ppt/slides/slide6.xml><?xml version="1.0" encoding="utf-8"?>
+<p:sld xmlns:a="http://schemas.openxmlformats.org/drawingml/2006/main" xmlns:r="http://schemas.openxmlformats.org/officeDocument/2006/relationships" xmlns:p="http://schemas.openxmlformats.org/presentationml/2006/main">
+  <p:cSld>
+    <p:spTree>
+      <p:nvGrpSpPr>
+        <p:cNvPr id="1" name=""/>
+        <p:cNvGrpSpPr/>
+        <p:nvPr/>
+      </p:nvGrpSpPr>
+      <p:grpSpPr>
+        <a:xfrm>
+          <a:off x="0" y="0"/>
+          <a:ext cx="0" cy="0"/>
+          <a:chOff x="0" y="0"/>
+          <a:chExt cx="0" cy="0"/>
+        </a:xfrm>
+      </p:grpSpPr>
+      <p:pic>
+        <p:nvPicPr>
+          <p:cNvPr id="5" name="Picture 4"/>
+          <p:cNvPicPr>
+            <a:picLocks noChangeAspect="1"/>
+          </p:cNvPicPr>
+          <p:nvPr/>
+        </p:nvPicPr>
+        <p:blipFill>
+          <a:blip r:embed="rId2">
+            <a:extLst>
+              <a:ext uri="{28A0092B-C50C-407E-A947-70E740481C1C}">
+                <a14:useLocalDpi xmlns:a14="http://schemas.microsoft.com/office/drawing/2010/main" val="0"/>
+              </a:ext>
+            </a:extLst>
+          </a:blip>
+          <a:stretch>
+            <a:fillRect/>
+          </a:stretch>
+        </p:blipFill>
+        <p:spPr>
+          <a:xfrm>
+            <a:off x="965477" y="753120"/>
+            <a:ext cx="9478072" cy="1959412"/>
+          </a:xfrm>
+          <a:prstGeom prst="rect">
+            <a:avLst/>
+          </a:prstGeom>
+        </p:spPr>
+      </p:pic>
+      <p:sp>
+        <p:nvSpPr>
+          <p:cNvPr id="6" name="Rectangle 5"/>
+          <p:cNvSpPr/>
+          <p:nvPr/>
+        </p:nvSpPr>
+        <p:spPr>
+          <a:xfrm>
+            <a:off x="965477" y="2712532"/>
+            <a:ext cx="9478072" cy="2923877"/>
+          </a:xfrm>
+          <a:prstGeom prst="rect">
+            <a:avLst/>
+          </a:prstGeom>
+        </p:spPr>
+        <p:txBody>
+          <a:bodyPr wrap="square">
+            <a:spAutoFit/>
+          </a:bodyPr>
+          <a:lstStyle/>
+          <a:p>
+            <a:r>
+              <a:rPr lang="en-US" sz="4000" dirty="0">
+                <a:solidFill>
+                  <a:srgbClr val="EBEBEB"/>
+                </a:solidFill>
+                <a:latin typeface="Times New Roman" panose="02020603050405020304" pitchFamily="18" charset="0"/>
+                <a:ea typeface="+mj-ea"/>
+                <a:cs typeface="Times New Roman" panose="02020603050405020304" pitchFamily="18" charset="0"/>
+              </a:rPr>
+              <a:t>Models</a:t>
+            </a:r>
+            <a:endParaRPr lang="en-US" sz="2400" dirty="0">
+              <a:solidFill>
+                <a:srgbClr val="EBEBEB"/>
+              </a:solidFill>
+              <a:ea typeface="+mj-ea"/>
+              <a:cs typeface="+mj-cs"/>
+            </a:endParaRPr>
+          </a:p>
+          <a:p>
+            <a:endParaRPr lang="en-US" sz="2400" dirty="0">
+              <a:solidFill>
+                <a:srgbClr val="EBEBEB"/>
+              </a:solidFill>
+              <a:ea typeface="+mj-ea"/>
+              <a:cs typeface="+mj-cs"/>
+            </a:endParaRPr>
+          </a:p>
+          <a:p>
+            <a:pPr marL="342900" indent="-342900">
+              <a:buFont typeface="Wingdings" panose="05000000000000000000" pitchFamily="2" charset="2"/>
+              <a:buChar char="v"/>
+            </a:pPr>
+            <a:r>
+              <a:rPr lang="en-US" sz="2400" dirty="0">
+                <a:solidFill>
+                  <a:srgbClr val="EBEBEB"/>
+                </a:solidFill>
+                <a:ea typeface="+mj-ea"/>
+                <a:cs typeface="+mj-cs"/>
+              </a:rPr>
+              <a:t>Target Variable:  Not Closed by Due Date (1) vs. Closed (0)</a:t>
+            </a:r>
+            <a:br>
+              <a:rPr lang="en-US" sz="2400" dirty="0">
+                <a:solidFill>
+                  <a:srgbClr val="EBEBEB"/>
+                </a:solidFill>
+                <a:ea typeface="+mj-ea"/>
+                <a:cs typeface="+mj-cs"/>
+              </a:rPr>
+            </a:br>
+            <a:r>
+              <a:rPr lang="en-US" sz="2400" dirty="0">
+                <a:solidFill>
+                  <a:srgbClr val="EBEBEB"/>
+                </a:solidFill>
+                <a:ea typeface="+mj-ea"/>
+                <a:cs typeface="+mj-cs"/>
+              </a:rPr>
+              <a:t> </a:t>
+            </a:r>
+          </a:p>
+          <a:p>
+            <a:pPr marL="342900" indent="-342900">
+              <a:buFont typeface="Wingdings" panose="05000000000000000000" pitchFamily="2" charset="2"/>
+              <a:buChar char="v"/>
+            </a:pPr>
+            <a:r>
+              <a:rPr lang="en-US" sz="2400" dirty="0">
+                <a:solidFill>
+                  <a:srgbClr val="EBEBEB"/>
+                </a:solidFill>
+              </a:rPr>
+              <a:t>Models Considered:  Logistic Regress, KNN</a:t>
+            </a:r>
+          </a:p>
+          <a:p>
+            <a:pPr marL="342900" indent="-342900">
+              <a:buFont typeface="Wingdings" panose="05000000000000000000" pitchFamily="2" charset="2"/>
+              <a:buChar char="v"/>
+            </a:pPr>
+            <a:endParaRPr lang="en-US" sz="2400" dirty="0">
+              <a:solidFill>
+                <a:srgbClr val="EBEBEB"/>
+              </a:solidFill>
+            </a:endParaRPr>
+          </a:p>
+          <a:p>
+            <a:pPr marL="342900" indent="-342900">
+              <a:buFont typeface="Wingdings" panose="05000000000000000000" pitchFamily="2" charset="2"/>
+              <a:buChar char="v"/>
+            </a:pPr>
+            <a:r>
+              <a:rPr lang="en-US" sz="2400" dirty="0">
+                <a:solidFill>
+                  <a:srgbClr val="EBEBEB"/>
+                </a:solidFill>
+                <a:ea typeface="+mj-ea"/>
+                <a:cs typeface="+mj-cs"/>
+              </a:rPr>
+              <a:t>Model Deployed:  Logistic Regression</a:t>
+            </a:r>
+            <a:endParaRPr lang="en-US" dirty="0"/>
+          </a:p>
+        </p:txBody>
+      </p:sp>
     </p:spTree>
     <p:extLst>
       <p:ext uri="{BB962C8B-B14F-4D97-AF65-F5344CB8AC3E}">
@@ -14336,7 +16301,7 @@
 </p:sld>
 </file>
 
-<file path=ppt/slides/slide4.xml><?xml version="1.0" encoding="utf-8"?>
+<file path=ppt/slides/slide7.xml><?xml version="1.0" encoding="utf-8"?>
 <p:sld xmlns:a="http://schemas.openxmlformats.org/drawingml/2006/main" xmlns:r="http://schemas.openxmlformats.org/officeDocument/2006/relationships" xmlns:p="http://schemas.openxmlformats.org/presentationml/2006/main">
   <p:cSld>
     <p:spTree>
@@ -14381,16 +16346,8 @@
                 <a:spcPts val="800"/>
               </a:spcAft>
             </a:pPr>
-            <a:r>
-              <a:rPr lang="en-US" sz="2400" dirty="0" smtClean="0">
-                <a:latin typeface="Calibri" panose="020F0502020204030204" pitchFamily="34" charset="0"/>
-                <a:ea typeface="Calibri" panose="020F0502020204030204" pitchFamily="34" charset="0"/>
-                <a:cs typeface="Times New Roman" panose="02020603050405020304" pitchFamily="18" charset="0"/>
-              </a:rPr>
-              <a:t/>
-            </a:r>
             <a:br>
-              <a:rPr lang="en-US" sz="2400" dirty="0" smtClean="0">
+              <a:rPr lang="en-US" sz="2400" dirty="0">
                 <a:latin typeface="Calibri" panose="020F0502020204030204" pitchFamily="34" charset="0"/>
                 <a:ea typeface="Calibri" panose="020F0502020204030204" pitchFamily="34" charset="0"/>
                 <a:cs typeface="Times New Roman" panose="02020603050405020304" pitchFamily="18" charset="0"/>
@@ -14537,7 +16494,7 @@
               </a:spcAft>
             </a:pPr>
             <a:r>
-              <a:rPr lang="en-US" sz="4000" dirty="0" smtClean="0">
+              <a:rPr lang="en-US" sz="4000" dirty="0">
                 <a:latin typeface="Times New Roman" panose="02020603050405020304" pitchFamily="18" charset="0"/>
                 <a:ea typeface="Calibri" panose="020F0502020204030204" pitchFamily="34" charset="0"/>
                 <a:cs typeface="Times New Roman" panose="02020603050405020304" pitchFamily="18" charset="0"/>
@@ -14588,7 +16545,186 @@
 </p:sld>
 </file>
 
-<file path=ppt/slides/slide5.xml><?xml version="1.0" encoding="utf-8"?>
+<file path=ppt/slides/slide8.xml><?xml version="1.0" encoding="utf-8"?>
+<p:sld xmlns:a="http://schemas.openxmlformats.org/drawingml/2006/main" xmlns:r="http://schemas.openxmlformats.org/officeDocument/2006/relationships" xmlns:p="http://schemas.openxmlformats.org/presentationml/2006/main">
+  <p:cSld>
+    <p:spTree>
+      <p:nvGrpSpPr>
+        <p:cNvPr id="1" name=""/>
+        <p:cNvGrpSpPr/>
+        <p:nvPr/>
+      </p:nvGrpSpPr>
+      <p:grpSpPr>
+        <a:xfrm>
+          <a:off x="0" y="0"/>
+          <a:ext cx="0" cy="0"/>
+          <a:chOff x="0" y="0"/>
+          <a:chExt cx="0" cy="0"/>
+        </a:xfrm>
+      </p:grpSpPr>
+      <p:pic>
+        <p:nvPicPr>
+          <p:cNvPr id="5" name="Picture 4"/>
+          <p:cNvPicPr>
+            <a:picLocks noChangeAspect="1"/>
+          </p:cNvPicPr>
+          <p:nvPr/>
+        </p:nvPicPr>
+        <p:blipFill>
+          <a:blip r:embed="rId2">
+            <a:extLst>
+              <a:ext uri="{28A0092B-C50C-407E-A947-70E740481C1C}">
+                <a14:useLocalDpi xmlns:a14="http://schemas.microsoft.com/office/drawing/2010/main" val="0"/>
+              </a:ext>
+            </a:extLst>
+          </a:blip>
+          <a:stretch>
+            <a:fillRect/>
+          </a:stretch>
+        </p:blipFill>
+        <p:spPr>
+          <a:xfrm>
+            <a:off x="965477" y="753120"/>
+            <a:ext cx="9478072" cy="1959412"/>
+          </a:xfrm>
+          <a:prstGeom prst="rect">
+            <a:avLst/>
+          </a:prstGeom>
+        </p:spPr>
+      </p:pic>
+      <p:sp>
+        <p:nvSpPr>
+          <p:cNvPr id="6" name="Rectangle 5"/>
+          <p:cNvSpPr/>
+          <p:nvPr/>
+        </p:nvSpPr>
+        <p:spPr>
+          <a:xfrm>
+            <a:off x="965477" y="2712532"/>
+            <a:ext cx="9478072" cy="2923877"/>
+          </a:xfrm>
+          <a:prstGeom prst="rect">
+            <a:avLst/>
+          </a:prstGeom>
+        </p:spPr>
+        <p:txBody>
+          <a:bodyPr wrap="square">
+            <a:spAutoFit/>
+          </a:bodyPr>
+          <a:lstStyle/>
+          <a:p>
+            <a:r>
+              <a:rPr lang="en-US" sz="4000" dirty="0">
+                <a:solidFill>
+                  <a:srgbClr val="EBEBEB"/>
+                </a:solidFill>
+                <a:latin typeface="Times New Roman" panose="02020603050405020304" pitchFamily="18" charset="0"/>
+                <a:ea typeface="+mj-ea"/>
+                <a:cs typeface="Times New Roman" panose="02020603050405020304" pitchFamily="18" charset="0"/>
+              </a:rPr>
+              <a:t>Conclusions</a:t>
+            </a:r>
+            <a:endParaRPr lang="en-US" sz="2400" dirty="0">
+              <a:solidFill>
+                <a:srgbClr val="EBEBEB"/>
+              </a:solidFill>
+              <a:ea typeface="+mj-ea"/>
+              <a:cs typeface="+mj-cs"/>
+            </a:endParaRPr>
+          </a:p>
+          <a:p>
+            <a:endParaRPr lang="en-US" sz="2400" dirty="0">
+              <a:solidFill>
+                <a:srgbClr val="EBEBEB"/>
+              </a:solidFill>
+              <a:ea typeface="+mj-ea"/>
+              <a:cs typeface="+mj-cs"/>
+            </a:endParaRPr>
+          </a:p>
+          <a:p>
+            <a:pPr marL="342900" indent="-342900">
+              <a:buFont typeface="Wingdings" panose="05000000000000000000" pitchFamily="2" charset="2"/>
+              <a:buChar char="v"/>
+            </a:pPr>
+            <a:r>
+              <a:rPr lang="en-US" sz="2400" dirty="0">
+                <a:solidFill>
+                  <a:srgbClr val="EBEBEB"/>
+                </a:solidFill>
+                <a:ea typeface="+mj-ea"/>
+                <a:cs typeface="+mj-cs"/>
+              </a:rPr>
+              <a:t>Little evidence that socioeconomic factors impact whether issue is closed by due date</a:t>
+            </a:r>
+          </a:p>
+          <a:p>
+            <a:pPr marL="342900" indent="-342900">
+              <a:buFont typeface="Wingdings" panose="05000000000000000000" pitchFamily="2" charset="2"/>
+              <a:buChar char="v"/>
+            </a:pPr>
+            <a:r>
+              <a:rPr lang="en-US" sz="2400" dirty="0">
+                <a:solidFill>
+                  <a:srgbClr val="EBEBEB"/>
+                </a:solidFill>
+                <a:ea typeface="+mj-ea"/>
+                <a:cs typeface="+mj-cs"/>
+              </a:rPr>
+              <a:t>Some evidence that rainfall does have some impact</a:t>
+            </a:r>
+          </a:p>
+          <a:p>
+            <a:pPr marL="342900" indent="-342900">
+              <a:buFont typeface="Wingdings" panose="05000000000000000000" pitchFamily="2" charset="2"/>
+              <a:buChar char="v"/>
+            </a:pPr>
+            <a:r>
+              <a:rPr lang="en-US" sz="2400" dirty="0">
+                <a:solidFill>
+                  <a:srgbClr val="EBEBEB"/>
+                </a:solidFill>
+                <a:ea typeface="+mj-ea"/>
+                <a:cs typeface="+mj-cs"/>
+              </a:rPr>
+              <a:t>Clear evidence that the type of issue has impact</a:t>
+            </a:r>
+            <a:br>
+              <a:rPr lang="en-US" sz="2400" dirty="0">
+                <a:solidFill>
+                  <a:srgbClr val="EBEBEB"/>
+                </a:solidFill>
+                <a:ea typeface="+mj-ea"/>
+                <a:cs typeface="+mj-cs"/>
+              </a:rPr>
+            </a:br>
+            <a:r>
+              <a:rPr lang="en-US" sz="2400" dirty="0">
+                <a:solidFill>
+                  <a:srgbClr val="EBEBEB"/>
+                </a:solidFill>
+                <a:ea typeface="+mj-ea"/>
+                <a:cs typeface="+mj-cs"/>
+              </a:rPr>
+              <a:t> </a:t>
+            </a:r>
+            <a:endParaRPr lang="en-US" dirty="0"/>
+          </a:p>
+        </p:txBody>
+      </p:sp>
+    </p:spTree>
+    <p:extLst>
+      <p:ext uri="{BB962C8B-B14F-4D97-AF65-F5344CB8AC3E}">
+        <p14:creationId xmlns:p14="http://schemas.microsoft.com/office/powerpoint/2010/main" val="386637905"/>
+      </p:ext>
+    </p:extLst>
+  </p:cSld>
+  <p:clrMapOvr>
+    <a:masterClrMapping/>
+  </p:clrMapOvr>
+</p:sld>
+</file>
+
+<file path=ppt/slides/slide9.xml><?xml version="1.0" encoding="utf-8"?>
 <p:sld xmlns:a="http://schemas.openxmlformats.org/drawingml/2006/main" xmlns:r="http://schemas.openxmlformats.org/officeDocument/2006/relationships" xmlns:p="http://schemas.openxmlformats.org/presentationml/2006/main">
   <p:cSld>
     <p:spTree>
@@ -14634,7 +16770,7 @@
               </a:spcAft>
             </a:pPr>
             <a:r>
-              <a:rPr lang="en-US" sz="4000" dirty="0" smtClean="0">
+              <a:rPr lang="en-US" sz="4000" dirty="0">
                 <a:latin typeface="Times New Roman" panose="02020603050405020304" pitchFamily="18" charset="0"/>
                 <a:ea typeface="Calibri" panose="020F0502020204030204" pitchFamily="34" charset="0"/>
                 <a:cs typeface="Times New Roman" panose="02020603050405020304" pitchFamily="18" charset="0"/>
@@ -14683,170 +16819,6 @@
     <p:extLst>
       <p:ext uri="{BB962C8B-B14F-4D97-AF65-F5344CB8AC3E}">
         <p14:creationId xmlns:p14="http://schemas.microsoft.com/office/powerpoint/2010/main" val="321759935"/>
-      </p:ext>
-    </p:extLst>
-  </p:cSld>
-  <p:clrMapOvr>
-    <a:masterClrMapping/>
-  </p:clrMapOvr>
-</p:sld>
-</file>
-
-<file path=ppt/slides/slide6.xml><?xml version="1.0" encoding="utf-8"?>
-<p:sld xmlns:a="http://schemas.openxmlformats.org/drawingml/2006/main" xmlns:r="http://schemas.openxmlformats.org/officeDocument/2006/relationships" xmlns:p="http://schemas.openxmlformats.org/presentationml/2006/main">
-  <p:cSld>
-    <p:spTree>
-      <p:nvGrpSpPr>
-        <p:cNvPr id="1" name=""/>
-        <p:cNvGrpSpPr/>
-        <p:nvPr/>
-      </p:nvGrpSpPr>
-      <p:grpSpPr>
-        <a:xfrm>
-          <a:off x="0" y="0"/>
-          <a:ext cx="0" cy="0"/>
-          <a:chOff x="0" y="0"/>
-          <a:chExt cx="0" cy="0"/>
-        </a:xfrm>
-      </p:grpSpPr>
-      <p:sp>
-        <p:nvSpPr>
-          <p:cNvPr id="2" name="Title 1"/>
-          <p:cNvSpPr>
-            <a:spLocks noGrp="1"/>
-          </p:cNvSpPr>
-          <p:nvPr>
-            <p:ph type="ctrTitle"/>
-          </p:nvPr>
-        </p:nvSpPr>
-        <p:spPr>
-          <a:xfrm>
-            <a:off x="965477" y="2565070"/>
-            <a:ext cx="9478072" cy="3099460"/>
-          </a:xfrm>
-        </p:spPr>
-        <p:txBody>
-          <a:bodyPr/>
-          <a:lstStyle/>
-          <a:p>
-            <a:pPr>
-              <a:lnSpc>
-                <a:spcPct val="107000"/>
-              </a:lnSpc>
-              <a:spcAft>
-                <a:spcPts val="800"/>
-              </a:spcAft>
-            </a:pPr>
-            <a:r>
-              <a:rPr lang="en-US" sz="4000" dirty="0" smtClean="0">
-                <a:latin typeface="Times New Roman" panose="02020603050405020304" pitchFamily="18" charset="0"/>
-                <a:ea typeface="Calibri" panose="020F0502020204030204" pitchFamily="34" charset="0"/>
-                <a:cs typeface="Times New Roman" panose="02020603050405020304" pitchFamily="18" charset="0"/>
-              </a:rPr>
-              <a:t>Thank you</a:t>
-            </a:r>
-            <a:br>
-              <a:rPr lang="en-US" sz="4000" dirty="0" smtClean="0">
-                <a:latin typeface="Times New Roman" panose="02020603050405020304" pitchFamily="18" charset="0"/>
-                <a:ea typeface="Calibri" panose="020F0502020204030204" pitchFamily="34" charset="0"/>
-                <a:cs typeface="Times New Roman" panose="02020603050405020304" pitchFamily="18" charset="0"/>
-              </a:rPr>
-            </a:br>
-            <a:r>
-              <a:rPr lang="en-US" sz="4000" dirty="0">
-                <a:latin typeface="Times New Roman" panose="02020603050405020304" pitchFamily="18" charset="0"/>
-                <a:ea typeface="Calibri" panose="020F0502020204030204" pitchFamily="34" charset="0"/>
-                <a:cs typeface="Times New Roman" panose="02020603050405020304" pitchFamily="18" charset="0"/>
-              </a:rPr>
-              <a:t/>
-            </a:r>
-            <a:br>
-              <a:rPr lang="en-US" sz="4000" dirty="0">
-                <a:latin typeface="Times New Roman" panose="02020603050405020304" pitchFamily="18" charset="0"/>
-                <a:ea typeface="Calibri" panose="020F0502020204030204" pitchFamily="34" charset="0"/>
-                <a:cs typeface="Times New Roman" panose="02020603050405020304" pitchFamily="18" charset="0"/>
-              </a:rPr>
-            </a:br>
-            <a:r>
-              <a:rPr lang="en-US" sz="4000" dirty="0" smtClean="0">
-                <a:latin typeface="Times New Roman" panose="02020603050405020304" pitchFamily="18" charset="0"/>
-                <a:ea typeface="Calibri" panose="020F0502020204030204" pitchFamily="34" charset="0"/>
-                <a:cs typeface="Times New Roman" panose="02020603050405020304" pitchFamily="18" charset="0"/>
-              </a:rPr>
-              <a:t>Any Questions ??</a:t>
-            </a:r>
-            <a:r>
-              <a:rPr lang="en-US" sz="2400" dirty="0" smtClean="0">
-                <a:latin typeface="Times New Roman" panose="02020603050405020304" pitchFamily="18" charset="0"/>
-                <a:ea typeface="Calibri" panose="020F0502020204030204" pitchFamily="34" charset="0"/>
-                <a:cs typeface="Times New Roman" panose="02020603050405020304" pitchFamily="18" charset="0"/>
-              </a:rPr>
-              <a:t/>
-            </a:r>
-            <a:br>
-              <a:rPr lang="en-US" sz="2400" dirty="0" smtClean="0">
-                <a:latin typeface="Times New Roman" panose="02020603050405020304" pitchFamily="18" charset="0"/>
-                <a:ea typeface="Calibri" panose="020F0502020204030204" pitchFamily="34" charset="0"/>
-                <a:cs typeface="Times New Roman" panose="02020603050405020304" pitchFamily="18" charset="0"/>
-              </a:rPr>
-            </a:br>
-            <a:r>
-              <a:rPr lang="en-US" sz="2400" dirty="0" smtClean="0">
-                <a:latin typeface="Calibri" panose="020F0502020204030204" pitchFamily="34" charset="0"/>
-                <a:ea typeface="Calibri" panose="020F0502020204030204" pitchFamily="34" charset="0"/>
-                <a:cs typeface="Times New Roman" panose="02020603050405020304" pitchFamily="18" charset="0"/>
-              </a:rPr>
-              <a:t/>
-            </a:r>
-            <a:br>
-              <a:rPr lang="en-US" sz="2400" dirty="0" smtClean="0">
-                <a:latin typeface="Calibri" panose="020F0502020204030204" pitchFamily="34" charset="0"/>
-                <a:ea typeface="Calibri" panose="020F0502020204030204" pitchFamily="34" charset="0"/>
-                <a:cs typeface="Times New Roman" panose="02020603050405020304" pitchFamily="18" charset="0"/>
-              </a:rPr>
-            </a:br>
-            <a:endParaRPr lang="en-US" sz="2400" dirty="0">
-              <a:latin typeface="Calibri" panose="020F0502020204030204" pitchFamily="34" charset="0"/>
-              <a:ea typeface="Calibri" panose="020F0502020204030204" pitchFamily="34" charset="0"/>
-              <a:cs typeface="Times New Roman" panose="02020603050405020304" pitchFamily="18" charset="0"/>
-            </a:endParaRPr>
-          </a:p>
-        </p:txBody>
-      </p:sp>
-      <p:pic>
-        <p:nvPicPr>
-          <p:cNvPr id="5" name="Picture 4"/>
-          <p:cNvPicPr>
-            <a:picLocks noChangeAspect="1"/>
-          </p:cNvPicPr>
-          <p:nvPr/>
-        </p:nvPicPr>
-        <p:blipFill>
-          <a:blip r:embed="rId2">
-            <a:extLst>
-              <a:ext uri="{28A0092B-C50C-407E-A947-70E740481C1C}">
-                <a14:useLocalDpi xmlns:a14="http://schemas.microsoft.com/office/drawing/2010/main" val="0"/>
-              </a:ext>
-            </a:extLst>
-          </a:blip>
-          <a:stretch>
-            <a:fillRect/>
-          </a:stretch>
-        </p:blipFill>
-        <p:spPr>
-          <a:xfrm>
-            <a:off x="965477" y="753120"/>
-            <a:ext cx="9478072" cy="1959412"/>
-          </a:xfrm>
-          <a:prstGeom prst="rect">
-            <a:avLst/>
-          </a:prstGeom>
-        </p:spPr>
-      </p:pic>
-    </p:spTree>
-    <p:extLst>
-      <p:ext uri="{BB962C8B-B14F-4D97-AF65-F5344CB8AC3E}">
-        <p14:creationId xmlns:p14="http://schemas.microsoft.com/office/powerpoint/2010/main" val="1343135250"/>
       </p:ext>
     </p:extLst>
   </p:cSld>

</xml_diff>

<commit_message>
Move the slides 3 with 5
</commit_message>
<xml_diff>
--- a/HoustonCity.pptx
+++ b/HoustonCity.pptx
@@ -7,9 +7,9 @@
   <p:sldIdLst>
     <p:sldId id="256" r:id="rId2"/>
     <p:sldId id="275" r:id="rId3"/>
-    <p:sldId id="276" r:id="rId4"/>
+    <p:sldId id="273" r:id="rId4"/>
     <p:sldId id="274" r:id="rId5"/>
-    <p:sldId id="273" r:id="rId6"/>
+    <p:sldId id="276" r:id="rId6"/>
     <p:sldId id="267" r:id="rId7"/>
     <p:sldId id="268" r:id="rId8"/>
     <p:sldId id="277" r:id="rId9"/>
@@ -768,7 +768,7 @@
             <a:fld id="{1E700B27-DE4C-4B9E-BB11-B9027034A00F}" type="datetimeFigureOut">
               <a:rPr lang="en-US" dirty="0"/>
               <a:pPr/>
-              <a:t>4/1/2020</a:t>
+              <a:t>4/2/2020</a:t>
             </a:fld>
             <a:endParaRPr lang="en-US" dirty="0"/>
           </a:p>
@@ -1888,7 +1888,7 @@
           <a:p>
             <a:fld id="{C40F4739-9812-4A9F-890D-2AD6BA5F6EE8}" type="datetimeFigureOut">
               <a:rPr lang="en-US" dirty="0"/>
-              <a:t>4/1/2020</a:t>
+              <a:t>4/2/2020</a:t>
             </a:fld>
             <a:endParaRPr lang="en-US" dirty="0"/>
           </a:p>
@@ -2899,7 +2899,7 @@
           <a:p>
             <a:fld id="{18845AC5-A3F8-44AA-BA8F-596CDCC976D3}" type="datetimeFigureOut">
               <a:rPr lang="en-US" dirty="0"/>
-              <a:t>4/1/2020</a:t>
+              <a:t>4/2/2020</a:t>
             </a:fld>
             <a:endParaRPr lang="en-US" dirty="0"/>
           </a:p>
@@ -4069,7 +4069,7 @@
           <a:p>
             <a:fld id="{C873B183-A821-4095-A363-9EC968635539}" type="datetimeFigureOut">
               <a:rPr lang="en-US" dirty="0"/>
-              <a:t>4/1/2020</a:t>
+              <a:t>4/2/2020</a:t>
             </a:fld>
             <a:endParaRPr lang="en-US" dirty="0"/>
           </a:p>
@@ -5130,7 +5130,7 @@
           <a:p>
             <a:fld id="{174D01B4-0AA5-45E6-B2E6-5FA4078AEBCF}" type="datetimeFigureOut">
               <a:rPr lang="en-US" dirty="0"/>
-              <a:t>4/1/2020</a:t>
+              <a:t>4/2/2020</a:t>
             </a:fld>
             <a:endParaRPr lang="en-US" dirty="0"/>
           </a:p>
@@ -5776,7 +5776,7 @@
           <a:p>
             <a:fld id="{4147335C-0450-40D7-8612-B3203BED4F28}" type="datetimeFigureOut">
               <a:rPr lang="en-US" dirty="0"/>
-              <a:t>4/1/2020</a:t>
+              <a:t>4/2/2020</a:t>
             </a:fld>
             <a:endParaRPr lang="en-US" dirty="0"/>
           </a:p>
@@ -6623,7 +6623,7 @@
           <a:p>
             <a:fld id="{D246A105-2A1C-4284-B4EA-07CF89B1A393}" type="datetimeFigureOut">
               <a:rPr lang="en-US" dirty="0"/>
-              <a:t>4/1/2020</a:t>
+              <a:t>4/2/2020</a:t>
             </a:fld>
             <a:endParaRPr lang="en-US" dirty="0"/>
           </a:p>
@@ -6798,7 +6798,7 @@
           <a:p>
             <a:fld id="{80DBE609-F3F2-45E6-BD6A-E03A8C86C1AE}" type="datetimeFigureOut">
               <a:rPr lang="en-US" dirty="0"/>
-              <a:t>4/1/2020</a:t>
+              <a:t>4/2/2020</a:t>
             </a:fld>
             <a:endParaRPr lang="en-US" dirty="0"/>
           </a:p>
@@ -7796,7 +7796,7 @@
           <a:p>
             <a:fld id="{7A24AD68-089C-4467-A8F3-EA2BBCA6B44E}" type="datetimeFigureOut">
               <a:rPr lang="en-US" dirty="0"/>
-              <a:t>4/1/2020</a:t>
+              <a:t>4/2/2020</a:t>
             </a:fld>
             <a:endParaRPr lang="en-US" dirty="0"/>
           </a:p>
@@ -8002,7 +8002,7 @@
           <a:p>
             <a:fld id="{75C51FCE-E4BB-4680-8E50-3C0E348D2609}" type="datetimeFigureOut">
               <a:rPr lang="en-US" dirty="0"/>
-              <a:t>4/1/2020</a:t>
+              <a:t>4/2/2020</a:t>
             </a:fld>
             <a:endParaRPr lang="en-US" dirty="0"/>
           </a:p>
@@ -9064,7 +9064,7 @@
           <a:p>
             <a:fld id="{8AAA073D-A903-47F8-8D16-77642FB0DF1F}" type="datetimeFigureOut">
               <a:rPr lang="en-US" dirty="0"/>
-              <a:t>4/1/2020</a:t>
+              <a:t>4/2/2020</a:t>
             </a:fld>
             <a:endParaRPr lang="en-US" dirty="0"/>
           </a:p>
@@ -9336,7 +9336,7 @@
           <a:p>
             <a:fld id="{AB91FA40-626B-4CA1-85D0-7A9016E395BA}" type="datetimeFigureOut">
               <a:rPr lang="en-US" dirty="0"/>
-              <a:t>4/1/2020</a:t>
+              <a:t>4/2/2020</a:t>
             </a:fld>
             <a:endParaRPr lang="en-US" dirty="0"/>
           </a:p>
@@ -9718,7 +9718,7 @@
           <a:p>
             <a:fld id="{C3F425EA-B9DC-48A7-991E-9A82573B1B21}" type="datetimeFigureOut">
               <a:rPr lang="en-US" dirty="0"/>
-              <a:t>4/1/2020</a:t>
+              <a:t>4/2/2020</a:t>
             </a:fld>
             <a:endParaRPr lang="en-US" dirty="0"/>
           </a:p>
@@ -9836,7 +9836,7 @@
           <a:p>
             <a:fld id="{66CB97F8-6CEB-469B-AFCC-889F2A2B1D5A}" type="datetimeFigureOut">
               <a:rPr lang="en-US" dirty="0"/>
-              <a:t>4/1/2020</a:t>
+              <a:t>4/2/2020</a:t>
             </a:fld>
             <a:endParaRPr lang="en-US" dirty="0"/>
           </a:p>
@@ -9931,7 +9931,7 @@
           <a:p>
             <a:fld id="{8FA9179F-009E-4FA5-B091-7EBB82A185BD}" type="datetimeFigureOut">
               <a:rPr lang="en-US" dirty="0"/>
-              <a:t>4/1/2020</a:t>
+              <a:t>4/2/2020</a:t>
             </a:fld>
             <a:endParaRPr lang="en-US" dirty="0"/>
           </a:p>
@@ -11040,7 +11040,7 @@
           <a:p>
             <a:fld id="{8E665CEB-0076-4E37-B880-BCEA9784DE0A}" type="datetimeFigureOut">
               <a:rPr lang="en-US" dirty="0"/>
-              <a:t>4/1/2020</a:t>
+              <a:t>4/2/2020</a:t>
             </a:fld>
             <a:endParaRPr lang="en-US" dirty="0"/>
           </a:p>
@@ -12173,7 +12173,7 @@
           <a:p>
             <a:fld id="{A6149E5E-3896-4118-99A7-7B85668F1C5E}" type="datetimeFigureOut">
               <a:rPr lang="en-US" dirty="0"/>
-              <a:t>4/1/2020</a:t>
+              <a:t>4/2/2020</a:t>
             </a:fld>
             <a:endParaRPr lang="en-US" dirty="0"/>
           </a:p>
@@ -13201,7 +13201,7 @@
           <a:p>
             <a:fld id="{7E0D914D-B099-4142-A885-11F276715148}" type="datetimeFigureOut">
               <a:rPr lang="en-US" dirty="0"/>
-              <a:t>4/1/2020</a:t>
+              <a:t>4/2/2020</a:t>
             </a:fld>
             <a:endParaRPr lang="en-US" dirty="0"/>
           </a:p>
@@ -13978,6 +13978,14 @@
                 <a:cs typeface="Times New Roman" panose="02020603050405020304" pitchFamily="18" charset="0"/>
               </a:rPr>
             </a:br>
+            <a:r>
+              <a:rPr lang="en-US" sz="4000" dirty="0">
+                <a:latin typeface="Times New Roman" panose="02020603050405020304" pitchFamily="18" charset="0"/>
+                <a:ea typeface="Calibri" panose="020F0502020204030204" pitchFamily="34" charset="0"/>
+                <a:cs typeface="Times New Roman" panose="02020603050405020304" pitchFamily="18" charset="0"/>
+              </a:rPr>
+              <a:t/>
+            </a:r>
             <a:br>
               <a:rPr lang="en-US" sz="4000" dirty="0">
                 <a:latin typeface="Times New Roman" panose="02020603050405020304" pitchFamily="18" charset="0"/>
@@ -13993,6 +14001,14 @@
               </a:rPr>
               <a:t>Any Questions ??</a:t>
             </a:r>
+            <a:r>
+              <a:rPr lang="en-US" sz="2400" dirty="0">
+                <a:latin typeface="Times New Roman" panose="02020603050405020304" pitchFamily="18" charset="0"/>
+                <a:ea typeface="Calibri" panose="020F0502020204030204" pitchFamily="34" charset="0"/>
+                <a:cs typeface="Times New Roman" panose="02020603050405020304" pitchFamily="18" charset="0"/>
+              </a:rPr>
+              <a:t/>
+            </a:r>
             <a:br>
               <a:rPr lang="en-US" sz="2400" dirty="0">
                 <a:latin typeface="Times New Roman" panose="02020603050405020304" pitchFamily="18" charset="0"/>
@@ -14000,6 +14016,14 @@
                 <a:cs typeface="Times New Roman" panose="02020603050405020304" pitchFamily="18" charset="0"/>
               </a:rPr>
             </a:br>
+            <a:r>
+              <a:rPr lang="en-US" sz="2400" dirty="0">
+                <a:latin typeface="Calibri" panose="020F0502020204030204" pitchFamily="34" charset="0"/>
+                <a:ea typeface="Calibri" panose="020F0502020204030204" pitchFamily="34" charset="0"/>
+                <a:cs typeface="Times New Roman" panose="02020603050405020304" pitchFamily="18" charset="0"/>
+              </a:rPr>
+              <a:t/>
+            </a:r>
             <a:br>
               <a:rPr lang="en-US" sz="2400" dirty="0">
                 <a:latin typeface="Calibri" panose="020F0502020204030204" pitchFamily="34" charset="0"/>
@@ -14290,6 +14314,427 @@
         </p:nvSpPr>
         <p:spPr>
           <a:xfrm>
+            <a:off x="965477" y="2712532"/>
+            <a:ext cx="9478072" cy="3293209"/>
+          </a:xfrm>
+          <a:prstGeom prst="rect">
+            <a:avLst/>
+          </a:prstGeom>
+        </p:spPr>
+        <p:txBody>
+          <a:bodyPr wrap="square">
+            <a:spAutoFit/>
+          </a:bodyPr>
+          <a:lstStyle/>
+          <a:p>
+            <a:r>
+              <a:rPr lang="en-US" sz="4000" dirty="0">
+                <a:solidFill>
+                  <a:srgbClr val="EBEBEB"/>
+                </a:solidFill>
+                <a:latin typeface="Times New Roman" panose="02020603050405020304" pitchFamily="18" charset="0"/>
+                <a:ea typeface="+mj-ea"/>
+                <a:cs typeface="Times New Roman" panose="02020603050405020304" pitchFamily="18" charset="0"/>
+              </a:rPr>
+              <a:t>Datasets</a:t>
+            </a:r>
+            <a:endParaRPr lang="en-US" sz="2400" dirty="0">
+              <a:solidFill>
+                <a:srgbClr val="EBEBEB"/>
+              </a:solidFill>
+              <a:ea typeface="+mj-ea"/>
+              <a:cs typeface="+mj-cs"/>
+            </a:endParaRPr>
+          </a:p>
+          <a:p>
+            <a:endParaRPr lang="en-US" sz="2400" dirty="0">
+              <a:solidFill>
+                <a:schemeClr val="bg1"/>
+              </a:solidFill>
+              <a:ea typeface="+mj-ea"/>
+              <a:cs typeface="+mj-cs"/>
+            </a:endParaRPr>
+          </a:p>
+          <a:p>
+            <a:pPr marL="342900" indent="-342900">
+              <a:buFont typeface="Wingdings" panose="05000000000000000000" pitchFamily="2" charset="2"/>
+              <a:buChar char="v"/>
+            </a:pPr>
+            <a:r>
+              <a:rPr lang="en-US" sz="2400" dirty="0">
+                <a:solidFill>
+                  <a:schemeClr val="bg1"/>
+                </a:solidFill>
+                <a:ea typeface="+mj-ea"/>
+                <a:cs typeface="+mj-cs"/>
+              </a:rPr>
+              <a:t>City of Houston 311 - </a:t>
+            </a:r>
+            <a:r>
+              <a:rPr lang="en-US" sz="2400" u="sng" dirty="0">
+                <a:solidFill>
+                  <a:schemeClr val="bg1"/>
+                </a:solidFill>
+                <a:hlinkClick r:id="rId3"/>
+              </a:rPr>
+              <a:t>https://www.houstontx.gov/311/</a:t>
+            </a:r>
+            <a:endParaRPr lang="en-US" sz="2400" u="sng" dirty="0">
+              <a:solidFill>
+                <a:schemeClr val="bg1"/>
+              </a:solidFill>
+            </a:endParaRPr>
+          </a:p>
+          <a:p>
+            <a:pPr marL="342900" indent="-342900">
+              <a:buFont typeface="Wingdings" panose="05000000000000000000" pitchFamily="2" charset="2"/>
+              <a:buChar char="v"/>
+            </a:pPr>
+            <a:endParaRPr lang="en-US" sz="2400" u="sng" dirty="0">
+              <a:solidFill>
+                <a:schemeClr val="bg1"/>
+              </a:solidFill>
+            </a:endParaRPr>
+          </a:p>
+          <a:p>
+            <a:pPr marL="342900" indent="-342900">
+              <a:buFont typeface="Wingdings" panose="05000000000000000000" pitchFamily="2" charset="2"/>
+              <a:buChar char="v"/>
+            </a:pPr>
+            <a:r>
+              <a:rPr lang="en-US" sz="2400" dirty="0">
+                <a:solidFill>
+                  <a:schemeClr val="bg1"/>
+                </a:solidFill>
+              </a:rPr>
+              <a:t>Census Bureau -  </a:t>
+            </a:r>
+            <a:r>
+              <a:rPr lang="en-US" sz="2400" u="sng" dirty="0">
+                <a:solidFill>
+                  <a:schemeClr val="bg1"/>
+                </a:solidFill>
+                <a:hlinkClick r:id="rId4"/>
+              </a:rPr>
+              <a:t>https://www.census.gov/acs/www/data/</a:t>
+            </a:r>
+            <a:r>
+              <a:rPr lang="en-US" sz="2400" dirty="0">
+                <a:solidFill>
+                  <a:schemeClr val="bg1"/>
+                </a:solidFill>
+              </a:rPr>
+              <a:t>		</a:t>
+            </a:r>
+          </a:p>
+          <a:p>
+            <a:pPr marL="342900" indent="-342900">
+              <a:buFont typeface="Wingdings" panose="05000000000000000000" pitchFamily="2" charset="2"/>
+              <a:buChar char="v"/>
+            </a:pPr>
+            <a:r>
+              <a:rPr lang="en-US" sz="2400" dirty="0">
+                <a:solidFill>
+                  <a:schemeClr val="bg1"/>
+                </a:solidFill>
+              </a:rPr>
+              <a:t>Weather Underground - </a:t>
+            </a:r>
+            <a:r>
+              <a:rPr lang="en-US" sz="2400" u="sng" dirty="0">
+                <a:hlinkClick r:id="rId5"/>
+              </a:rPr>
+              <a:t>https://www.wunderground.com/</a:t>
+            </a:r>
+            <a:endParaRPr lang="en-US" sz="2400" dirty="0"/>
+          </a:p>
+          <a:p>
+            <a:endParaRPr lang="en-US" sz="2400" dirty="0">
+              <a:solidFill>
+                <a:schemeClr val="bg1"/>
+              </a:solidFill>
+            </a:endParaRPr>
+          </a:p>
+        </p:txBody>
+      </p:sp>
+    </p:spTree>
+    <p:extLst>
+      <p:ext uri="{BB962C8B-B14F-4D97-AF65-F5344CB8AC3E}">
+        <p14:creationId xmlns:p14="http://schemas.microsoft.com/office/powerpoint/2010/main" val="802031608"/>
+      </p:ext>
+    </p:extLst>
+  </p:cSld>
+  <p:clrMapOvr>
+    <a:masterClrMapping/>
+  </p:clrMapOvr>
+</p:sld>
+</file>
+
+<file path=ppt/slides/slide4.xml><?xml version="1.0" encoding="utf-8"?>
+<p:sld xmlns:a="http://schemas.openxmlformats.org/drawingml/2006/main" xmlns:r="http://schemas.openxmlformats.org/officeDocument/2006/relationships" xmlns:p="http://schemas.openxmlformats.org/presentationml/2006/main">
+  <p:cSld>
+    <p:spTree>
+      <p:nvGrpSpPr>
+        <p:cNvPr id="1" name=""/>
+        <p:cNvGrpSpPr/>
+        <p:nvPr/>
+      </p:nvGrpSpPr>
+      <p:grpSpPr>
+        <a:xfrm>
+          <a:off x="0" y="0"/>
+          <a:ext cx="0" cy="0"/>
+          <a:chOff x="0" y="0"/>
+          <a:chExt cx="0" cy="0"/>
+        </a:xfrm>
+      </p:grpSpPr>
+      <p:pic>
+        <p:nvPicPr>
+          <p:cNvPr id="5" name="Picture 4"/>
+          <p:cNvPicPr>
+            <a:picLocks noChangeAspect="1"/>
+          </p:cNvPicPr>
+          <p:nvPr/>
+        </p:nvPicPr>
+        <p:blipFill>
+          <a:blip r:embed="rId2">
+            <a:extLst>
+              <a:ext uri="{28A0092B-C50C-407E-A947-70E740481C1C}">
+                <a14:useLocalDpi xmlns:a14="http://schemas.microsoft.com/office/drawing/2010/main" val="0"/>
+              </a:ext>
+            </a:extLst>
+          </a:blip>
+          <a:stretch>
+            <a:fillRect/>
+          </a:stretch>
+        </p:blipFill>
+        <p:spPr>
+          <a:xfrm>
+            <a:off x="965477" y="753120"/>
+            <a:ext cx="9478072" cy="1959412"/>
+          </a:xfrm>
+          <a:prstGeom prst="rect">
+            <a:avLst/>
+          </a:prstGeom>
+        </p:spPr>
+      </p:pic>
+      <p:sp>
+        <p:nvSpPr>
+          <p:cNvPr id="6" name="Rectangle 5"/>
+          <p:cNvSpPr/>
+          <p:nvPr/>
+        </p:nvSpPr>
+        <p:spPr>
+          <a:xfrm>
+            <a:off x="965477" y="2712532"/>
+            <a:ext cx="9478072" cy="3477875"/>
+          </a:xfrm>
+          <a:prstGeom prst="rect">
+            <a:avLst/>
+          </a:prstGeom>
+        </p:spPr>
+        <p:txBody>
+          <a:bodyPr wrap="square">
+            <a:spAutoFit/>
+          </a:bodyPr>
+          <a:lstStyle/>
+          <a:p>
+            <a:r>
+              <a:rPr lang="en-US" sz="4000" dirty="0">
+                <a:solidFill>
+                  <a:srgbClr val="EBEBEB"/>
+                </a:solidFill>
+                <a:latin typeface="Times New Roman" panose="02020603050405020304" pitchFamily="18" charset="0"/>
+                <a:ea typeface="+mj-ea"/>
+                <a:cs typeface="Times New Roman" panose="02020603050405020304" pitchFamily="18" charset="0"/>
+              </a:rPr>
+              <a:t>Analysis</a:t>
+            </a:r>
+            <a:endParaRPr lang="en-US" sz="2400" dirty="0">
+              <a:solidFill>
+                <a:srgbClr val="EBEBEB"/>
+              </a:solidFill>
+              <a:ea typeface="+mj-ea"/>
+              <a:cs typeface="+mj-cs"/>
+            </a:endParaRPr>
+          </a:p>
+          <a:p>
+            <a:endParaRPr lang="en-US" sz="2400" dirty="0">
+              <a:solidFill>
+                <a:schemeClr val="bg1"/>
+              </a:solidFill>
+              <a:ea typeface="+mj-ea"/>
+              <a:cs typeface="+mj-cs"/>
+            </a:endParaRPr>
+          </a:p>
+          <a:p>
+            <a:pPr marL="342900" indent="-342900">
+              <a:buFont typeface="Wingdings" panose="05000000000000000000" pitchFamily="2" charset="2"/>
+              <a:buChar char="v"/>
+            </a:pPr>
+            <a:r>
+              <a:rPr lang="en-US" dirty="0">
+                <a:solidFill>
+                  <a:schemeClr val="bg1"/>
+                </a:solidFill>
+                <a:ea typeface="+mj-ea"/>
+                <a:cs typeface="+mj-cs"/>
+              </a:rPr>
+              <a:t>Goal of Analysis:  Identify factors that impact whether issue is closed by the due date or not</a:t>
+            </a:r>
+          </a:p>
+          <a:p>
+            <a:pPr marL="342900" indent="-342900">
+              <a:buFont typeface="Wingdings" panose="05000000000000000000" pitchFamily="2" charset="2"/>
+              <a:buChar char="v"/>
+            </a:pPr>
+            <a:r>
+              <a:rPr lang="en-US" dirty="0">
+                <a:solidFill>
+                  <a:schemeClr val="bg1"/>
+                </a:solidFill>
+                <a:ea typeface="+mj-ea"/>
+                <a:cs typeface="+mj-cs"/>
+              </a:rPr>
+              <a:t>Factors Considered:</a:t>
+            </a:r>
+          </a:p>
+          <a:p>
+            <a:pPr marL="800100" lvl="1" indent="-342900">
+              <a:buFont typeface="Wingdings" panose="05000000000000000000" pitchFamily="2" charset="2"/>
+              <a:buChar char="v"/>
+            </a:pPr>
+            <a:r>
+              <a:rPr lang="en-US" dirty="0">
+                <a:solidFill>
+                  <a:schemeClr val="bg1"/>
+                </a:solidFill>
+              </a:rPr>
+              <a:t>Type of Issue</a:t>
+            </a:r>
+            <a:endParaRPr lang="en-US" dirty="0">
+              <a:solidFill>
+                <a:schemeClr val="bg1"/>
+              </a:solidFill>
+              <a:ea typeface="+mj-ea"/>
+              <a:cs typeface="+mj-cs"/>
+            </a:endParaRPr>
+          </a:p>
+          <a:p>
+            <a:pPr marL="800100" lvl="1" indent="-342900">
+              <a:buFont typeface="Wingdings" panose="05000000000000000000" pitchFamily="2" charset="2"/>
+              <a:buChar char="v"/>
+            </a:pPr>
+            <a:r>
+              <a:rPr lang="en-US" dirty="0">
+                <a:solidFill>
+                  <a:schemeClr val="bg1"/>
+                </a:solidFill>
+                <a:ea typeface="+mj-ea"/>
+                <a:cs typeface="+mj-cs"/>
+              </a:rPr>
+              <a:t>Socioeconomic factors</a:t>
+            </a:r>
+          </a:p>
+          <a:p>
+            <a:pPr marL="800100" lvl="1" indent="-342900">
+              <a:buFont typeface="Wingdings" panose="05000000000000000000" pitchFamily="2" charset="2"/>
+              <a:buChar char="v"/>
+            </a:pPr>
+            <a:r>
+              <a:rPr lang="en-US" dirty="0">
+                <a:solidFill>
+                  <a:schemeClr val="bg1"/>
+                </a:solidFill>
+                <a:ea typeface="+mj-ea"/>
+                <a:cs typeface="+mj-cs"/>
+              </a:rPr>
+              <a:t>Weather</a:t>
+            </a:r>
+          </a:p>
+          <a:p>
+            <a:endParaRPr lang="en-US" sz="2400" dirty="0">
+              <a:solidFill>
+                <a:schemeClr val="bg1"/>
+              </a:solidFill>
+            </a:endParaRPr>
+          </a:p>
+          <a:p>
+            <a:endParaRPr lang="en-US" sz="2400" dirty="0">
+              <a:solidFill>
+                <a:schemeClr val="bg1"/>
+              </a:solidFill>
+            </a:endParaRPr>
+          </a:p>
+        </p:txBody>
+      </p:sp>
+    </p:spTree>
+    <p:extLst>
+      <p:ext uri="{BB962C8B-B14F-4D97-AF65-F5344CB8AC3E}">
+        <p14:creationId xmlns:p14="http://schemas.microsoft.com/office/powerpoint/2010/main" val="1715361934"/>
+      </p:ext>
+    </p:extLst>
+  </p:cSld>
+  <p:clrMapOvr>
+    <a:masterClrMapping/>
+  </p:clrMapOvr>
+</p:sld>
+</file>
+
+<file path=ppt/slides/slide5.xml><?xml version="1.0" encoding="utf-8"?>
+<p:sld xmlns:a="http://schemas.openxmlformats.org/drawingml/2006/main" xmlns:r="http://schemas.openxmlformats.org/officeDocument/2006/relationships" xmlns:p="http://schemas.openxmlformats.org/presentationml/2006/main">
+  <p:cSld>
+    <p:spTree>
+      <p:nvGrpSpPr>
+        <p:cNvPr id="1" name=""/>
+        <p:cNvGrpSpPr/>
+        <p:nvPr/>
+      </p:nvGrpSpPr>
+      <p:grpSpPr>
+        <a:xfrm>
+          <a:off x="0" y="0"/>
+          <a:ext cx="0" cy="0"/>
+          <a:chOff x="0" y="0"/>
+          <a:chExt cx="0" cy="0"/>
+        </a:xfrm>
+      </p:grpSpPr>
+      <p:pic>
+        <p:nvPicPr>
+          <p:cNvPr id="5" name="Picture 4"/>
+          <p:cNvPicPr>
+            <a:picLocks noChangeAspect="1"/>
+          </p:cNvPicPr>
+          <p:nvPr/>
+        </p:nvPicPr>
+        <p:blipFill>
+          <a:blip r:embed="rId2">
+            <a:extLst>
+              <a:ext uri="{28A0092B-C50C-407E-A947-70E740481C1C}">
+                <a14:useLocalDpi xmlns:a14="http://schemas.microsoft.com/office/drawing/2010/main" val="0"/>
+              </a:ext>
+            </a:extLst>
+          </a:blip>
+          <a:stretch>
+            <a:fillRect/>
+          </a:stretch>
+        </p:blipFill>
+        <p:spPr>
+          <a:xfrm>
+            <a:off x="965477" y="753120"/>
+            <a:ext cx="9478072" cy="1959412"/>
+          </a:xfrm>
+          <a:prstGeom prst="rect">
+            <a:avLst/>
+          </a:prstGeom>
+        </p:spPr>
+      </p:pic>
+      <p:sp>
+        <p:nvSpPr>
+          <p:cNvPr id="6" name="Rectangle 5"/>
+          <p:cNvSpPr/>
+          <p:nvPr/>
+        </p:nvSpPr>
+        <p:spPr>
+          <a:xfrm>
             <a:off x="965477" y="2228671"/>
             <a:ext cx="9478072" cy="1200329"/>
           </a:xfrm>
@@ -14343,7 +14788,7 @@
           <p:cNvPr id="3" name="Table 3">
             <a:extLst>
               <a:ext uri="{FF2B5EF4-FFF2-40B4-BE49-F238E27FC236}">
-                <a16:creationId xmlns:a16="http://schemas.microsoft.com/office/drawing/2014/main" id="{DEFB6C61-0396-49C1-A950-3B9E25415696}"/>
+                <a16:creationId xmlns:a16="http://schemas.microsoft.com/office/drawing/2014/main" xmlns="" id="{DEFB6C61-0396-49C1-A950-3B9E25415696}"/>
               </a:ext>
             </a:extLst>
           </p:cNvPr>
@@ -14372,49 +14817,49 @@
                 <a:gridCol w="1737360">
                   <a:extLst>
                     <a:ext uri="{9D8B030D-6E8A-4147-A177-3AD203B41FA5}">
-                      <a16:colId xmlns:a16="http://schemas.microsoft.com/office/drawing/2014/main" val="3728148191"/>
+                      <a16:colId xmlns:a16="http://schemas.microsoft.com/office/drawing/2014/main" xmlns="" val="3728148191"/>
                     </a:ext>
                   </a:extLst>
                 </a:gridCol>
                 <a:gridCol w="1188720">
                   <a:extLst>
                     <a:ext uri="{9D8B030D-6E8A-4147-A177-3AD203B41FA5}">
-                      <a16:colId xmlns:a16="http://schemas.microsoft.com/office/drawing/2014/main" val="3454429895"/>
+                      <a16:colId xmlns:a16="http://schemas.microsoft.com/office/drawing/2014/main" xmlns="" val="3454429895"/>
                     </a:ext>
                   </a:extLst>
                 </a:gridCol>
                 <a:gridCol w="1188720">
                   <a:extLst>
                     <a:ext uri="{9D8B030D-6E8A-4147-A177-3AD203B41FA5}">
-                      <a16:colId xmlns:a16="http://schemas.microsoft.com/office/drawing/2014/main" val="1661784598"/>
+                      <a16:colId xmlns:a16="http://schemas.microsoft.com/office/drawing/2014/main" xmlns="" val="1661784598"/>
                     </a:ext>
                   </a:extLst>
                 </a:gridCol>
                 <a:gridCol w="401424">
                   <a:extLst>
                     <a:ext uri="{9D8B030D-6E8A-4147-A177-3AD203B41FA5}">
-                      <a16:colId xmlns:a16="http://schemas.microsoft.com/office/drawing/2014/main" val="1850544297"/>
+                      <a16:colId xmlns:a16="http://schemas.microsoft.com/office/drawing/2014/main" xmlns="" val="1850544297"/>
                     </a:ext>
                   </a:extLst>
                 </a:gridCol>
                 <a:gridCol w="1737360">
                   <a:extLst>
                     <a:ext uri="{9D8B030D-6E8A-4147-A177-3AD203B41FA5}">
-                      <a16:colId xmlns:a16="http://schemas.microsoft.com/office/drawing/2014/main" val="2497600869"/>
+                      <a16:colId xmlns:a16="http://schemas.microsoft.com/office/drawing/2014/main" xmlns="" val="2497600869"/>
                     </a:ext>
                   </a:extLst>
                 </a:gridCol>
                 <a:gridCol w="1188720">
                   <a:extLst>
                     <a:ext uri="{9D8B030D-6E8A-4147-A177-3AD203B41FA5}">
-                      <a16:colId xmlns:a16="http://schemas.microsoft.com/office/drawing/2014/main" val="1382927686"/>
+                      <a16:colId xmlns:a16="http://schemas.microsoft.com/office/drawing/2014/main" xmlns="" val="1382927686"/>
                     </a:ext>
                   </a:extLst>
                 </a:gridCol>
                 <a:gridCol w="1188720">
                   <a:extLst>
                     <a:ext uri="{9D8B030D-6E8A-4147-A177-3AD203B41FA5}">
-                      <a16:colId xmlns:a16="http://schemas.microsoft.com/office/drawing/2014/main" val="4207861450"/>
+                      <a16:colId xmlns:a16="http://schemas.microsoft.com/office/drawing/2014/main" xmlns="" val="4207861450"/>
                     </a:ext>
                   </a:extLst>
                 </a:gridCol>
@@ -14510,7 +14955,7 @@
                 </a:tc>
                 <a:extLst>
                   <a:ext uri="{0D108BD9-81ED-4DB2-BD59-A6C34878D82A}">
-                    <a16:rowId xmlns:a16="http://schemas.microsoft.com/office/drawing/2014/main" val="1158437450"/>
+                    <a16:rowId xmlns:a16="http://schemas.microsoft.com/office/drawing/2014/main" xmlns="" val="1158437450"/>
                   </a:ext>
                 </a:extLst>
               </a:tr>
@@ -14659,7 +15104,7 @@
                 </a:tc>
                 <a:extLst>
                   <a:ext uri="{0D108BD9-81ED-4DB2-BD59-A6C34878D82A}">
-                    <a16:rowId xmlns:a16="http://schemas.microsoft.com/office/drawing/2014/main" val="641858960"/>
+                    <a16:rowId xmlns:a16="http://schemas.microsoft.com/office/drawing/2014/main" xmlns="" val="641858960"/>
                   </a:ext>
                 </a:extLst>
               </a:tr>
@@ -14808,7 +15253,7 @@
                 </a:tc>
                 <a:extLst>
                   <a:ext uri="{0D108BD9-81ED-4DB2-BD59-A6C34878D82A}">
-                    <a16:rowId xmlns:a16="http://schemas.microsoft.com/office/drawing/2014/main" val="4006077035"/>
+                    <a16:rowId xmlns:a16="http://schemas.microsoft.com/office/drawing/2014/main" xmlns="" val="4006077035"/>
                   </a:ext>
                 </a:extLst>
               </a:tr>
@@ -14957,7 +15402,7 @@
                 </a:tc>
                 <a:extLst>
                   <a:ext uri="{0D108BD9-81ED-4DB2-BD59-A6C34878D82A}">
-                    <a16:rowId xmlns:a16="http://schemas.microsoft.com/office/drawing/2014/main" val="1598901327"/>
+                    <a16:rowId xmlns:a16="http://schemas.microsoft.com/office/drawing/2014/main" xmlns="" val="1598901327"/>
                   </a:ext>
                 </a:extLst>
               </a:tr>
@@ -15106,7 +15551,7 @@
                 </a:tc>
                 <a:extLst>
                   <a:ext uri="{0D108BD9-81ED-4DB2-BD59-A6C34878D82A}">
-                    <a16:rowId xmlns:a16="http://schemas.microsoft.com/office/drawing/2014/main" val="3000849543"/>
+                    <a16:rowId xmlns:a16="http://schemas.microsoft.com/office/drawing/2014/main" xmlns="" val="3000849543"/>
                   </a:ext>
                 </a:extLst>
               </a:tr>
@@ -15255,7 +15700,7 @@
                 </a:tc>
                 <a:extLst>
                   <a:ext uri="{0D108BD9-81ED-4DB2-BD59-A6C34878D82A}">
-                    <a16:rowId xmlns:a16="http://schemas.microsoft.com/office/drawing/2014/main" val="3270717341"/>
+                    <a16:rowId xmlns:a16="http://schemas.microsoft.com/office/drawing/2014/main" xmlns="" val="3270717341"/>
                   </a:ext>
                 </a:extLst>
               </a:tr>
@@ -15404,7 +15849,7 @@
                 </a:tc>
                 <a:extLst>
                   <a:ext uri="{0D108BD9-81ED-4DB2-BD59-A6C34878D82A}">
-                    <a16:rowId xmlns:a16="http://schemas.microsoft.com/office/drawing/2014/main" val="3590617018"/>
+                    <a16:rowId xmlns:a16="http://schemas.microsoft.com/office/drawing/2014/main" xmlns="" val="3590617018"/>
                   </a:ext>
                 </a:extLst>
               </a:tr>
@@ -15553,7 +15998,7 @@
                 </a:tc>
                 <a:extLst>
                   <a:ext uri="{0D108BD9-81ED-4DB2-BD59-A6C34878D82A}">
-                    <a16:rowId xmlns:a16="http://schemas.microsoft.com/office/drawing/2014/main" val="3062575506"/>
+                    <a16:rowId xmlns:a16="http://schemas.microsoft.com/office/drawing/2014/main" xmlns="" val="3062575506"/>
                   </a:ext>
                 </a:extLst>
               </a:tr>
@@ -15671,7 +16116,7 @@
                 </a:tc>
                 <a:extLst>
                   <a:ext uri="{0D108BD9-81ED-4DB2-BD59-A6C34878D82A}">
-                    <a16:rowId xmlns:a16="http://schemas.microsoft.com/office/drawing/2014/main" val="340670456"/>
+                    <a16:rowId xmlns:a16="http://schemas.microsoft.com/office/drawing/2014/main" xmlns="" val="340670456"/>
                   </a:ext>
                 </a:extLst>
               </a:tr>
@@ -15683,427 +16128,6 @@
     <p:extLst>
       <p:ext uri="{BB962C8B-B14F-4D97-AF65-F5344CB8AC3E}">
         <p14:creationId xmlns:p14="http://schemas.microsoft.com/office/powerpoint/2010/main" val="2348135689"/>
-      </p:ext>
-    </p:extLst>
-  </p:cSld>
-  <p:clrMapOvr>
-    <a:masterClrMapping/>
-  </p:clrMapOvr>
-</p:sld>
-</file>
-
-<file path=ppt/slides/slide4.xml><?xml version="1.0" encoding="utf-8"?>
-<p:sld xmlns:a="http://schemas.openxmlformats.org/drawingml/2006/main" xmlns:r="http://schemas.openxmlformats.org/officeDocument/2006/relationships" xmlns:p="http://schemas.openxmlformats.org/presentationml/2006/main">
-  <p:cSld>
-    <p:spTree>
-      <p:nvGrpSpPr>
-        <p:cNvPr id="1" name=""/>
-        <p:cNvGrpSpPr/>
-        <p:nvPr/>
-      </p:nvGrpSpPr>
-      <p:grpSpPr>
-        <a:xfrm>
-          <a:off x="0" y="0"/>
-          <a:ext cx="0" cy="0"/>
-          <a:chOff x="0" y="0"/>
-          <a:chExt cx="0" cy="0"/>
-        </a:xfrm>
-      </p:grpSpPr>
-      <p:pic>
-        <p:nvPicPr>
-          <p:cNvPr id="5" name="Picture 4"/>
-          <p:cNvPicPr>
-            <a:picLocks noChangeAspect="1"/>
-          </p:cNvPicPr>
-          <p:nvPr/>
-        </p:nvPicPr>
-        <p:blipFill>
-          <a:blip r:embed="rId2">
-            <a:extLst>
-              <a:ext uri="{28A0092B-C50C-407E-A947-70E740481C1C}">
-                <a14:useLocalDpi xmlns:a14="http://schemas.microsoft.com/office/drawing/2010/main" val="0"/>
-              </a:ext>
-            </a:extLst>
-          </a:blip>
-          <a:stretch>
-            <a:fillRect/>
-          </a:stretch>
-        </p:blipFill>
-        <p:spPr>
-          <a:xfrm>
-            <a:off x="965477" y="753120"/>
-            <a:ext cx="9478072" cy="1959412"/>
-          </a:xfrm>
-          <a:prstGeom prst="rect">
-            <a:avLst/>
-          </a:prstGeom>
-        </p:spPr>
-      </p:pic>
-      <p:sp>
-        <p:nvSpPr>
-          <p:cNvPr id="6" name="Rectangle 5"/>
-          <p:cNvSpPr/>
-          <p:nvPr/>
-        </p:nvSpPr>
-        <p:spPr>
-          <a:xfrm>
-            <a:off x="965477" y="2712532"/>
-            <a:ext cx="9478072" cy="3477875"/>
-          </a:xfrm>
-          <a:prstGeom prst="rect">
-            <a:avLst/>
-          </a:prstGeom>
-        </p:spPr>
-        <p:txBody>
-          <a:bodyPr wrap="square">
-            <a:spAutoFit/>
-          </a:bodyPr>
-          <a:lstStyle/>
-          <a:p>
-            <a:r>
-              <a:rPr lang="en-US" sz="4000" dirty="0">
-                <a:solidFill>
-                  <a:srgbClr val="EBEBEB"/>
-                </a:solidFill>
-                <a:latin typeface="Times New Roman" panose="02020603050405020304" pitchFamily="18" charset="0"/>
-                <a:ea typeface="+mj-ea"/>
-                <a:cs typeface="Times New Roman" panose="02020603050405020304" pitchFamily="18" charset="0"/>
-              </a:rPr>
-              <a:t>Analysis</a:t>
-            </a:r>
-            <a:endParaRPr lang="en-US" sz="2400" dirty="0">
-              <a:solidFill>
-                <a:srgbClr val="EBEBEB"/>
-              </a:solidFill>
-              <a:ea typeface="+mj-ea"/>
-              <a:cs typeface="+mj-cs"/>
-            </a:endParaRPr>
-          </a:p>
-          <a:p>
-            <a:endParaRPr lang="en-US" sz="2400" dirty="0">
-              <a:solidFill>
-                <a:schemeClr val="bg1"/>
-              </a:solidFill>
-              <a:ea typeface="+mj-ea"/>
-              <a:cs typeface="+mj-cs"/>
-            </a:endParaRPr>
-          </a:p>
-          <a:p>
-            <a:pPr marL="342900" indent="-342900">
-              <a:buFont typeface="Wingdings" panose="05000000000000000000" pitchFamily="2" charset="2"/>
-              <a:buChar char="v"/>
-            </a:pPr>
-            <a:r>
-              <a:rPr lang="en-US" dirty="0">
-                <a:solidFill>
-                  <a:schemeClr val="bg1"/>
-                </a:solidFill>
-                <a:ea typeface="+mj-ea"/>
-                <a:cs typeface="+mj-cs"/>
-              </a:rPr>
-              <a:t>Goal of Analysis:  Identify factors that impact whether issue is closed by the due date or not</a:t>
-            </a:r>
-          </a:p>
-          <a:p>
-            <a:pPr marL="342900" indent="-342900">
-              <a:buFont typeface="Wingdings" panose="05000000000000000000" pitchFamily="2" charset="2"/>
-              <a:buChar char="v"/>
-            </a:pPr>
-            <a:r>
-              <a:rPr lang="en-US" dirty="0">
-                <a:solidFill>
-                  <a:schemeClr val="bg1"/>
-                </a:solidFill>
-                <a:ea typeface="+mj-ea"/>
-                <a:cs typeface="+mj-cs"/>
-              </a:rPr>
-              <a:t>Factors Considered:</a:t>
-            </a:r>
-          </a:p>
-          <a:p>
-            <a:pPr marL="800100" lvl="1" indent="-342900">
-              <a:buFont typeface="Wingdings" panose="05000000000000000000" pitchFamily="2" charset="2"/>
-              <a:buChar char="v"/>
-            </a:pPr>
-            <a:r>
-              <a:rPr lang="en-US" dirty="0">
-                <a:solidFill>
-                  <a:schemeClr val="bg1"/>
-                </a:solidFill>
-              </a:rPr>
-              <a:t>Type of Issue</a:t>
-            </a:r>
-            <a:endParaRPr lang="en-US" dirty="0">
-              <a:solidFill>
-                <a:schemeClr val="bg1"/>
-              </a:solidFill>
-              <a:ea typeface="+mj-ea"/>
-              <a:cs typeface="+mj-cs"/>
-            </a:endParaRPr>
-          </a:p>
-          <a:p>
-            <a:pPr marL="800100" lvl="1" indent="-342900">
-              <a:buFont typeface="Wingdings" panose="05000000000000000000" pitchFamily="2" charset="2"/>
-              <a:buChar char="v"/>
-            </a:pPr>
-            <a:r>
-              <a:rPr lang="en-US" dirty="0">
-                <a:solidFill>
-                  <a:schemeClr val="bg1"/>
-                </a:solidFill>
-                <a:ea typeface="+mj-ea"/>
-                <a:cs typeface="+mj-cs"/>
-              </a:rPr>
-              <a:t>Socioeconomic factors</a:t>
-            </a:r>
-          </a:p>
-          <a:p>
-            <a:pPr marL="800100" lvl="1" indent="-342900">
-              <a:buFont typeface="Wingdings" panose="05000000000000000000" pitchFamily="2" charset="2"/>
-              <a:buChar char="v"/>
-            </a:pPr>
-            <a:r>
-              <a:rPr lang="en-US" dirty="0">
-                <a:solidFill>
-                  <a:schemeClr val="bg1"/>
-                </a:solidFill>
-                <a:ea typeface="+mj-ea"/>
-                <a:cs typeface="+mj-cs"/>
-              </a:rPr>
-              <a:t>Weather</a:t>
-            </a:r>
-          </a:p>
-          <a:p>
-            <a:endParaRPr lang="en-US" sz="2400" dirty="0">
-              <a:solidFill>
-                <a:schemeClr val="bg1"/>
-              </a:solidFill>
-            </a:endParaRPr>
-          </a:p>
-          <a:p>
-            <a:endParaRPr lang="en-US" sz="2400" dirty="0">
-              <a:solidFill>
-                <a:schemeClr val="bg1"/>
-              </a:solidFill>
-            </a:endParaRPr>
-          </a:p>
-        </p:txBody>
-      </p:sp>
-    </p:spTree>
-    <p:extLst>
-      <p:ext uri="{BB962C8B-B14F-4D97-AF65-F5344CB8AC3E}">
-        <p14:creationId xmlns:p14="http://schemas.microsoft.com/office/powerpoint/2010/main" val="1715361934"/>
-      </p:ext>
-    </p:extLst>
-  </p:cSld>
-  <p:clrMapOvr>
-    <a:masterClrMapping/>
-  </p:clrMapOvr>
-</p:sld>
-</file>
-
-<file path=ppt/slides/slide5.xml><?xml version="1.0" encoding="utf-8"?>
-<p:sld xmlns:a="http://schemas.openxmlformats.org/drawingml/2006/main" xmlns:r="http://schemas.openxmlformats.org/officeDocument/2006/relationships" xmlns:p="http://schemas.openxmlformats.org/presentationml/2006/main">
-  <p:cSld>
-    <p:spTree>
-      <p:nvGrpSpPr>
-        <p:cNvPr id="1" name=""/>
-        <p:cNvGrpSpPr/>
-        <p:nvPr/>
-      </p:nvGrpSpPr>
-      <p:grpSpPr>
-        <a:xfrm>
-          <a:off x="0" y="0"/>
-          <a:ext cx="0" cy="0"/>
-          <a:chOff x="0" y="0"/>
-          <a:chExt cx="0" cy="0"/>
-        </a:xfrm>
-      </p:grpSpPr>
-      <p:pic>
-        <p:nvPicPr>
-          <p:cNvPr id="5" name="Picture 4"/>
-          <p:cNvPicPr>
-            <a:picLocks noChangeAspect="1"/>
-          </p:cNvPicPr>
-          <p:nvPr/>
-        </p:nvPicPr>
-        <p:blipFill>
-          <a:blip r:embed="rId2">
-            <a:extLst>
-              <a:ext uri="{28A0092B-C50C-407E-A947-70E740481C1C}">
-                <a14:useLocalDpi xmlns:a14="http://schemas.microsoft.com/office/drawing/2010/main" val="0"/>
-              </a:ext>
-            </a:extLst>
-          </a:blip>
-          <a:stretch>
-            <a:fillRect/>
-          </a:stretch>
-        </p:blipFill>
-        <p:spPr>
-          <a:xfrm>
-            <a:off x="965477" y="753120"/>
-            <a:ext cx="9478072" cy="1959412"/>
-          </a:xfrm>
-          <a:prstGeom prst="rect">
-            <a:avLst/>
-          </a:prstGeom>
-        </p:spPr>
-      </p:pic>
-      <p:sp>
-        <p:nvSpPr>
-          <p:cNvPr id="6" name="Rectangle 5"/>
-          <p:cNvSpPr/>
-          <p:nvPr/>
-        </p:nvSpPr>
-        <p:spPr>
-          <a:xfrm>
-            <a:off x="965477" y="2712532"/>
-            <a:ext cx="9478072" cy="3293209"/>
-          </a:xfrm>
-          <a:prstGeom prst="rect">
-            <a:avLst/>
-          </a:prstGeom>
-        </p:spPr>
-        <p:txBody>
-          <a:bodyPr wrap="square">
-            <a:spAutoFit/>
-          </a:bodyPr>
-          <a:lstStyle/>
-          <a:p>
-            <a:r>
-              <a:rPr lang="en-US" sz="4000" dirty="0">
-                <a:solidFill>
-                  <a:srgbClr val="EBEBEB"/>
-                </a:solidFill>
-                <a:latin typeface="Times New Roman" panose="02020603050405020304" pitchFamily="18" charset="0"/>
-                <a:ea typeface="+mj-ea"/>
-                <a:cs typeface="Times New Roman" panose="02020603050405020304" pitchFamily="18" charset="0"/>
-              </a:rPr>
-              <a:t>Datasets</a:t>
-            </a:r>
-            <a:endParaRPr lang="en-US" sz="2400" dirty="0">
-              <a:solidFill>
-                <a:srgbClr val="EBEBEB"/>
-              </a:solidFill>
-              <a:ea typeface="+mj-ea"/>
-              <a:cs typeface="+mj-cs"/>
-            </a:endParaRPr>
-          </a:p>
-          <a:p>
-            <a:endParaRPr lang="en-US" sz="2400" dirty="0">
-              <a:solidFill>
-                <a:schemeClr val="bg1"/>
-              </a:solidFill>
-              <a:ea typeface="+mj-ea"/>
-              <a:cs typeface="+mj-cs"/>
-            </a:endParaRPr>
-          </a:p>
-          <a:p>
-            <a:pPr marL="342900" indent="-342900">
-              <a:buFont typeface="Wingdings" panose="05000000000000000000" pitchFamily="2" charset="2"/>
-              <a:buChar char="v"/>
-            </a:pPr>
-            <a:r>
-              <a:rPr lang="en-US" sz="2400" dirty="0">
-                <a:solidFill>
-                  <a:schemeClr val="bg1"/>
-                </a:solidFill>
-                <a:ea typeface="+mj-ea"/>
-                <a:cs typeface="+mj-cs"/>
-              </a:rPr>
-              <a:t>City of Houston 311 - </a:t>
-            </a:r>
-            <a:r>
-              <a:rPr lang="en-US" sz="2400" u="sng" dirty="0">
-                <a:solidFill>
-                  <a:schemeClr val="bg1"/>
-                </a:solidFill>
-                <a:hlinkClick r:id="rId3"/>
-              </a:rPr>
-              <a:t>https://www.houstontx.gov/311/</a:t>
-            </a:r>
-            <a:endParaRPr lang="en-US" sz="2400" u="sng" dirty="0">
-              <a:solidFill>
-                <a:schemeClr val="bg1"/>
-              </a:solidFill>
-            </a:endParaRPr>
-          </a:p>
-          <a:p>
-            <a:pPr marL="342900" indent="-342900">
-              <a:buFont typeface="Wingdings" panose="05000000000000000000" pitchFamily="2" charset="2"/>
-              <a:buChar char="v"/>
-            </a:pPr>
-            <a:endParaRPr lang="en-US" sz="2400" u="sng" dirty="0">
-              <a:solidFill>
-                <a:schemeClr val="bg1"/>
-              </a:solidFill>
-            </a:endParaRPr>
-          </a:p>
-          <a:p>
-            <a:pPr marL="342900" indent="-342900">
-              <a:buFont typeface="Wingdings" panose="05000000000000000000" pitchFamily="2" charset="2"/>
-              <a:buChar char="v"/>
-            </a:pPr>
-            <a:r>
-              <a:rPr lang="en-US" sz="2400" dirty="0">
-                <a:solidFill>
-                  <a:schemeClr val="bg1"/>
-                </a:solidFill>
-              </a:rPr>
-              <a:t>Census Bureau -  </a:t>
-            </a:r>
-            <a:r>
-              <a:rPr lang="en-US" sz="2400" u="sng" dirty="0">
-                <a:solidFill>
-                  <a:schemeClr val="bg1"/>
-                </a:solidFill>
-                <a:hlinkClick r:id="rId4"/>
-              </a:rPr>
-              <a:t>https://www.census.gov/acs/www/data/</a:t>
-            </a:r>
-            <a:r>
-              <a:rPr lang="en-US" sz="2400" dirty="0">
-                <a:solidFill>
-                  <a:schemeClr val="bg1"/>
-                </a:solidFill>
-              </a:rPr>
-              <a:t>		</a:t>
-            </a:r>
-          </a:p>
-          <a:p>
-            <a:pPr marL="342900" indent="-342900">
-              <a:buFont typeface="Wingdings" panose="05000000000000000000" pitchFamily="2" charset="2"/>
-              <a:buChar char="v"/>
-            </a:pPr>
-            <a:r>
-              <a:rPr lang="en-US" sz="2400" dirty="0">
-                <a:solidFill>
-                  <a:schemeClr val="bg1"/>
-                </a:solidFill>
-              </a:rPr>
-              <a:t>Weather Underground - </a:t>
-            </a:r>
-            <a:r>
-              <a:rPr lang="en-US" sz="2400" u="sng" dirty="0">
-                <a:hlinkClick r:id="rId5"/>
-              </a:rPr>
-              <a:t>https://www.wunderground.com/</a:t>
-            </a:r>
-            <a:endParaRPr lang="en-US" sz="2400" dirty="0"/>
-          </a:p>
-          <a:p>
-            <a:endParaRPr lang="en-US" sz="2400" dirty="0">
-              <a:solidFill>
-                <a:schemeClr val="bg1"/>
-              </a:solidFill>
-            </a:endParaRPr>
-          </a:p>
-        </p:txBody>
-      </p:sp>
-    </p:spTree>
-    <p:extLst>
-      <p:ext uri="{BB962C8B-B14F-4D97-AF65-F5344CB8AC3E}">
-        <p14:creationId xmlns:p14="http://schemas.microsoft.com/office/powerpoint/2010/main" val="802031608"/>
       </p:ext>
     </p:extLst>
   </p:cSld>
@@ -16346,6 +16370,14 @@
                 <a:spcPts val="800"/>
               </a:spcAft>
             </a:pPr>
+            <a:r>
+              <a:rPr lang="en-US" sz="2400" dirty="0">
+                <a:latin typeface="Calibri" panose="020F0502020204030204" pitchFamily="34" charset="0"/>
+                <a:ea typeface="Calibri" panose="020F0502020204030204" pitchFamily="34" charset="0"/>
+                <a:cs typeface="Times New Roman" panose="02020603050405020304" pitchFamily="18" charset="0"/>
+              </a:rPr>
+              <a:t/>
+            </a:r>
             <a:br>
               <a:rPr lang="en-US" sz="2400" dirty="0">
                 <a:latin typeface="Calibri" panose="020F0502020204030204" pitchFamily="34" charset="0"/>

</xml_diff>